<commit_message>
UCCJ-1630 DEMO done and working. Preared for review from toga.
</commit_message>
<xml_diff>
--- a/demo.pptx
+++ b/demo.pptx
@@ -223,7 +223,7 @@
           <a:p>
             <a:fld id="{A4F5FB7B-FABB-5145-A74F-0C01ADC71774}" type="datetimeFigureOut">
               <a:rPr lang="en-US" smtClean="0"/>
-              <a:t>5/11/18</a:t>
+              <a:t>5/14/18</a:t>
             </a:fld>
             <a:endParaRPr lang="en-US"/>
           </a:p>
@@ -388,7 +388,7 @@
           <a:p>
             <a:fld id="{69F16828-7198-E644-A1E2-D6CB99EE7364}" type="datetimeFigureOut">
               <a:rPr lang="en-US" smtClean="0"/>
-              <a:t>5/11/18</a:t>
+              <a:t>5/14/18</a:t>
             </a:fld>
             <a:endParaRPr lang="en-US"/>
           </a:p>
@@ -1328,7 +1328,7 @@
           <a:p>
             <a:fld id="{88297517-F636-9E4E-B672-F1EF19FBF17A}" type="datetime4">
               <a:rPr lang="en-US" smtClean="0"/>
-              <a:t>May 11, 2018</a:t>
+              <a:t>May 14, 2018</a:t>
             </a:fld>
             <a:endParaRPr lang="en-US" dirty="0"/>
           </a:p>
@@ -2229,7 +2229,7 @@
           <a:p>
             <a:fld id="{BE0BBC83-F25D-6A4B-8CC6-6AA2E3922F60}" type="datetime4">
               <a:rPr lang="en-US" smtClean="0"/>
-              <a:t>May 11, 2018</a:t>
+              <a:t>May 14, 2018</a:t>
             </a:fld>
             <a:endParaRPr lang="en-US" dirty="0"/>
           </a:p>
@@ -2591,7 +2591,7 @@
           <a:p>
             <a:fld id="{5EBA90A9-4B84-F545-ADFB-F9BC9B43D4DE}" type="datetime4">
               <a:rPr lang="en-US" smtClean="0"/>
-              <a:t>May 11, 2018</a:t>
+              <a:t>May 14, 2018</a:t>
             </a:fld>
             <a:endParaRPr lang="en-US" dirty="0"/>
           </a:p>
@@ -2938,7 +2938,7 @@
           <a:p>
             <a:fld id="{4AF2BF69-7BD4-7348-A595-7CA9E29A8A8B}" type="datetime4">
               <a:rPr lang="en-US" smtClean="0"/>
-              <a:t>May 11, 2018</a:t>
+              <a:t>May 14, 2018</a:t>
             </a:fld>
             <a:endParaRPr lang="en-US" dirty="0"/>
           </a:p>
@@ -3014,7 +3014,7 @@
           <a:p>
             <a:fld id="{B420E4A7-90F7-D444-BE14-4A37368C24FB}" type="datetime4">
               <a:rPr lang="en-US" smtClean="0"/>
-              <a:t>May 11, 2018</a:t>
+              <a:t>May 14, 2018</a:t>
             </a:fld>
             <a:endParaRPr lang="en-US"/>
           </a:p>
@@ -3185,7 +3185,7 @@
           <a:p>
             <a:fld id="{B420E4A7-90F7-D444-BE14-4A37368C24FB}" type="datetime4">
               <a:rPr lang="en-US" smtClean="0"/>
-              <a:t>May 11, 2018</a:t>
+              <a:t>May 14, 2018</a:t>
             </a:fld>
             <a:endParaRPr lang="en-US"/>
           </a:p>
@@ -3288,7 +3288,7 @@
           <a:p>
             <a:fld id="{B420E4A7-90F7-D444-BE14-4A37368C24FB}" type="datetime4">
               <a:rPr lang="en-US" smtClean="0"/>
-              <a:t>May 11, 2018</a:t>
+              <a:t>May 14, 2018</a:t>
             </a:fld>
             <a:endParaRPr lang="en-US"/>
           </a:p>
@@ -3757,7 +3757,7 @@
           <a:p>
             <a:fld id="{23483CBB-145F-6C43-AE86-6DE3FC833EEC}" type="datetime4">
               <a:rPr lang="en-US" smtClean="0"/>
-              <a:t>May 11, 2018</a:t>
+              <a:t>May 14, 2018</a:t>
             </a:fld>
             <a:endParaRPr lang="en-US"/>
           </a:p>
@@ -4059,7 +4059,7 @@
             <a:fld id="{88297517-F636-9E4E-B672-F1EF19FBF17A}" type="datetime4">
               <a:rPr lang="en-US" smtClean="0"/>
               <a:pPr/>
-              <a:t>May 11, 2018</a:t>
+              <a:t>May 14, 2018</a:t>
             </a:fld>
             <a:endParaRPr lang="en-US" dirty="0"/>
           </a:p>
@@ -4429,7 +4429,7 @@
           <a:p>
             <a:fld id="{312948EC-D86E-0E4E-BDA8-3A93AC131EAA}" type="datetime4">
               <a:rPr lang="en-US" smtClean="0"/>
-              <a:t>May 11, 2018</a:t>
+              <a:t>May 14, 2018</a:t>
             </a:fld>
             <a:endParaRPr lang="en-US" dirty="0"/>
           </a:p>
@@ -4817,7 +4817,7 @@
           <a:p>
             <a:fld id="{892A4A5F-9361-1D49-B053-1545CE5783EE}" type="datetime4">
               <a:rPr lang="en-US" smtClean="0"/>
-              <a:t>May 11, 2018</a:t>
+              <a:t>May 14, 2018</a:t>
             </a:fld>
             <a:endParaRPr lang="en-US"/>
           </a:p>
@@ -5088,7 +5088,7 @@
           <a:p>
             <a:fld id="{302D8A5C-1535-7B46-9D98-327194D83E4C}" type="datetime4">
               <a:rPr lang="en-US" smtClean="0"/>
-              <a:t>May 11, 2018</a:t>
+              <a:t>May 14, 2018</a:t>
             </a:fld>
             <a:endParaRPr lang="en-US"/>
           </a:p>
@@ -5307,7 +5307,7 @@
           <a:p>
             <a:fld id="{0657E817-5BF1-7248-9653-7556C31B310E}" type="datetime4">
               <a:rPr lang="en-US" smtClean="0"/>
-              <a:t>May 11, 2018</a:t>
+              <a:t>May 14, 2018</a:t>
             </a:fld>
             <a:endParaRPr lang="en-US"/>
           </a:p>
@@ -5527,7 +5527,7 @@
           <a:p>
             <a:fld id="{98A843BF-BBE8-4D42-89C9-296A6EDA3AFB}" type="datetime4">
               <a:rPr lang="en-US" smtClean="0"/>
-              <a:t>May 11, 2018</a:t>
+              <a:t>May 14, 2018</a:t>
             </a:fld>
             <a:endParaRPr lang="en-US"/>
           </a:p>
@@ -6089,7 +6089,7 @@
           <a:p>
             <a:fld id="{CABA39A7-81BE-8B42-8A9C-B201D4A7BC6B}" type="datetime4">
               <a:rPr lang="en-US" smtClean="0"/>
-              <a:t>May 11, 2018</a:t>
+              <a:t>May 14, 2018</a:t>
             </a:fld>
             <a:endParaRPr lang="en-US" dirty="0"/>
           </a:p>
@@ -6773,7 +6773,7 @@
           <a:p>
             <a:fld id="{FB9268EF-B18E-FF49-9840-D96F1F451A6A}" type="datetime4">
               <a:rPr lang="en-US" smtClean="0"/>
-              <a:t>May 11, 2018</a:t>
+              <a:t>May 14, 2018</a:t>
             </a:fld>
             <a:endParaRPr lang="en-US" dirty="0"/>
           </a:p>
@@ -6970,7 +6970,7 @@
           <a:p>
             <a:fld id="{CF027E54-A86C-7F42-ACF2-1C4CECA97F46}" type="datetime4">
               <a:rPr lang="en-US" smtClean="0"/>
-              <a:t>May 11, 2018</a:t>
+              <a:t>May 14, 2018</a:t>
             </a:fld>
             <a:endParaRPr lang="en-US"/>
           </a:p>
@@ -7045,8 +7045,8 @@
         </p:nvSpPr>
         <p:spPr>
           <a:xfrm>
-            <a:off x="426720" y="1395663"/>
-            <a:ext cx="8290560" cy="462166"/>
+            <a:off x="426720" y="1395662"/>
+            <a:ext cx="8290560" cy="788139"/>
           </a:xfrm>
         </p:spPr>
         <p:txBody>
@@ -7064,6 +7064,12 @@
             <a:r>
               <a:rPr lang="en-US" dirty="0"/>
               <a:t> </a:t>
+            </a:r>
+          </a:p>
+          <a:p>
+            <a:r>
+              <a:rPr lang="en-US" dirty="0"/>
+              <a:t>Flexible target platform:</a:t>
             </a:r>
           </a:p>
         </p:txBody>
@@ -7130,7 +7136,7 @@
           <a:p>
             <a:fld id="{CF027E54-A86C-7F42-ACF2-1C4CECA97F46}" type="datetime4">
               <a:rPr lang="en-US" smtClean="0"/>
-              <a:t>May 11, 2018</a:t>
+              <a:t>May 14, 2018</a:t>
             </a:fld>
             <a:endParaRPr lang="en-US"/>
           </a:p>
@@ -7150,7 +7156,7 @@
         </p:nvSpPr>
         <p:spPr>
           <a:xfrm>
-            <a:off x="991025" y="2033794"/>
+            <a:off x="996404" y="2359765"/>
             <a:ext cx="1062543" cy="275852"/>
           </a:xfrm>
           <a:prstGeom prst="rect">
@@ -7208,7 +7214,7 @@
         </p:nvSpPr>
         <p:spPr>
           <a:xfrm>
-            <a:off x="2732983" y="2023577"/>
+            <a:off x="2738362" y="2349548"/>
             <a:ext cx="4694362" cy="300082"/>
           </a:xfrm>
           <a:prstGeom prst="rect">
@@ -7246,15 +7252,7 @@
             </a:r>
             <a:r>
               <a:rPr lang="cs-CZ" dirty="0"/>
-              <a:t> plus </a:t>
-            </a:r>
-            <a:r>
-              <a:rPr lang="cs-CZ" dirty="0" err="1"/>
-              <a:t>debbuger</a:t>
-            </a:r>
-            <a:r>
-              <a:rPr lang="cs-CZ" dirty="0"/>
-              <a:t>)</a:t>
+              <a:t> plus debugger)</a:t>
             </a:r>
           </a:p>
         </p:txBody>
@@ -7273,7 +7271,7 @@
         </p:nvSpPr>
         <p:spPr>
           <a:xfrm>
-            <a:off x="991025" y="2714342"/>
+            <a:off x="996404" y="3040313"/>
             <a:ext cx="1062543" cy="275852"/>
           </a:xfrm>
           <a:prstGeom prst="rect">
@@ -7322,7 +7320,7 @@
         </p:nvSpPr>
         <p:spPr>
           <a:xfrm>
-            <a:off x="2732983" y="2690112"/>
+            <a:off x="2738362" y="3016083"/>
             <a:ext cx="3257751" cy="300082"/>
           </a:xfrm>
           <a:prstGeom prst="rect">
@@ -7385,7 +7383,7 @@
         </p:nvSpPr>
         <p:spPr>
           <a:xfrm>
-            <a:off x="904181" y="3380877"/>
+            <a:off x="909560" y="3706848"/>
             <a:ext cx="1236229" cy="275852"/>
           </a:xfrm>
           <a:prstGeom prst="rect">
@@ -7443,7 +7441,7 @@
         </p:nvSpPr>
         <p:spPr>
           <a:xfrm>
-            <a:off x="2732983" y="3356647"/>
+            <a:off x="2738362" y="3682618"/>
             <a:ext cx="3837845" cy="300082"/>
           </a:xfrm>
           <a:prstGeom prst="rect">
@@ -7928,7 +7926,7 @@
           <a:p>
             <a:fld id="{CF027E54-A86C-7F42-ACF2-1C4CECA97F46}" type="datetime4">
               <a:rPr lang="en-US" smtClean="0"/>
-              <a:t>May 11, 2018</a:t>
+              <a:t>May 14, 2018</a:t>
             </a:fld>
             <a:endParaRPr lang="en-US"/>
           </a:p>
@@ -8042,6 +8040,322 @@
             </a:r>
           </a:p>
           <a:p>
+            <a:pPr lvl="1"/>
+            <a:r>
+              <a:rPr lang="en-US" b="1" dirty="0"/>
+              <a:t>!!! Lambda code bucket vs. bucket for lambda runtime !!!</a:t>
+            </a:r>
+          </a:p>
+          <a:p>
+            <a:r>
+              <a:rPr lang="en-US" dirty="0"/>
+              <a:t>Prepare lambda source zip file:</a:t>
+            </a:r>
+          </a:p>
+          <a:p>
+            <a:pPr marL="0" indent="0">
+              <a:buNone/>
+            </a:pPr>
+            <a:r>
+              <a:rPr lang="cs-CZ" sz="1200" dirty="0">
+                <a:latin typeface="Menlo" panose="020B0609030804020204" pitchFamily="49" charset="0"/>
+                <a:ea typeface="Menlo" panose="020B0609030804020204" pitchFamily="49" charset="0"/>
+                <a:cs typeface="Menlo" panose="020B0609030804020204" pitchFamily="49" charset="0"/>
+              </a:rPr>
+              <a:t>zip -</a:t>
+            </a:r>
+            <a:r>
+              <a:rPr lang="cs-CZ" sz="1200" dirty="0" err="1">
+                <a:latin typeface="Menlo" panose="020B0609030804020204" pitchFamily="49" charset="0"/>
+                <a:ea typeface="Menlo" panose="020B0609030804020204" pitchFamily="49" charset="0"/>
+                <a:cs typeface="Menlo" panose="020B0609030804020204" pitchFamily="49" charset="0"/>
+              </a:rPr>
+              <a:t>r</a:t>
+            </a:r>
+            <a:r>
+              <a:rPr lang="cs-CZ" sz="1200" dirty="0">
+                <a:latin typeface="Menlo" panose="020B0609030804020204" pitchFamily="49" charset="0"/>
+                <a:ea typeface="Menlo" panose="020B0609030804020204" pitchFamily="49" charset="0"/>
+                <a:cs typeface="Menlo" panose="020B0609030804020204" pitchFamily="49" charset="0"/>
+              </a:rPr>
+              <a:t> /</a:t>
+            </a:r>
+            <a:r>
+              <a:rPr lang="cs-CZ" sz="1200" dirty="0" err="1">
+                <a:latin typeface="Menlo" panose="020B0609030804020204" pitchFamily="49" charset="0"/>
+                <a:ea typeface="Menlo" panose="020B0609030804020204" pitchFamily="49" charset="0"/>
+                <a:cs typeface="Menlo" panose="020B0609030804020204" pitchFamily="49" charset="0"/>
+              </a:rPr>
+              <a:t>tmp</a:t>
+            </a:r>
+            <a:r>
+              <a:rPr lang="cs-CZ" sz="1200" dirty="0">
+                <a:latin typeface="Menlo" panose="020B0609030804020204" pitchFamily="49" charset="0"/>
+                <a:ea typeface="Menlo" panose="020B0609030804020204" pitchFamily="49" charset="0"/>
+                <a:cs typeface="Menlo" panose="020B0609030804020204" pitchFamily="49" charset="0"/>
+              </a:rPr>
+              <a:t>/</a:t>
+            </a:r>
+            <a:r>
+              <a:rPr lang="cs-CZ" sz="1200" dirty="0" err="1">
+                <a:latin typeface="Menlo" panose="020B0609030804020204" pitchFamily="49" charset="0"/>
+                <a:ea typeface="Menlo" panose="020B0609030804020204" pitchFamily="49" charset="0"/>
+                <a:cs typeface="Menlo" panose="020B0609030804020204" pitchFamily="49" charset="0"/>
+              </a:rPr>
+              <a:t>lambda.zip</a:t>
+            </a:r>
+            <a:r>
+              <a:rPr lang="cs-CZ" sz="1200" dirty="0">
+                <a:latin typeface="Menlo" panose="020B0609030804020204" pitchFamily="49" charset="0"/>
+                <a:ea typeface="Menlo" panose="020B0609030804020204" pitchFamily="49" charset="0"/>
+                <a:cs typeface="Menlo" panose="020B0609030804020204" pitchFamily="49" charset="0"/>
+              </a:rPr>
+              <a:t> </a:t>
+            </a:r>
+            <a:r>
+              <a:rPr lang="cs-CZ" sz="1200" dirty="0" err="1">
+                <a:latin typeface="Menlo" panose="020B0609030804020204" pitchFamily="49" charset="0"/>
+                <a:ea typeface="Menlo" panose="020B0609030804020204" pitchFamily="49" charset="0"/>
+                <a:cs typeface="Menlo" panose="020B0609030804020204" pitchFamily="49" charset="0"/>
+              </a:rPr>
+              <a:t>app.py</a:t>
+            </a:r>
+            <a:br>
+              <a:rPr lang="cs-CZ" sz="1200" dirty="0">
+                <a:latin typeface="Menlo" panose="020B0609030804020204" pitchFamily="49" charset="0"/>
+                <a:ea typeface="Menlo" panose="020B0609030804020204" pitchFamily="49" charset="0"/>
+                <a:cs typeface="Menlo" panose="020B0609030804020204" pitchFamily="49" charset="0"/>
+              </a:rPr>
+            </a:br>
+            <a:r>
+              <a:rPr lang="cs-CZ" sz="1200" dirty="0">
+                <a:latin typeface="Menlo" panose="020B0609030804020204" pitchFamily="49" charset="0"/>
+                <a:ea typeface="Menlo" panose="020B0609030804020204" pitchFamily="49" charset="0"/>
+                <a:cs typeface="Menlo" panose="020B0609030804020204" pitchFamily="49" charset="0"/>
+              </a:rPr>
+              <a:t>cd </a:t>
+            </a:r>
+            <a:r>
+              <a:rPr lang="cs-CZ" sz="1200" dirty="0" err="1">
+                <a:latin typeface="Menlo" panose="020B0609030804020204" pitchFamily="49" charset="0"/>
+                <a:ea typeface="Menlo" panose="020B0609030804020204" pitchFamily="49" charset="0"/>
+                <a:cs typeface="Menlo" panose="020B0609030804020204" pitchFamily="49" charset="0"/>
+              </a:rPr>
+              <a:t>env</a:t>
+            </a:r>
+            <a:r>
+              <a:rPr lang="cs-CZ" sz="1200" dirty="0">
+                <a:latin typeface="Menlo" panose="020B0609030804020204" pitchFamily="49" charset="0"/>
+                <a:ea typeface="Menlo" panose="020B0609030804020204" pitchFamily="49" charset="0"/>
+                <a:cs typeface="Menlo" panose="020B0609030804020204" pitchFamily="49" charset="0"/>
+              </a:rPr>
+              <a:t>/lib/python3.6/</a:t>
+            </a:r>
+            <a:r>
+              <a:rPr lang="cs-CZ" sz="1200" dirty="0" err="1">
+                <a:latin typeface="Menlo" panose="020B0609030804020204" pitchFamily="49" charset="0"/>
+                <a:ea typeface="Menlo" panose="020B0609030804020204" pitchFamily="49" charset="0"/>
+                <a:cs typeface="Menlo" panose="020B0609030804020204" pitchFamily="49" charset="0"/>
+              </a:rPr>
+              <a:t>site-packages</a:t>
+            </a:r>
+            <a:br>
+              <a:rPr lang="cs-CZ" sz="1200" dirty="0">
+                <a:latin typeface="Menlo" panose="020B0609030804020204" pitchFamily="49" charset="0"/>
+                <a:ea typeface="Menlo" panose="020B0609030804020204" pitchFamily="49" charset="0"/>
+                <a:cs typeface="Menlo" panose="020B0609030804020204" pitchFamily="49" charset="0"/>
+              </a:rPr>
+            </a:br>
+            <a:r>
+              <a:rPr lang="cs-CZ" sz="1200" dirty="0">
+                <a:latin typeface="Menlo" panose="020B0609030804020204" pitchFamily="49" charset="0"/>
+                <a:ea typeface="Menlo" panose="020B0609030804020204" pitchFamily="49" charset="0"/>
+                <a:cs typeface="Menlo" panose="020B0609030804020204" pitchFamily="49" charset="0"/>
+              </a:rPr>
+              <a:t>zip -</a:t>
+            </a:r>
+            <a:r>
+              <a:rPr lang="cs-CZ" sz="1200" dirty="0" err="1">
+                <a:latin typeface="Menlo" panose="020B0609030804020204" pitchFamily="49" charset="0"/>
+                <a:ea typeface="Menlo" panose="020B0609030804020204" pitchFamily="49" charset="0"/>
+                <a:cs typeface="Menlo" panose="020B0609030804020204" pitchFamily="49" charset="0"/>
+              </a:rPr>
+              <a:t>ur</a:t>
+            </a:r>
+            <a:r>
+              <a:rPr lang="cs-CZ" sz="1200" dirty="0">
+                <a:latin typeface="Menlo" panose="020B0609030804020204" pitchFamily="49" charset="0"/>
+                <a:ea typeface="Menlo" panose="020B0609030804020204" pitchFamily="49" charset="0"/>
+                <a:cs typeface="Menlo" panose="020B0609030804020204" pitchFamily="49" charset="0"/>
+              </a:rPr>
+              <a:t> /</a:t>
+            </a:r>
+            <a:r>
+              <a:rPr lang="cs-CZ" sz="1200" dirty="0" err="1">
+                <a:latin typeface="Menlo" panose="020B0609030804020204" pitchFamily="49" charset="0"/>
+                <a:ea typeface="Menlo" panose="020B0609030804020204" pitchFamily="49" charset="0"/>
+                <a:cs typeface="Menlo" panose="020B0609030804020204" pitchFamily="49" charset="0"/>
+              </a:rPr>
+              <a:t>tmp</a:t>
+            </a:r>
+            <a:r>
+              <a:rPr lang="cs-CZ" sz="1200" dirty="0">
+                <a:latin typeface="Menlo" panose="020B0609030804020204" pitchFamily="49" charset="0"/>
+                <a:ea typeface="Menlo" panose="020B0609030804020204" pitchFamily="49" charset="0"/>
+                <a:cs typeface="Menlo" panose="020B0609030804020204" pitchFamily="49" charset="0"/>
+              </a:rPr>
+              <a:t>/</a:t>
+            </a:r>
+            <a:r>
+              <a:rPr lang="cs-CZ" sz="1200" dirty="0" err="1">
+                <a:latin typeface="Menlo" panose="020B0609030804020204" pitchFamily="49" charset="0"/>
+                <a:ea typeface="Menlo" panose="020B0609030804020204" pitchFamily="49" charset="0"/>
+                <a:cs typeface="Menlo" panose="020B0609030804020204" pitchFamily="49" charset="0"/>
+              </a:rPr>
+              <a:t>lambda.zip</a:t>
+            </a:r>
+            <a:r>
+              <a:rPr lang="cs-CZ" sz="1200" dirty="0">
+                <a:latin typeface="Menlo" panose="020B0609030804020204" pitchFamily="49" charset="0"/>
+                <a:ea typeface="Menlo" panose="020B0609030804020204" pitchFamily="49" charset="0"/>
+                <a:cs typeface="Menlo" panose="020B0609030804020204" pitchFamily="49" charset="0"/>
+              </a:rPr>
+              <a:t> *</a:t>
+            </a:r>
+            <a:br>
+              <a:rPr lang="cs-CZ" sz="1200" dirty="0">
+                <a:latin typeface="Menlo" panose="020B0609030804020204" pitchFamily="49" charset="0"/>
+                <a:ea typeface="Menlo" panose="020B0609030804020204" pitchFamily="49" charset="0"/>
+                <a:cs typeface="Menlo" panose="020B0609030804020204" pitchFamily="49" charset="0"/>
+              </a:rPr>
+            </a:br>
+            <a:r>
+              <a:rPr lang="cs-CZ" sz="1200" dirty="0" err="1">
+                <a:latin typeface="Menlo" panose="020B0609030804020204" pitchFamily="49" charset="0"/>
+                <a:ea typeface="Menlo" panose="020B0609030804020204" pitchFamily="49" charset="0"/>
+                <a:cs typeface="Menlo" panose="020B0609030804020204" pitchFamily="49" charset="0"/>
+              </a:rPr>
+              <a:t>aws</a:t>
+            </a:r>
+            <a:r>
+              <a:rPr lang="cs-CZ" sz="1200" dirty="0">
+                <a:latin typeface="Menlo" panose="020B0609030804020204" pitchFamily="49" charset="0"/>
+                <a:ea typeface="Menlo" panose="020B0609030804020204" pitchFamily="49" charset="0"/>
+                <a:cs typeface="Menlo" panose="020B0609030804020204" pitchFamily="49" charset="0"/>
+              </a:rPr>
+              <a:t> --profile </a:t>
+            </a:r>
+            <a:r>
+              <a:rPr lang="cs-CZ" sz="1200" dirty="0" err="1">
+                <a:latin typeface="Menlo" panose="020B0609030804020204" pitchFamily="49" charset="0"/>
+                <a:ea typeface="Menlo" panose="020B0609030804020204" pitchFamily="49" charset="0"/>
+                <a:cs typeface="Menlo" panose="020B0609030804020204" pitchFamily="49" charset="0"/>
+              </a:rPr>
+              <a:t>sanbox</a:t>
+            </a:r>
+            <a:r>
+              <a:rPr lang="cs-CZ" sz="1200" dirty="0">
+                <a:latin typeface="Menlo" panose="020B0609030804020204" pitchFamily="49" charset="0"/>
+                <a:ea typeface="Menlo" panose="020B0609030804020204" pitchFamily="49" charset="0"/>
+                <a:cs typeface="Menlo" panose="020B0609030804020204" pitchFamily="49" charset="0"/>
+              </a:rPr>
+              <a:t> s3 </a:t>
+            </a:r>
+            <a:r>
+              <a:rPr lang="cs-CZ" sz="1200" dirty="0" err="1">
+                <a:latin typeface="Menlo" panose="020B0609030804020204" pitchFamily="49" charset="0"/>
+                <a:ea typeface="Menlo" panose="020B0609030804020204" pitchFamily="49" charset="0"/>
+                <a:cs typeface="Menlo" panose="020B0609030804020204" pitchFamily="49" charset="0"/>
+              </a:rPr>
+              <a:t>cp</a:t>
+            </a:r>
+            <a:r>
+              <a:rPr lang="cs-CZ" sz="1200" dirty="0">
+                <a:latin typeface="Menlo" panose="020B0609030804020204" pitchFamily="49" charset="0"/>
+                <a:ea typeface="Menlo" panose="020B0609030804020204" pitchFamily="49" charset="0"/>
+                <a:cs typeface="Menlo" panose="020B0609030804020204" pitchFamily="49" charset="0"/>
+              </a:rPr>
+              <a:t> /</a:t>
+            </a:r>
+            <a:r>
+              <a:rPr lang="cs-CZ" sz="1200" dirty="0" err="1">
+                <a:latin typeface="Menlo" panose="020B0609030804020204" pitchFamily="49" charset="0"/>
+                <a:ea typeface="Menlo" panose="020B0609030804020204" pitchFamily="49" charset="0"/>
+                <a:cs typeface="Menlo" panose="020B0609030804020204" pitchFamily="49" charset="0"/>
+              </a:rPr>
+              <a:t>tmp</a:t>
+            </a:r>
+            <a:r>
+              <a:rPr lang="cs-CZ" sz="1200" dirty="0">
+                <a:latin typeface="Menlo" panose="020B0609030804020204" pitchFamily="49" charset="0"/>
+                <a:ea typeface="Menlo" panose="020B0609030804020204" pitchFamily="49" charset="0"/>
+                <a:cs typeface="Menlo" panose="020B0609030804020204" pitchFamily="49" charset="0"/>
+              </a:rPr>
+              <a:t>/</a:t>
+            </a:r>
+            <a:r>
+              <a:rPr lang="cs-CZ" sz="1200" dirty="0" err="1">
+                <a:latin typeface="Menlo" panose="020B0609030804020204" pitchFamily="49" charset="0"/>
+                <a:ea typeface="Menlo" panose="020B0609030804020204" pitchFamily="49" charset="0"/>
+                <a:cs typeface="Menlo" panose="020B0609030804020204" pitchFamily="49" charset="0"/>
+              </a:rPr>
+              <a:t>lambda.zip</a:t>
+            </a:r>
+            <a:r>
+              <a:rPr lang="cs-CZ" sz="1200" dirty="0">
+                <a:latin typeface="Menlo" panose="020B0609030804020204" pitchFamily="49" charset="0"/>
+                <a:ea typeface="Menlo" panose="020B0609030804020204" pitchFamily="49" charset="0"/>
+                <a:cs typeface="Menlo" panose="020B0609030804020204" pitchFamily="49" charset="0"/>
+              </a:rPr>
+              <a:t> s3://lambda-</a:t>
+            </a:r>
+            <a:r>
+              <a:rPr lang="cs-CZ" sz="1200" dirty="0" err="1">
+                <a:latin typeface="Menlo" panose="020B0609030804020204" pitchFamily="49" charset="0"/>
+                <a:ea typeface="Menlo" panose="020B0609030804020204" pitchFamily="49" charset="0"/>
+                <a:cs typeface="Menlo" panose="020B0609030804020204" pitchFamily="49" charset="0"/>
+              </a:rPr>
+              <a:t>sources</a:t>
+            </a:r>
+            <a:r>
+              <a:rPr lang="cs-CZ" sz="1200" dirty="0">
+                <a:latin typeface="Menlo" panose="020B0609030804020204" pitchFamily="49" charset="0"/>
+                <a:ea typeface="Menlo" panose="020B0609030804020204" pitchFamily="49" charset="0"/>
+                <a:cs typeface="Menlo" panose="020B0609030804020204" pitchFamily="49" charset="0"/>
+              </a:rPr>
+              <a:t>-</a:t>
+            </a:r>
+            <a:r>
+              <a:rPr lang="cs-CZ" sz="1200" dirty="0" err="1">
+                <a:latin typeface="Menlo" panose="020B0609030804020204" pitchFamily="49" charset="0"/>
+                <a:ea typeface="Menlo" panose="020B0609030804020204" pitchFamily="49" charset="0"/>
+                <a:cs typeface="Menlo" panose="020B0609030804020204" pitchFamily="49" charset="0"/>
+              </a:rPr>
+              <a:t>bucket</a:t>
+            </a:r>
+            <a:r>
+              <a:rPr lang="cs-CZ" sz="1200" dirty="0">
+                <a:latin typeface="Menlo" panose="020B0609030804020204" pitchFamily="49" charset="0"/>
+                <a:ea typeface="Menlo" panose="020B0609030804020204" pitchFamily="49" charset="0"/>
+                <a:cs typeface="Menlo" panose="020B0609030804020204" pitchFamily="49" charset="0"/>
+              </a:rPr>
+              <a:t>/</a:t>
+            </a:r>
+            <a:r>
+              <a:rPr lang="cs-CZ" sz="1200" dirty="0" err="1">
+                <a:latin typeface="Menlo" panose="020B0609030804020204" pitchFamily="49" charset="0"/>
+                <a:ea typeface="Menlo" panose="020B0609030804020204" pitchFamily="49" charset="0"/>
+                <a:cs typeface="Menlo" panose="020B0609030804020204" pitchFamily="49" charset="0"/>
+              </a:rPr>
+              <a:t>lambda.zip</a:t>
+            </a:r>
+            <a:endParaRPr lang="en-US" sz="1200" dirty="0">
+              <a:latin typeface="Menlo" panose="020B0609030804020204" pitchFamily="49" charset="0"/>
+              <a:ea typeface="Menlo" panose="020B0609030804020204" pitchFamily="49" charset="0"/>
+              <a:cs typeface="Menlo" panose="020B0609030804020204" pitchFamily="49" charset="0"/>
+            </a:endParaRPr>
+          </a:p>
+          <a:p>
             <a:r>
               <a:rPr lang="en-US" dirty="0"/>
               <a:t>execute:</a:t>
@@ -8081,39 +8395,7 @@
                 <a:ea typeface="Menlo" panose="020B0609030804020204" pitchFamily="49" charset="0"/>
                 <a:cs typeface="Menlo" panose="020B0609030804020204" pitchFamily="49" charset="0"/>
               </a:rPr>
-              <a:t> --stack-name &lt;your stack name&gt; --</a:t>
-            </a:r>
-            <a:r>
-              <a:rPr lang="en-US" sz="1200">
-                <a:latin typeface="Menlo" panose="020B0609030804020204" pitchFamily="49" charset="0"/>
-                <a:ea typeface="Menlo" panose="020B0609030804020204" pitchFamily="49" charset="0"/>
-                <a:cs typeface="Menlo" panose="020B0609030804020204" pitchFamily="49" charset="0"/>
-              </a:rPr>
-              <a:t>region us-east-1 </a:t>
-            </a:r>
-            <a:r>
-              <a:rPr lang="en-US" sz="1200" dirty="0">
-                <a:latin typeface="Menlo" panose="020B0609030804020204" pitchFamily="49" charset="0"/>
-                <a:ea typeface="Menlo" panose="020B0609030804020204" pitchFamily="49" charset="0"/>
-                <a:cs typeface="Menlo" panose="020B0609030804020204" pitchFamily="49" charset="0"/>
-              </a:rPr>
-              <a:t>--</a:t>
-            </a:r>
-            <a:r>
-              <a:rPr lang="en-US" sz="1200">
-                <a:latin typeface="Menlo" panose="020B0609030804020204" pitchFamily="49" charset="0"/>
-                <a:ea typeface="Menlo" panose="020B0609030804020204" pitchFamily="49" charset="0"/>
-                <a:cs typeface="Menlo" panose="020B0609030804020204" pitchFamily="49" charset="0"/>
-              </a:rPr>
-              <a:t>profile sandbox </a:t>
-            </a:r>
-            <a:r>
-              <a:rPr lang="en-US" sz="1200" dirty="0">
-                <a:latin typeface="Menlo" panose="020B0609030804020204" pitchFamily="49" charset="0"/>
-                <a:ea typeface="Menlo" panose="020B0609030804020204" pitchFamily="49" charset="0"/>
-                <a:cs typeface="Menlo" panose="020B0609030804020204" pitchFamily="49" charset="0"/>
-              </a:rPr>
-              <a:t>--capabilities CAPABILITY_IAM --force-upload</a:t>
+              <a:t> --stack-name &lt;your stack name&gt; --region us-east-1 --profile sandbox --capabilities CAPABILITY_IAM --force-upload</a:t>
             </a:r>
           </a:p>
         </p:txBody>
@@ -8180,7 +8462,7 @@
           <a:p>
             <a:fld id="{CF027E54-A86C-7F42-ACF2-1C4CECA97F46}" type="datetime4">
               <a:rPr lang="en-US" smtClean="0"/>
-              <a:t>May 11, 2018</a:t>
+              <a:t>May 14, 2018</a:t>
             </a:fld>
             <a:endParaRPr lang="en-US"/>
           </a:p>

</xml_diff>

<commit_message>
UCCJ-1630 added S3 read/write example
</commit_message>
<xml_diff>
--- a/demo.pptx
+++ b/demo.pptx
@@ -7857,6 +7857,185 @@
                 <a:cs typeface="Menlo" panose="020B0609030804020204" pitchFamily="49" charset="0"/>
               </a:rPr>
               <a:t>-cli</a:t>
+            </a:r>
+          </a:p>
+          <a:p>
+            <a:pPr lvl="1"/>
+            <a:r>
+              <a:rPr lang="cs-CZ" sz="1600" dirty="0" err="1">
+                <a:latin typeface="+mn-lt"/>
+                <a:ea typeface="Menlo" panose="020B0609030804020204" pitchFamily="49" charset="0"/>
+                <a:cs typeface="Menlo" panose="020B0609030804020204" pitchFamily="49" charset="0"/>
+              </a:rPr>
+              <a:t>When</a:t>
+            </a:r>
+            <a:r>
+              <a:rPr lang="cs-CZ" sz="1600" dirty="0">
+                <a:latin typeface="+mn-lt"/>
+                <a:ea typeface="Menlo" panose="020B0609030804020204" pitchFamily="49" charset="0"/>
+                <a:cs typeface="Menlo" panose="020B0609030804020204" pitchFamily="49" charset="0"/>
+              </a:rPr>
+              <a:t> </a:t>
+            </a:r>
+            <a:r>
+              <a:rPr lang="cs-CZ" sz="1600" dirty="0" err="1">
+                <a:latin typeface="+mn-lt"/>
+                <a:ea typeface="Menlo" panose="020B0609030804020204" pitchFamily="49" charset="0"/>
+                <a:cs typeface="Menlo" panose="020B0609030804020204" pitchFamily="49" charset="0"/>
+              </a:rPr>
+              <a:t>releasing</a:t>
+            </a:r>
+            <a:r>
+              <a:rPr lang="cs-CZ" sz="1600" dirty="0">
+                <a:latin typeface="+mn-lt"/>
+                <a:ea typeface="Menlo" panose="020B0609030804020204" pitchFamily="49" charset="0"/>
+                <a:cs typeface="Menlo" panose="020B0609030804020204" pitchFamily="49" charset="0"/>
+              </a:rPr>
+              <a:t> </a:t>
+            </a:r>
+            <a:r>
+              <a:rPr lang="cs-CZ" sz="1600" dirty="0" err="1">
+                <a:latin typeface="+mn-lt"/>
+                <a:ea typeface="Menlo" panose="020B0609030804020204" pitchFamily="49" charset="0"/>
+                <a:cs typeface="Menlo" panose="020B0609030804020204" pitchFamily="49" charset="0"/>
+              </a:rPr>
+              <a:t>don‘t</a:t>
+            </a:r>
+            <a:r>
+              <a:rPr lang="cs-CZ" sz="1600" dirty="0">
+                <a:latin typeface="+mn-lt"/>
+                <a:ea typeface="Menlo" panose="020B0609030804020204" pitchFamily="49" charset="0"/>
+                <a:cs typeface="Menlo" panose="020B0609030804020204" pitchFamily="49" charset="0"/>
+              </a:rPr>
+              <a:t> </a:t>
+            </a:r>
+            <a:r>
+              <a:rPr lang="cs-CZ" sz="1600" dirty="0" err="1">
+                <a:latin typeface="+mn-lt"/>
+                <a:ea typeface="Menlo" panose="020B0609030804020204" pitchFamily="49" charset="0"/>
+                <a:cs typeface="Menlo" panose="020B0609030804020204" pitchFamily="49" charset="0"/>
+              </a:rPr>
+              <a:t>forget</a:t>
+            </a:r>
+            <a:r>
+              <a:rPr lang="cs-CZ" sz="1600" dirty="0">
+                <a:latin typeface="+mn-lt"/>
+                <a:ea typeface="Menlo" panose="020B0609030804020204" pitchFamily="49" charset="0"/>
+                <a:cs typeface="Menlo" panose="020B0609030804020204" pitchFamily="49" charset="0"/>
+              </a:rPr>
+              <a:t> </a:t>
+            </a:r>
+            <a:r>
+              <a:rPr lang="cs-CZ" sz="1600" b="1" dirty="0">
+                <a:latin typeface="+mn-lt"/>
+                <a:ea typeface="Menlo" panose="020B0609030804020204" pitchFamily="49" charset="0"/>
+                <a:cs typeface="Menlo" panose="020B0609030804020204" pitchFamily="49" charset="0"/>
+              </a:rPr>
+              <a:t>not to </a:t>
+            </a:r>
+            <a:r>
+              <a:rPr lang="cs-CZ" sz="1600" b="1" dirty="0" err="1">
+                <a:latin typeface="+mn-lt"/>
+                <a:ea typeface="Menlo" panose="020B0609030804020204" pitchFamily="49" charset="0"/>
+                <a:cs typeface="Menlo" panose="020B0609030804020204" pitchFamily="49" charset="0"/>
+              </a:rPr>
+              <a:t>install</a:t>
+            </a:r>
+            <a:r>
+              <a:rPr lang="cs-CZ" sz="1600" b="1" dirty="0">
+                <a:latin typeface="+mn-lt"/>
+                <a:ea typeface="Menlo" panose="020B0609030804020204" pitchFamily="49" charset="0"/>
+                <a:cs typeface="Menlo" panose="020B0609030804020204" pitchFamily="49" charset="0"/>
+              </a:rPr>
+              <a:t> </a:t>
+            </a:r>
+            <a:r>
+              <a:rPr lang="cs-CZ" sz="1600" b="1" dirty="0" err="1">
+                <a:latin typeface="+mn-lt"/>
+                <a:ea typeface="Menlo" panose="020B0609030804020204" pitchFamily="49" charset="0"/>
+                <a:cs typeface="Menlo" panose="020B0609030804020204" pitchFamily="49" charset="0"/>
+              </a:rPr>
+              <a:t>aws</a:t>
+            </a:r>
+            <a:r>
+              <a:rPr lang="cs-CZ" sz="1600" b="1" dirty="0">
+                <a:latin typeface="+mn-lt"/>
+                <a:ea typeface="Menlo" panose="020B0609030804020204" pitchFamily="49" charset="0"/>
+                <a:cs typeface="Menlo" panose="020B0609030804020204" pitchFamily="49" charset="0"/>
+              </a:rPr>
+              <a:t>-</a:t>
+            </a:r>
+            <a:r>
+              <a:rPr lang="cs-CZ" sz="1600" b="1" dirty="0" err="1">
+                <a:latin typeface="+mn-lt"/>
+                <a:ea typeface="Menlo" panose="020B0609030804020204" pitchFamily="49" charset="0"/>
+                <a:cs typeface="Menlo" panose="020B0609030804020204" pitchFamily="49" charset="0"/>
+              </a:rPr>
+              <a:t>sam</a:t>
+            </a:r>
+            <a:r>
+              <a:rPr lang="cs-CZ" sz="1600" b="1" dirty="0">
+                <a:latin typeface="+mn-lt"/>
+                <a:ea typeface="Menlo" panose="020B0609030804020204" pitchFamily="49" charset="0"/>
+                <a:cs typeface="Menlo" panose="020B0609030804020204" pitchFamily="49" charset="0"/>
+              </a:rPr>
+              <a:t>-cli </a:t>
+            </a:r>
+            <a:r>
+              <a:rPr lang="cs-CZ" sz="1600" dirty="0">
+                <a:latin typeface="+mn-lt"/>
+                <a:ea typeface="Menlo" panose="020B0609030804020204" pitchFamily="49" charset="0"/>
+                <a:cs typeface="Menlo" panose="020B0609030804020204" pitchFamily="49" charset="0"/>
+              </a:rPr>
+              <a:t>(</a:t>
+            </a:r>
+            <a:r>
+              <a:rPr lang="cs-CZ" sz="1600" dirty="0" err="1">
+                <a:latin typeface="+mn-lt"/>
+                <a:ea typeface="Menlo" panose="020B0609030804020204" pitchFamily="49" charset="0"/>
+                <a:cs typeface="Menlo" panose="020B0609030804020204" pitchFamily="49" charset="0"/>
+              </a:rPr>
+              <a:t>it‘s</a:t>
+            </a:r>
+            <a:r>
+              <a:rPr lang="cs-CZ" sz="1600" dirty="0">
+                <a:latin typeface="+mn-lt"/>
+                <a:ea typeface="Menlo" panose="020B0609030804020204" pitchFamily="49" charset="0"/>
+                <a:cs typeface="Menlo" panose="020B0609030804020204" pitchFamily="49" charset="0"/>
+              </a:rPr>
+              <a:t> not </a:t>
+            </a:r>
+            <a:r>
+              <a:rPr lang="cs-CZ" sz="1600" dirty="0" err="1">
+                <a:latin typeface="+mn-lt"/>
+                <a:ea typeface="Menlo" panose="020B0609030804020204" pitchFamily="49" charset="0"/>
+                <a:cs typeface="Menlo" panose="020B0609030804020204" pitchFamily="49" charset="0"/>
+              </a:rPr>
+              <a:t>necessary</a:t>
+            </a:r>
+            <a:r>
+              <a:rPr lang="cs-CZ" sz="1600" dirty="0">
+                <a:latin typeface="+mn-lt"/>
+                <a:ea typeface="Menlo" panose="020B0609030804020204" pitchFamily="49" charset="0"/>
+                <a:cs typeface="Menlo" panose="020B0609030804020204" pitchFamily="49" charset="0"/>
+              </a:rPr>
+              <a:t> </a:t>
+            </a:r>
+            <a:r>
+              <a:rPr lang="cs-CZ" sz="1600" dirty="0" err="1">
+                <a:latin typeface="+mn-lt"/>
+                <a:ea typeface="Menlo" panose="020B0609030804020204" pitchFamily="49" charset="0"/>
+                <a:cs typeface="Menlo" panose="020B0609030804020204" pitchFamily="49" charset="0"/>
+              </a:rPr>
+              <a:t>for</a:t>
+            </a:r>
+            <a:r>
+              <a:rPr lang="cs-CZ" sz="1600" dirty="0">
+                <a:latin typeface="+mn-lt"/>
+                <a:ea typeface="Menlo" panose="020B0609030804020204" pitchFamily="49" charset="0"/>
+                <a:cs typeface="Menlo" panose="020B0609030804020204" pitchFamily="49" charset="0"/>
+              </a:rPr>
+              <a:t> lambda runtime)</a:t>
             </a:r>
           </a:p>
           <a:p>
@@ -9265,21 +9444,6 @@
 </file>
 
 <file path=customXml/item1.xml><?xml version="1.0" encoding="utf-8"?>
-<p:properties xmlns:p="http://schemas.microsoft.com/office/2006/metadata/properties" xmlns:xsi="http://www.w3.org/2001/XMLSchema-instance" xmlns:pc="http://schemas.microsoft.com/office/infopath/2007/PartnerControls">
-  <documentManagement/>
-</p:properties>
-</file>
-
-<file path=customXml/item2.xml><?xml version="1.0" encoding="utf-8"?>
-<?mso-contentType ?>
-<FormTemplates xmlns="http://schemas.microsoft.com/sharepoint/v3/contenttype/forms">
-  <Display>DocumentLibraryForm</Display>
-  <Edit>DocumentLibraryForm</Edit>
-  <New>DocumentLibraryForm</New>
-</FormTemplates>
-</file>
-
-<file path=customXml/item3.xml><?xml version="1.0" encoding="utf-8"?>
 <ct:contentTypeSchema xmlns:ct="http://schemas.microsoft.com/office/2006/metadata/contentType" xmlns:ma="http://schemas.microsoft.com/office/2006/metadata/properties/metaAttributes" ct:_="" ma:_="" ma:contentTypeName="Document" ma:contentTypeID="0x0101001DE4F37F529C36469F24EE3B59C95D59" ma:contentTypeVersion="0" ma:contentTypeDescription="Create a new document." ma:contentTypeScope="" ma:versionID="63ce0a4e031f593a181265706b7dd628">
   <xsd:schema xmlns:xsd="http://www.w3.org/2001/XMLSchema" xmlns:xs="http://www.w3.org/2001/XMLSchema" xmlns:p="http://schemas.microsoft.com/office/2006/metadata/properties" targetNamespace="http://schemas.microsoft.com/office/2006/metadata/properties" ma:root="true" ma:fieldsID="1b05d82d297216baf5b26c55225140df">
     <xsd:element name="properties">
@@ -9393,10 +9557,32 @@
 </ct:contentTypeSchema>
 </file>
 
+<file path=customXml/item2.xml><?xml version="1.0" encoding="utf-8"?>
+<?mso-contentType ?>
+<FormTemplates xmlns="http://schemas.microsoft.com/sharepoint/v3/contenttype/forms">
+  <Display>DocumentLibraryForm</Display>
+  <Edit>DocumentLibraryForm</Edit>
+  <New>DocumentLibraryForm</New>
+</FormTemplates>
+</file>
+
+<file path=customXml/item3.xml><?xml version="1.0" encoding="utf-8"?>
+<p:properties xmlns:p="http://schemas.microsoft.com/office/2006/metadata/properties" xmlns:xsi="http://www.w3.org/2001/XMLSchema-instance" xmlns:pc="http://schemas.microsoft.com/office/infopath/2007/PartnerControls">
+  <documentManagement/>
+</p:properties>
+</file>
+
 <file path=customXml/itemProps1.xml><?xml version="1.0" encoding="utf-8"?>
-<ds:datastoreItem xmlns:ds="http://schemas.openxmlformats.org/officeDocument/2006/customXml" ds:itemID="{E40DCAF4-6759-45CB-9FF7-9FCF33AF572F}">
+<ds:datastoreItem xmlns:ds="http://schemas.openxmlformats.org/officeDocument/2006/customXml" ds:itemID="{4F13B721-BA85-4080-9C48-F11EF7978978}">
   <ds:schemaRefs>
+    <ds:schemaRef ds:uri="http://schemas.microsoft.com/office/2006/metadata/contentType"/>
+    <ds:schemaRef ds:uri="http://schemas.microsoft.com/office/2006/metadata/properties/metaAttributes"/>
+    <ds:schemaRef ds:uri="http://www.w3.org/2001/XMLSchema"/>
     <ds:schemaRef ds:uri="http://schemas.microsoft.com/office/2006/metadata/properties"/>
+    <ds:schemaRef ds:uri="http://schemas.openxmlformats.org/package/2006/metadata/core-properties"/>
+    <ds:schemaRef ds:uri="http://purl.org/dc/elements/1.1/"/>
+    <ds:schemaRef ds:uri="http://purl.org/dc/terms/"/>
+    <ds:schemaRef ds:uri="http://schemas.microsoft.com/internal/obd"/>
     <ds:schemaRef ds:uri="http://schemas.microsoft.com/office/infopath/2007/PartnerControls"/>
   </ds:schemaRefs>
 </ds:datastoreItem>
@@ -9411,16 +9597,9 @@
 </file>
 
 <file path=customXml/itemProps3.xml><?xml version="1.0" encoding="utf-8"?>
-<ds:datastoreItem xmlns:ds="http://schemas.openxmlformats.org/officeDocument/2006/customXml" ds:itemID="{4F13B721-BA85-4080-9C48-F11EF7978978}">
+<ds:datastoreItem xmlns:ds="http://schemas.openxmlformats.org/officeDocument/2006/customXml" ds:itemID="{E40DCAF4-6759-45CB-9FF7-9FCF33AF572F}">
   <ds:schemaRefs>
-    <ds:schemaRef ds:uri="http://schemas.microsoft.com/office/2006/metadata/contentType"/>
-    <ds:schemaRef ds:uri="http://schemas.microsoft.com/office/2006/metadata/properties/metaAttributes"/>
-    <ds:schemaRef ds:uri="http://www.w3.org/2001/XMLSchema"/>
     <ds:schemaRef ds:uri="http://schemas.microsoft.com/office/2006/metadata/properties"/>
-    <ds:schemaRef ds:uri="http://schemas.openxmlformats.org/package/2006/metadata/core-properties"/>
-    <ds:schemaRef ds:uri="http://purl.org/dc/elements/1.1/"/>
-    <ds:schemaRef ds:uri="http://purl.org/dc/terms/"/>
-    <ds:schemaRef ds:uri="http://schemas.microsoft.com/internal/obd"/>
     <ds:schemaRef ds:uri="http://schemas.microsoft.com/office/infopath/2007/PartnerControls"/>
   </ds:schemaRefs>
 </ds:datastoreItem>

</xml_diff>

<commit_message>
Last modifications before the pyvo session
</commit_message>
<xml_diff>
--- a/demo.pptx
+++ b/demo.pptx
@@ -5,19 +5,17 @@
     <p:sldMasterId id="2147483660" r:id="rId4"/>
   </p:sldMasterIdLst>
   <p:notesMasterIdLst>
-    <p:notesMasterId r:id="rId12"/>
+    <p:notesMasterId r:id="rId10"/>
   </p:notesMasterIdLst>
   <p:handoutMasterIdLst>
-    <p:handoutMasterId r:id="rId13"/>
+    <p:handoutMasterId r:id="rId11"/>
   </p:handoutMasterIdLst>
   <p:sldIdLst>
     <p:sldId id="257" r:id="rId5"/>
     <p:sldId id="268" r:id="rId6"/>
     <p:sldId id="299" r:id="rId7"/>
-    <p:sldId id="302" r:id="rId8"/>
-    <p:sldId id="300" r:id="rId9"/>
-    <p:sldId id="301" r:id="rId10"/>
-    <p:sldId id="303" r:id="rId11"/>
+    <p:sldId id="300" r:id="rId8"/>
+    <p:sldId id="301" r:id="rId9"/>
   </p:sldIdLst>
   <p:sldSz cx="9144000" cy="5143500" type="screen16x9"/>
   <p:notesSz cx="6858000" cy="9144000"/>
@@ -124,10 +122,8 @@
             <p14:sldId id="257"/>
             <p14:sldId id="268"/>
             <p14:sldId id="299"/>
-            <p14:sldId id="302"/>
             <p14:sldId id="300"/>
             <p14:sldId id="301"/>
-            <p14:sldId id="303"/>
           </p14:sldIdLst>
         </p14:section>
         <p14:section name="Useful slides" id="{794E34B5-A129-AB4D-97FC-4C0C75A1E551}">
@@ -227,7 +223,7 @@
           <a:p>
             <a:fld id="{A4F5FB7B-FABB-5145-A74F-0C01ADC71774}" type="datetimeFigureOut">
               <a:rPr lang="en-US" smtClean="0"/>
-              <a:t>6/7/18</a:t>
+              <a:t>6/20/18</a:t>
             </a:fld>
             <a:endParaRPr lang="en-US"/>
           </a:p>
@@ -392,7 +388,7 @@
           <a:p>
             <a:fld id="{69F16828-7198-E644-A1E2-D6CB99EE7364}" type="datetimeFigureOut">
               <a:rPr lang="en-US" smtClean="0"/>
-              <a:t>6/7/18</a:t>
+              <a:t>6/20/18</a:t>
             </a:fld>
             <a:endParaRPr lang="en-US"/>
           </a:p>
@@ -985,7 +981,7 @@
     </p:spTree>
     <p:extLst>
       <p:ext uri="{BB962C8B-B14F-4D97-AF65-F5344CB8AC3E}">
-        <p14:creationId xmlns:p14="http://schemas.microsoft.com/office/powerpoint/2010/main" val="91710831"/>
+        <p14:creationId xmlns:p14="http://schemas.microsoft.com/office/powerpoint/2010/main" val="115033443"/>
       </p:ext>
     </p:extLst>
   </p:cSld>
@@ -1069,175 +1065,7 @@
     </p:spTree>
     <p:extLst>
       <p:ext uri="{BB962C8B-B14F-4D97-AF65-F5344CB8AC3E}">
-        <p14:creationId xmlns:p14="http://schemas.microsoft.com/office/powerpoint/2010/main" val="115033443"/>
-      </p:ext>
-    </p:extLst>
-  </p:cSld>
-  <p:clrMapOvr>
-    <a:masterClrMapping/>
-  </p:clrMapOvr>
-</p:notes>
-</file>
-
-<file path=ppt/notesSlides/notesSlide6.xml><?xml version="1.0" encoding="utf-8"?>
-<p:notes xmlns:a="http://schemas.openxmlformats.org/drawingml/2006/main" xmlns:r="http://schemas.openxmlformats.org/officeDocument/2006/relationships" xmlns:p="http://schemas.openxmlformats.org/presentationml/2006/main">
-  <p:cSld>
-    <p:spTree>
-      <p:nvGrpSpPr>
-        <p:cNvPr id="1" name=""/>
-        <p:cNvGrpSpPr/>
-        <p:nvPr/>
-      </p:nvGrpSpPr>
-      <p:grpSpPr>
-        <a:xfrm>
-          <a:off x="0" y="0"/>
-          <a:ext cx="0" cy="0"/>
-          <a:chOff x="0" y="0"/>
-          <a:chExt cx="0" cy="0"/>
-        </a:xfrm>
-      </p:grpSpPr>
-      <p:sp>
-        <p:nvSpPr>
-          <p:cNvPr id="2" name="Slide Image Placeholder 1"/>
-          <p:cNvSpPr>
-            <a:spLocks noGrp="1" noRot="1" noChangeAspect="1"/>
-          </p:cNvSpPr>
-          <p:nvPr>
-            <p:ph type="sldImg"/>
-          </p:nvPr>
-        </p:nvSpPr>
-        <p:spPr/>
-      </p:sp>
-      <p:sp>
-        <p:nvSpPr>
-          <p:cNvPr id="3" name="Notes Placeholder 2"/>
-          <p:cNvSpPr>
-            <a:spLocks noGrp="1"/>
-          </p:cNvSpPr>
-          <p:nvPr>
-            <p:ph type="body" idx="1"/>
-          </p:nvPr>
-        </p:nvSpPr>
-        <p:spPr/>
-        <p:txBody>
-          <a:bodyPr/>
-          <a:lstStyle/>
-          <a:p>
-            <a:endParaRPr lang="en-US"/>
-          </a:p>
-        </p:txBody>
-      </p:sp>
-      <p:sp>
-        <p:nvSpPr>
-          <p:cNvPr id="4" name="Slide Number Placeholder 3"/>
-          <p:cNvSpPr>
-            <a:spLocks noGrp="1"/>
-          </p:cNvSpPr>
-          <p:nvPr>
-            <p:ph type="sldNum" sz="quarter" idx="10"/>
-          </p:nvPr>
-        </p:nvSpPr>
-        <p:spPr/>
-        <p:txBody>
-          <a:bodyPr/>
-          <a:lstStyle/>
-          <a:p>
-            <a:fld id="{2B57C969-4BE6-F74F-830C-FE4757BEAA2F}" type="slidenum">
-              <a:rPr lang="en-US" smtClean="0"/>
-              <a:t>6</a:t>
-            </a:fld>
-            <a:endParaRPr lang="en-US"/>
-          </a:p>
-        </p:txBody>
-      </p:sp>
-    </p:spTree>
-    <p:extLst>
-      <p:ext uri="{BB962C8B-B14F-4D97-AF65-F5344CB8AC3E}">
         <p14:creationId xmlns:p14="http://schemas.microsoft.com/office/powerpoint/2010/main" val="2574514091"/>
-      </p:ext>
-    </p:extLst>
-  </p:cSld>
-  <p:clrMapOvr>
-    <a:masterClrMapping/>
-  </p:clrMapOvr>
-</p:notes>
-</file>
-
-<file path=ppt/notesSlides/notesSlide7.xml><?xml version="1.0" encoding="utf-8"?>
-<p:notes xmlns:a="http://schemas.openxmlformats.org/drawingml/2006/main" xmlns:r="http://schemas.openxmlformats.org/officeDocument/2006/relationships" xmlns:p="http://schemas.openxmlformats.org/presentationml/2006/main">
-  <p:cSld>
-    <p:spTree>
-      <p:nvGrpSpPr>
-        <p:cNvPr id="1" name=""/>
-        <p:cNvGrpSpPr/>
-        <p:nvPr/>
-      </p:nvGrpSpPr>
-      <p:grpSpPr>
-        <a:xfrm>
-          <a:off x="0" y="0"/>
-          <a:ext cx="0" cy="0"/>
-          <a:chOff x="0" y="0"/>
-          <a:chExt cx="0" cy="0"/>
-        </a:xfrm>
-      </p:grpSpPr>
-      <p:sp>
-        <p:nvSpPr>
-          <p:cNvPr id="2" name="Slide Image Placeholder 1"/>
-          <p:cNvSpPr>
-            <a:spLocks noGrp="1" noRot="1" noChangeAspect="1"/>
-          </p:cNvSpPr>
-          <p:nvPr>
-            <p:ph type="sldImg"/>
-          </p:nvPr>
-        </p:nvSpPr>
-        <p:spPr/>
-      </p:sp>
-      <p:sp>
-        <p:nvSpPr>
-          <p:cNvPr id="3" name="Notes Placeholder 2"/>
-          <p:cNvSpPr>
-            <a:spLocks noGrp="1"/>
-          </p:cNvSpPr>
-          <p:nvPr>
-            <p:ph type="body" idx="1"/>
-          </p:nvPr>
-        </p:nvSpPr>
-        <p:spPr/>
-        <p:txBody>
-          <a:bodyPr/>
-          <a:lstStyle/>
-          <a:p>
-            <a:endParaRPr lang="en-US"/>
-          </a:p>
-        </p:txBody>
-      </p:sp>
-      <p:sp>
-        <p:nvSpPr>
-          <p:cNvPr id="4" name="Slide Number Placeholder 3"/>
-          <p:cNvSpPr>
-            <a:spLocks noGrp="1"/>
-          </p:cNvSpPr>
-          <p:nvPr>
-            <p:ph type="sldNum" sz="quarter" idx="10"/>
-          </p:nvPr>
-        </p:nvSpPr>
-        <p:spPr/>
-        <p:txBody>
-          <a:bodyPr/>
-          <a:lstStyle/>
-          <a:p>
-            <a:fld id="{2B57C969-4BE6-F74F-830C-FE4757BEAA2F}" type="slidenum">
-              <a:rPr lang="en-US" smtClean="0"/>
-              <a:t>7</a:t>
-            </a:fld>
-            <a:endParaRPr lang="en-US"/>
-          </a:p>
-        </p:txBody>
-      </p:sp>
-    </p:spTree>
-    <p:extLst>
-      <p:ext uri="{BB962C8B-B14F-4D97-AF65-F5344CB8AC3E}">
-        <p14:creationId xmlns:p14="http://schemas.microsoft.com/office/powerpoint/2010/main" val="2661630942"/>
       </p:ext>
     </p:extLst>
   </p:cSld>
@@ -1500,7 +1328,7 @@
           <a:p>
             <a:fld id="{88297517-F636-9E4E-B672-F1EF19FBF17A}" type="datetime4">
               <a:rPr lang="en-US" smtClean="0"/>
-              <a:t>June 7, 2018</a:t>
+              <a:t>June 20, 2018</a:t>
             </a:fld>
             <a:endParaRPr lang="en-US" dirty="0"/>
           </a:p>
@@ -2401,7 +2229,7 @@
           <a:p>
             <a:fld id="{BE0BBC83-F25D-6A4B-8CC6-6AA2E3922F60}" type="datetime4">
               <a:rPr lang="en-US" smtClean="0"/>
-              <a:t>June 7, 2018</a:t>
+              <a:t>June 20, 2018</a:t>
             </a:fld>
             <a:endParaRPr lang="en-US" dirty="0"/>
           </a:p>
@@ -2763,7 +2591,7 @@
           <a:p>
             <a:fld id="{5EBA90A9-4B84-F545-ADFB-F9BC9B43D4DE}" type="datetime4">
               <a:rPr lang="en-US" smtClean="0"/>
-              <a:t>June 7, 2018</a:t>
+              <a:t>June 20, 2018</a:t>
             </a:fld>
             <a:endParaRPr lang="en-US" dirty="0"/>
           </a:p>
@@ -3110,7 +2938,7 @@
           <a:p>
             <a:fld id="{4AF2BF69-7BD4-7348-A595-7CA9E29A8A8B}" type="datetime4">
               <a:rPr lang="en-US" smtClean="0"/>
-              <a:t>June 7, 2018</a:t>
+              <a:t>June 20, 2018</a:t>
             </a:fld>
             <a:endParaRPr lang="en-US" dirty="0"/>
           </a:p>
@@ -3186,7 +3014,7 @@
           <a:p>
             <a:fld id="{B420E4A7-90F7-D444-BE14-4A37368C24FB}" type="datetime4">
               <a:rPr lang="en-US" smtClean="0"/>
-              <a:t>June 7, 2018</a:t>
+              <a:t>June 20, 2018</a:t>
             </a:fld>
             <a:endParaRPr lang="en-US"/>
           </a:p>
@@ -3357,7 +3185,7 @@
           <a:p>
             <a:fld id="{B420E4A7-90F7-D444-BE14-4A37368C24FB}" type="datetime4">
               <a:rPr lang="en-US" smtClean="0"/>
-              <a:t>June 7, 2018</a:t>
+              <a:t>June 20, 2018</a:t>
             </a:fld>
             <a:endParaRPr lang="en-US"/>
           </a:p>
@@ -3460,7 +3288,7 @@
           <a:p>
             <a:fld id="{B420E4A7-90F7-D444-BE14-4A37368C24FB}" type="datetime4">
               <a:rPr lang="en-US" smtClean="0"/>
-              <a:t>June 7, 2018</a:t>
+              <a:t>June 20, 2018</a:t>
             </a:fld>
             <a:endParaRPr lang="en-US"/>
           </a:p>
@@ -3929,7 +3757,7 @@
           <a:p>
             <a:fld id="{23483CBB-145F-6C43-AE86-6DE3FC833EEC}" type="datetime4">
               <a:rPr lang="en-US" smtClean="0"/>
-              <a:t>June 7, 2018</a:t>
+              <a:t>June 20, 2018</a:t>
             </a:fld>
             <a:endParaRPr lang="en-US"/>
           </a:p>
@@ -4231,7 +4059,7 @@
             <a:fld id="{88297517-F636-9E4E-B672-F1EF19FBF17A}" type="datetime4">
               <a:rPr lang="en-US" smtClean="0"/>
               <a:pPr/>
-              <a:t>June 7, 2018</a:t>
+              <a:t>June 20, 2018</a:t>
             </a:fld>
             <a:endParaRPr lang="en-US" dirty="0"/>
           </a:p>
@@ -4601,7 +4429,7 @@
           <a:p>
             <a:fld id="{312948EC-D86E-0E4E-BDA8-3A93AC131EAA}" type="datetime4">
               <a:rPr lang="en-US" smtClean="0"/>
-              <a:t>June 7, 2018</a:t>
+              <a:t>June 20, 2018</a:t>
             </a:fld>
             <a:endParaRPr lang="en-US" dirty="0"/>
           </a:p>
@@ -4989,7 +4817,7 @@
           <a:p>
             <a:fld id="{892A4A5F-9361-1D49-B053-1545CE5783EE}" type="datetime4">
               <a:rPr lang="en-US" smtClean="0"/>
-              <a:t>June 7, 2018</a:t>
+              <a:t>June 20, 2018</a:t>
             </a:fld>
             <a:endParaRPr lang="en-US"/>
           </a:p>
@@ -5260,7 +5088,7 @@
           <a:p>
             <a:fld id="{302D8A5C-1535-7B46-9D98-327194D83E4C}" type="datetime4">
               <a:rPr lang="en-US" smtClean="0"/>
-              <a:t>June 7, 2018</a:t>
+              <a:t>June 20, 2018</a:t>
             </a:fld>
             <a:endParaRPr lang="en-US"/>
           </a:p>
@@ -5479,7 +5307,7 @@
           <a:p>
             <a:fld id="{0657E817-5BF1-7248-9653-7556C31B310E}" type="datetime4">
               <a:rPr lang="en-US" smtClean="0"/>
-              <a:t>June 7, 2018</a:t>
+              <a:t>June 20, 2018</a:t>
             </a:fld>
             <a:endParaRPr lang="en-US"/>
           </a:p>
@@ -5699,7 +5527,7 @@
           <a:p>
             <a:fld id="{98A843BF-BBE8-4D42-89C9-296A6EDA3AFB}" type="datetime4">
               <a:rPr lang="en-US" smtClean="0"/>
-              <a:t>June 7, 2018</a:t>
+              <a:t>June 20, 2018</a:t>
             </a:fld>
             <a:endParaRPr lang="en-US"/>
           </a:p>
@@ -6261,7 +6089,7 @@
           <a:p>
             <a:fld id="{CABA39A7-81BE-8B42-8A9C-B201D4A7BC6B}" type="datetime4">
               <a:rPr lang="en-US" smtClean="0"/>
-              <a:t>June 7, 2018</a:t>
+              <a:t>June 20, 2018</a:t>
             </a:fld>
             <a:endParaRPr lang="en-US" dirty="0"/>
           </a:p>
@@ -6945,7 +6773,7 @@
           <a:p>
             <a:fld id="{FB9268EF-B18E-FF49-9840-D96F1F451A6A}" type="datetime4">
               <a:rPr lang="en-US" smtClean="0"/>
-              <a:t>June 7, 2018</a:t>
+              <a:t>June 20, 2018</a:t>
             </a:fld>
             <a:endParaRPr lang="en-US" dirty="0"/>
           </a:p>
@@ -7055,11 +6883,19 @@
             </a:r>
             <a:r>
               <a:rPr lang="en-US" dirty="0" err="1"/>
-              <a:t>konciergeMD</a:t>
+              <a:t>jakubzeman-acc</a:t>
             </a:r>
             <a:r>
               <a:rPr lang="en-US" dirty="0"/>
-              <a:t>/lambda-</a:t>
+              <a:t>/</a:t>
+            </a:r>
+            <a:r>
+              <a:rPr lang="en-US" dirty="0" err="1"/>
+              <a:t>aws</a:t>
+            </a:r>
+            <a:r>
+              <a:rPr lang="en-US" dirty="0"/>
+              <a:t>-</a:t>
             </a:r>
             <a:r>
               <a:rPr lang="en-US" dirty="0" err="1"/>
@@ -7067,7 +6903,7 @@
             </a:r>
             <a:r>
               <a:rPr lang="en-US" dirty="0"/>
-              <a:t>-python-example</a:t>
+              <a:t>-hello-world</a:t>
             </a:r>
           </a:p>
         </p:txBody>
@@ -7134,7 +6970,7 @@
           <a:p>
             <a:fld id="{CF027E54-A86C-7F42-ACF2-1C4CECA97F46}" type="datetime4">
               <a:rPr lang="en-US" smtClean="0"/>
-              <a:t>June 7, 2018</a:t>
+              <a:t>June 20, 2018</a:t>
             </a:fld>
             <a:endParaRPr lang="en-US"/>
           </a:p>
@@ -7306,7 +7142,7 @@
           <a:p>
             <a:fld id="{CF027E54-A86C-7F42-ACF2-1C4CECA97F46}" type="datetime4">
               <a:rPr lang="en-US" smtClean="0"/>
-              <a:t>June 7, 2018</a:t>
+              <a:t>June 20, 2018</a:t>
             </a:fld>
             <a:endParaRPr lang="en-US"/>
           </a:p>
@@ -7717,7 +7553,7 @@
           <a:p>
             <a:r>
               <a:rPr lang="en-US" dirty="0"/>
-              <a:t>Direct API Gateway app</a:t>
+              <a:t>Environment preparation</a:t>
             </a:r>
           </a:p>
         </p:txBody>
@@ -7734,8 +7570,8 @@
         </p:nvSpPr>
         <p:spPr>
           <a:xfrm>
-            <a:off x="426720" y="1395662"/>
-            <a:ext cx="8290560" cy="3067481"/>
+            <a:off x="426720" y="1395663"/>
+            <a:ext cx="8290560" cy="3429000"/>
           </a:xfrm>
         </p:spPr>
         <p:txBody>
@@ -7743,47 +7579,246 @@
           <a:lstStyle/>
           <a:p>
             <a:r>
-              <a:rPr lang="en-US" dirty="0"/>
-              <a:t>You have to define each endpoint in </a:t>
-            </a:r>
-            <a:r>
-              <a:rPr lang="en-US" dirty="0" err="1"/>
-              <a:t>yaml</a:t>
-            </a:r>
-            <a:r>
-              <a:rPr lang="en-US" dirty="0"/>
-              <a:t> file:</a:t>
-            </a:r>
-          </a:p>
-          <a:p>
-            <a:endParaRPr lang="en-US" dirty="0"/>
-          </a:p>
-          <a:p>
-            <a:endParaRPr lang="en-US" dirty="0"/>
+              <a:rPr lang="cs-CZ" sz="1400" dirty="0" err="1">
+                <a:latin typeface="Menlo" panose="020B0609030804020204" pitchFamily="49" charset="0"/>
+                <a:ea typeface="Menlo" panose="020B0609030804020204" pitchFamily="49" charset="0"/>
+                <a:cs typeface="Menlo" panose="020B0609030804020204" pitchFamily="49" charset="0"/>
+              </a:rPr>
+              <a:t>brew</a:t>
+            </a:r>
+            <a:r>
+              <a:rPr lang="cs-CZ" sz="1400" dirty="0">
+                <a:latin typeface="Menlo" panose="020B0609030804020204" pitchFamily="49" charset="0"/>
+                <a:ea typeface="Menlo" panose="020B0609030804020204" pitchFamily="49" charset="0"/>
+                <a:cs typeface="Menlo" panose="020B0609030804020204" pitchFamily="49" charset="0"/>
+              </a:rPr>
+              <a:t> </a:t>
+            </a:r>
+            <a:r>
+              <a:rPr lang="cs-CZ" sz="1400" dirty="0" err="1">
+                <a:latin typeface="Menlo" panose="020B0609030804020204" pitchFamily="49" charset="0"/>
+                <a:ea typeface="Menlo" panose="020B0609030804020204" pitchFamily="49" charset="0"/>
+                <a:cs typeface="Menlo" panose="020B0609030804020204" pitchFamily="49" charset="0"/>
+              </a:rPr>
+              <a:t>install</a:t>
+            </a:r>
+            <a:r>
+              <a:rPr lang="cs-CZ" sz="1400" dirty="0">
+                <a:latin typeface="Menlo" panose="020B0609030804020204" pitchFamily="49" charset="0"/>
+                <a:ea typeface="Menlo" panose="020B0609030804020204" pitchFamily="49" charset="0"/>
+                <a:cs typeface="Menlo" panose="020B0609030804020204" pitchFamily="49" charset="0"/>
+              </a:rPr>
+              <a:t> python3</a:t>
+            </a:r>
+          </a:p>
+          <a:p>
+            <a:r>
+              <a:rPr lang="cs-CZ" sz="1400" dirty="0">
+                <a:latin typeface="Menlo" panose="020B0609030804020204" pitchFamily="49" charset="0"/>
+                <a:ea typeface="Menlo" panose="020B0609030804020204" pitchFamily="49" charset="0"/>
+                <a:cs typeface="Menlo" panose="020B0609030804020204" pitchFamily="49" charset="0"/>
+              </a:rPr>
+              <a:t>pip3 </a:t>
+            </a:r>
+            <a:r>
+              <a:rPr lang="cs-CZ" sz="1400" dirty="0" err="1">
+                <a:latin typeface="Menlo" panose="020B0609030804020204" pitchFamily="49" charset="0"/>
+                <a:ea typeface="Menlo" panose="020B0609030804020204" pitchFamily="49" charset="0"/>
+                <a:cs typeface="Menlo" panose="020B0609030804020204" pitchFamily="49" charset="0"/>
+              </a:rPr>
+              <a:t>install</a:t>
+            </a:r>
+            <a:r>
+              <a:rPr lang="cs-CZ" sz="1400" dirty="0">
+                <a:latin typeface="Menlo" panose="020B0609030804020204" pitchFamily="49" charset="0"/>
+                <a:ea typeface="Menlo" panose="020B0609030804020204" pitchFamily="49" charset="0"/>
+                <a:cs typeface="Menlo" panose="020B0609030804020204" pitchFamily="49" charset="0"/>
+              </a:rPr>
+              <a:t> --upgrade </a:t>
+            </a:r>
+            <a:r>
+              <a:rPr lang="cs-CZ" sz="1400" dirty="0" err="1">
+                <a:latin typeface="Menlo" panose="020B0609030804020204" pitchFamily="49" charset="0"/>
+                <a:ea typeface="Menlo" panose="020B0609030804020204" pitchFamily="49" charset="0"/>
+                <a:cs typeface="Menlo" panose="020B0609030804020204" pitchFamily="49" charset="0"/>
+              </a:rPr>
+              <a:t>awscli</a:t>
+            </a:r>
+            <a:r>
+              <a:rPr lang="cs-CZ" sz="1400" dirty="0">
+                <a:latin typeface="Menlo" panose="020B0609030804020204" pitchFamily="49" charset="0"/>
+                <a:ea typeface="Menlo" panose="020B0609030804020204" pitchFamily="49" charset="0"/>
+                <a:cs typeface="Menlo" panose="020B0609030804020204" pitchFamily="49" charset="0"/>
+              </a:rPr>
+              <a:t> </a:t>
+            </a:r>
+            <a:r>
+              <a:rPr lang="cs-CZ" sz="1400" dirty="0" err="1">
+                <a:latin typeface="Menlo" panose="020B0609030804020204" pitchFamily="49" charset="0"/>
+                <a:ea typeface="Menlo" panose="020B0609030804020204" pitchFamily="49" charset="0"/>
+                <a:cs typeface="Menlo" panose="020B0609030804020204" pitchFamily="49" charset="0"/>
+              </a:rPr>
+              <a:t>aws</a:t>
+            </a:r>
+            <a:r>
+              <a:rPr lang="cs-CZ" sz="1400" dirty="0">
+                <a:latin typeface="Menlo" panose="020B0609030804020204" pitchFamily="49" charset="0"/>
+                <a:ea typeface="Menlo" panose="020B0609030804020204" pitchFamily="49" charset="0"/>
+                <a:cs typeface="Menlo" panose="020B0609030804020204" pitchFamily="49" charset="0"/>
+              </a:rPr>
+              <a:t>-</a:t>
+            </a:r>
+            <a:r>
+              <a:rPr lang="cs-CZ" sz="1400" dirty="0" err="1">
+                <a:latin typeface="Menlo" panose="020B0609030804020204" pitchFamily="49" charset="0"/>
+                <a:ea typeface="Menlo" panose="020B0609030804020204" pitchFamily="49" charset="0"/>
+                <a:cs typeface="Menlo" panose="020B0609030804020204" pitchFamily="49" charset="0"/>
+              </a:rPr>
+              <a:t>sam</a:t>
+            </a:r>
+            <a:r>
+              <a:rPr lang="cs-CZ" sz="1400" dirty="0">
+                <a:latin typeface="Menlo" panose="020B0609030804020204" pitchFamily="49" charset="0"/>
+                <a:ea typeface="Menlo" panose="020B0609030804020204" pitchFamily="49" charset="0"/>
+                <a:cs typeface="Menlo" panose="020B0609030804020204" pitchFamily="49" charset="0"/>
+              </a:rPr>
+              <a:t>-cli</a:t>
+            </a:r>
+          </a:p>
+          <a:p>
+            <a:r>
+              <a:rPr lang="cs-CZ" sz="1400" dirty="0" err="1">
+                <a:latin typeface="Menlo" panose="020B0609030804020204" pitchFamily="49" charset="0"/>
+                <a:ea typeface="Menlo" panose="020B0609030804020204" pitchFamily="49" charset="0"/>
+                <a:cs typeface="Menlo" panose="020B0609030804020204" pitchFamily="49" charset="0"/>
+              </a:rPr>
+              <a:t>git</a:t>
+            </a:r>
+            <a:r>
+              <a:rPr lang="cs-CZ" sz="1400" dirty="0">
+                <a:latin typeface="Menlo" panose="020B0609030804020204" pitchFamily="49" charset="0"/>
+                <a:ea typeface="Menlo" panose="020B0609030804020204" pitchFamily="49" charset="0"/>
+                <a:cs typeface="Menlo" panose="020B0609030804020204" pitchFamily="49" charset="0"/>
+              </a:rPr>
+              <a:t> </a:t>
+            </a:r>
+            <a:r>
+              <a:rPr lang="cs-CZ" sz="1400" dirty="0" err="1">
+                <a:latin typeface="Menlo" panose="020B0609030804020204" pitchFamily="49" charset="0"/>
+                <a:ea typeface="Menlo" panose="020B0609030804020204" pitchFamily="49" charset="0"/>
+                <a:cs typeface="Menlo" panose="020B0609030804020204" pitchFamily="49" charset="0"/>
+              </a:rPr>
+              <a:t>clone</a:t>
+            </a:r>
+            <a:r>
+              <a:rPr lang="cs-CZ" sz="1400" dirty="0">
+                <a:latin typeface="Menlo" panose="020B0609030804020204" pitchFamily="49" charset="0"/>
+                <a:ea typeface="Menlo" panose="020B0609030804020204" pitchFamily="49" charset="0"/>
+                <a:cs typeface="Menlo" panose="020B0609030804020204" pitchFamily="49" charset="0"/>
+              </a:rPr>
+              <a:t> </a:t>
+            </a:r>
+            <a:r>
+              <a:rPr lang="cs-CZ" sz="1400" dirty="0" err="1">
+                <a:latin typeface="Menlo" panose="020B0609030804020204" pitchFamily="49" charset="0"/>
+                <a:ea typeface="Menlo" panose="020B0609030804020204" pitchFamily="49" charset="0"/>
+                <a:cs typeface="Menlo" panose="020B0609030804020204" pitchFamily="49" charset="0"/>
+              </a:rPr>
+              <a:t>git@github.com:konciergeMD</a:t>
+            </a:r>
+            <a:r>
+              <a:rPr lang="cs-CZ" sz="1400" dirty="0">
+                <a:latin typeface="Menlo" panose="020B0609030804020204" pitchFamily="49" charset="0"/>
+                <a:ea typeface="Menlo" panose="020B0609030804020204" pitchFamily="49" charset="0"/>
+                <a:cs typeface="Menlo" panose="020B0609030804020204" pitchFamily="49" charset="0"/>
+              </a:rPr>
+              <a:t>/lambda-</a:t>
+            </a:r>
+            <a:r>
+              <a:rPr lang="cs-CZ" sz="1400" dirty="0" err="1">
+                <a:latin typeface="Menlo" panose="020B0609030804020204" pitchFamily="49" charset="0"/>
+                <a:ea typeface="Menlo" panose="020B0609030804020204" pitchFamily="49" charset="0"/>
+                <a:cs typeface="Menlo" panose="020B0609030804020204" pitchFamily="49" charset="0"/>
+              </a:rPr>
+              <a:t>sam</a:t>
+            </a:r>
+            <a:r>
+              <a:rPr lang="cs-CZ" sz="1400" dirty="0">
+                <a:latin typeface="Menlo" panose="020B0609030804020204" pitchFamily="49" charset="0"/>
+                <a:ea typeface="Menlo" panose="020B0609030804020204" pitchFamily="49" charset="0"/>
+                <a:cs typeface="Menlo" panose="020B0609030804020204" pitchFamily="49" charset="0"/>
+              </a:rPr>
+              <a:t>-python-</a:t>
+            </a:r>
+            <a:r>
+              <a:rPr lang="cs-CZ" sz="1400" dirty="0" err="1">
+                <a:latin typeface="Menlo" panose="020B0609030804020204" pitchFamily="49" charset="0"/>
+                <a:ea typeface="Menlo" panose="020B0609030804020204" pitchFamily="49" charset="0"/>
+                <a:cs typeface="Menlo" panose="020B0609030804020204" pitchFamily="49" charset="0"/>
+              </a:rPr>
+              <a:t>example.git</a:t>
+            </a:r>
+            <a:endParaRPr lang="cs-CZ" sz="1400" dirty="0">
+              <a:latin typeface="Menlo" panose="020B0609030804020204" pitchFamily="49" charset="0"/>
+              <a:ea typeface="Menlo" panose="020B0609030804020204" pitchFamily="49" charset="0"/>
+              <a:cs typeface="Menlo" panose="020B0609030804020204" pitchFamily="49" charset="0"/>
+            </a:endParaRPr>
+          </a:p>
+          <a:p>
+            <a:r>
+              <a:rPr lang="cs-CZ" sz="1400" dirty="0">
+                <a:latin typeface="Menlo" panose="020B0609030804020204" pitchFamily="49" charset="0"/>
+                <a:ea typeface="Menlo" panose="020B0609030804020204" pitchFamily="49" charset="0"/>
+                <a:cs typeface="Menlo" panose="020B0609030804020204" pitchFamily="49" charset="0"/>
+              </a:rPr>
+              <a:t>cd lambda-</a:t>
+            </a:r>
+            <a:r>
+              <a:rPr lang="cs-CZ" sz="1400" dirty="0" err="1">
+                <a:latin typeface="Menlo" panose="020B0609030804020204" pitchFamily="49" charset="0"/>
+                <a:ea typeface="Menlo" panose="020B0609030804020204" pitchFamily="49" charset="0"/>
+                <a:cs typeface="Menlo" panose="020B0609030804020204" pitchFamily="49" charset="0"/>
+              </a:rPr>
+              <a:t>sam</a:t>
+            </a:r>
+            <a:r>
+              <a:rPr lang="cs-CZ" sz="1400" dirty="0">
+                <a:latin typeface="Menlo" panose="020B0609030804020204" pitchFamily="49" charset="0"/>
+                <a:ea typeface="Menlo" panose="020B0609030804020204" pitchFamily="49" charset="0"/>
+                <a:cs typeface="Menlo" panose="020B0609030804020204" pitchFamily="49" charset="0"/>
+              </a:rPr>
+              <a:t>-python-</a:t>
+            </a:r>
+            <a:r>
+              <a:rPr lang="cs-CZ" sz="1400" dirty="0" err="1">
+                <a:latin typeface="Menlo" panose="020B0609030804020204" pitchFamily="49" charset="0"/>
+                <a:ea typeface="Menlo" panose="020B0609030804020204" pitchFamily="49" charset="0"/>
+                <a:cs typeface="Menlo" panose="020B0609030804020204" pitchFamily="49" charset="0"/>
+              </a:rPr>
+              <a:t>example</a:t>
+            </a:r>
+            <a:endParaRPr lang="cs-CZ" sz="1400" dirty="0">
+              <a:latin typeface="Menlo" panose="020B0609030804020204" pitchFamily="49" charset="0"/>
+              <a:ea typeface="Menlo" panose="020B0609030804020204" pitchFamily="49" charset="0"/>
+              <a:cs typeface="Menlo" panose="020B0609030804020204" pitchFamily="49" charset="0"/>
+            </a:endParaRPr>
+          </a:p>
+          <a:p>
+            <a:endParaRPr lang="cs-CZ" sz="1400" dirty="0">
+              <a:latin typeface="Menlo" panose="020B0609030804020204" pitchFamily="49" charset="0"/>
+              <a:ea typeface="Menlo" panose="020B0609030804020204" pitchFamily="49" charset="0"/>
+              <a:cs typeface="Menlo" panose="020B0609030804020204" pitchFamily="49" charset="0"/>
+            </a:endParaRPr>
           </a:p>
           <a:p>
             <a:pPr marL="0" indent="0">
               <a:buNone/>
             </a:pPr>
-            <a:endParaRPr lang="en-US" dirty="0"/>
-          </a:p>
-          <a:p>
-            <a:r>
-              <a:rPr lang="en-US" dirty="0"/>
-              <a:t>No useful Flask functions</a:t>
-            </a:r>
-          </a:p>
-          <a:p>
-            <a:r>
-              <a:rPr lang="en-US" dirty="0"/>
-              <a:t>Tight to API GW only</a:t>
-            </a:r>
-          </a:p>
-          <a:p>
-            <a:r>
-              <a:rPr lang="en-US" dirty="0"/>
-              <a:t>Useful for smaller lambda functions (faster execution time)</a:t>
-            </a:r>
+            <a:endParaRPr lang="cs-CZ" sz="1400" dirty="0">
+              <a:latin typeface="Menlo" panose="020B0609030804020204" pitchFamily="49" charset="0"/>
+              <a:ea typeface="Menlo" panose="020B0609030804020204" pitchFamily="49" charset="0"/>
+              <a:cs typeface="Menlo" panose="020B0609030804020204" pitchFamily="49" charset="0"/>
+            </a:endParaRPr>
           </a:p>
         </p:txBody>
       </p:sp>
@@ -7849,519 +7884,16 @@
           <a:p>
             <a:fld id="{CF027E54-A86C-7F42-ACF2-1C4CECA97F46}" type="datetime4">
               <a:rPr lang="en-US" smtClean="0"/>
-              <a:t>June 7, 2018</a:t>
+              <a:t>June 20, 2018</a:t>
             </a:fld>
             <a:endParaRPr lang="en-US"/>
-          </a:p>
-        </p:txBody>
-      </p:sp>
-      <p:sp>
-        <p:nvSpPr>
-          <p:cNvPr id="8" name="TextBox 7">
-            <a:extLst>
-              <a:ext uri="{FF2B5EF4-FFF2-40B4-BE49-F238E27FC236}">
-                <a16:creationId xmlns:a16="http://schemas.microsoft.com/office/drawing/2014/main" id="{47584DEA-C971-C64F-BBBB-D981D7C0B267}"/>
-              </a:ext>
-            </a:extLst>
-          </p:cNvPr>
-          <p:cNvSpPr txBox="1"/>
-          <p:nvPr/>
-        </p:nvSpPr>
-        <p:spPr>
-          <a:xfrm>
-            <a:off x="540114" y="1781895"/>
-            <a:ext cx="2859312" cy="830997"/>
-          </a:xfrm>
-          <a:prstGeom prst="rect">
-            <a:avLst/>
-          </a:prstGeom>
-          <a:noFill/>
-        </p:spPr>
-        <p:txBody>
-          <a:bodyPr wrap="square" rtlCol="0">
-            <a:spAutoFit/>
-          </a:bodyPr>
-          <a:lstStyle/>
-          <a:p>
-            <a:r>
-              <a:rPr lang="cs-CZ" sz="800" dirty="0">
-                <a:latin typeface="Menlo" panose="020B0609030804020204" pitchFamily="49" charset="0"/>
-                <a:ea typeface="Menlo" panose="020B0609030804020204" pitchFamily="49" charset="0"/>
-                <a:cs typeface="Menlo" panose="020B0609030804020204" pitchFamily="49" charset="0"/>
-              </a:rPr>
-              <a:t>      </a:t>
-            </a:r>
-            <a:r>
-              <a:rPr lang="cs-CZ" sz="800" dirty="0" err="1">
-                <a:latin typeface="Menlo" panose="020B0609030804020204" pitchFamily="49" charset="0"/>
-                <a:ea typeface="Menlo" panose="020B0609030804020204" pitchFamily="49" charset="0"/>
-                <a:cs typeface="Menlo" panose="020B0609030804020204" pitchFamily="49" charset="0"/>
-              </a:rPr>
-              <a:t>Events</a:t>
-            </a:r>
-            <a:r>
-              <a:rPr lang="cs-CZ" sz="800" dirty="0">
-                <a:latin typeface="Menlo" panose="020B0609030804020204" pitchFamily="49" charset="0"/>
-                <a:ea typeface="Menlo" panose="020B0609030804020204" pitchFamily="49" charset="0"/>
-                <a:cs typeface="Menlo" panose="020B0609030804020204" pitchFamily="49" charset="0"/>
-              </a:rPr>
-              <a:t>:</a:t>
-            </a:r>
-          </a:p>
-          <a:p>
-            <a:r>
-              <a:rPr lang="cs-CZ" sz="800" dirty="0">
-                <a:latin typeface="Menlo" panose="020B0609030804020204" pitchFamily="49" charset="0"/>
-                <a:ea typeface="Menlo" panose="020B0609030804020204" pitchFamily="49" charset="0"/>
-                <a:cs typeface="Menlo" panose="020B0609030804020204" pitchFamily="49" charset="0"/>
-              </a:rPr>
-              <a:t>        </a:t>
-            </a:r>
-            <a:r>
-              <a:rPr lang="cs-CZ" sz="800" dirty="0" err="1">
-                <a:latin typeface="Menlo" panose="020B0609030804020204" pitchFamily="49" charset="0"/>
-                <a:ea typeface="Menlo" panose="020B0609030804020204" pitchFamily="49" charset="0"/>
-                <a:cs typeface="Menlo" panose="020B0609030804020204" pitchFamily="49" charset="0"/>
-              </a:rPr>
-              <a:t>HttpRoot</a:t>
-            </a:r>
-            <a:r>
-              <a:rPr lang="cs-CZ" sz="800" dirty="0">
-                <a:latin typeface="Menlo" panose="020B0609030804020204" pitchFamily="49" charset="0"/>
-                <a:ea typeface="Menlo" panose="020B0609030804020204" pitchFamily="49" charset="0"/>
-                <a:cs typeface="Menlo" panose="020B0609030804020204" pitchFamily="49" charset="0"/>
-              </a:rPr>
-              <a:t>:</a:t>
-            </a:r>
-          </a:p>
-          <a:p>
-            <a:r>
-              <a:rPr lang="cs-CZ" sz="800" dirty="0">
-                <a:latin typeface="Menlo" panose="020B0609030804020204" pitchFamily="49" charset="0"/>
-                <a:ea typeface="Menlo" panose="020B0609030804020204" pitchFamily="49" charset="0"/>
-                <a:cs typeface="Menlo" panose="020B0609030804020204" pitchFamily="49" charset="0"/>
-              </a:rPr>
-              <a:t>          Type: Api</a:t>
-            </a:r>
-          </a:p>
-          <a:p>
-            <a:r>
-              <a:rPr lang="cs-CZ" sz="800" dirty="0">
-                <a:latin typeface="Menlo" panose="020B0609030804020204" pitchFamily="49" charset="0"/>
-                <a:ea typeface="Menlo" panose="020B0609030804020204" pitchFamily="49" charset="0"/>
-                <a:cs typeface="Menlo" panose="020B0609030804020204" pitchFamily="49" charset="0"/>
-              </a:rPr>
-              <a:t>          </a:t>
-            </a:r>
-            <a:r>
-              <a:rPr lang="cs-CZ" sz="800" dirty="0" err="1">
-                <a:latin typeface="Menlo" panose="020B0609030804020204" pitchFamily="49" charset="0"/>
-                <a:ea typeface="Menlo" panose="020B0609030804020204" pitchFamily="49" charset="0"/>
-                <a:cs typeface="Menlo" panose="020B0609030804020204" pitchFamily="49" charset="0"/>
-              </a:rPr>
-              <a:t>Properties</a:t>
-            </a:r>
-            <a:r>
-              <a:rPr lang="cs-CZ" sz="800" dirty="0">
-                <a:latin typeface="Menlo" panose="020B0609030804020204" pitchFamily="49" charset="0"/>
-                <a:ea typeface="Menlo" panose="020B0609030804020204" pitchFamily="49" charset="0"/>
-                <a:cs typeface="Menlo" panose="020B0609030804020204" pitchFamily="49" charset="0"/>
-              </a:rPr>
-              <a:t>:</a:t>
-            </a:r>
-          </a:p>
-          <a:p>
-            <a:r>
-              <a:rPr lang="cs-CZ" sz="800" dirty="0">
-                <a:latin typeface="Menlo" panose="020B0609030804020204" pitchFamily="49" charset="0"/>
-                <a:ea typeface="Menlo" panose="020B0609030804020204" pitchFamily="49" charset="0"/>
-                <a:cs typeface="Menlo" panose="020B0609030804020204" pitchFamily="49" charset="0"/>
-              </a:rPr>
-              <a:t>            </a:t>
-            </a:r>
-            <a:r>
-              <a:rPr lang="cs-CZ" sz="800" dirty="0" err="1">
-                <a:latin typeface="Menlo" panose="020B0609030804020204" pitchFamily="49" charset="0"/>
-                <a:ea typeface="Menlo" panose="020B0609030804020204" pitchFamily="49" charset="0"/>
-                <a:cs typeface="Menlo" panose="020B0609030804020204" pitchFamily="49" charset="0"/>
-              </a:rPr>
-              <a:t>Path</a:t>
-            </a:r>
-            <a:r>
-              <a:rPr lang="cs-CZ" sz="800" dirty="0">
-                <a:latin typeface="Menlo" panose="020B0609030804020204" pitchFamily="49" charset="0"/>
-                <a:ea typeface="Menlo" panose="020B0609030804020204" pitchFamily="49" charset="0"/>
-                <a:cs typeface="Menlo" panose="020B0609030804020204" pitchFamily="49" charset="0"/>
-              </a:rPr>
-              <a:t>: '/'</a:t>
-            </a:r>
-          </a:p>
-          <a:p>
-            <a:r>
-              <a:rPr lang="cs-CZ" sz="800" dirty="0">
-                <a:latin typeface="Menlo" panose="020B0609030804020204" pitchFamily="49" charset="0"/>
-                <a:ea typeface="Menlo" panose="020B0609030804020204" pitchFamily="49" charset="0"/>
-                <a:cs typeface="Menlo" panose="020B0609030804020204" pitchFamily="49" charset="0"/>
-              </a:rPr>
-              <a:t>            </a:t>
-            </a:r>
-            <a:r>
-              <a:rPr lang="cs-CZ" sz="800" dirty="0" err="1">
-                <a:latin typeface="Menlo" panose="020B0609030804020204" pitchFamily="49" charset="0"/>
-                <a:ea typeface="Menlo" panose="020B0609030804020204" pitchFamily="49" charset="0"/>
-                <a:cs typeface="Menlo" panose="020B0609030804020204" pitchFamily="49" charset="0"/>
-              </a:rPr>
-              <a:t>Method</a:t>
-            </a:r>
-            <a:r>
-              <a:rPr lang="cs-CZ" sz="800" dirty="0">
-                <a:latin typeface="Menlo" panose="020B0609030804020204" pitchFamily="49" charset="0"/>
-                <a:ea typeface="Menlo" panose="020B0609030804020204" pitchFamily="49" charset="0"/>
-                <a:cs typeface="Menlo" panose="020B0609030804020204" pitchFamily="49" charset="0"/>
-              </a:rPr>
-              <a:t>: GET</a:t>
-            </a:r>
-          </a:p>
-        </p:txBody>
-      </p:sp>
-      <p:sp>
-        <p:nvSpPr>
-          <p:cNvPr id="15" name="TextBox 14">
-            <a:extLst>
-              <a:ext uri="{FF2B5EF4-FFF2-40B4-BE49-F238E27FC236}">
-                <a16:creationId xmlns:a16="http://schemas.microsoft.com/office/drawing/2014/main" id="{092DFD83-CB80-1D4C-8BE6-E6FFA1DB8BF5}"/>
-              </a:ext>
-            </a:extLst>
-          </p:cNvPr>
-          <p:cNvSpPr txBox="1"/>
-          <p:nvPr/>
-        </p:nvSpPr>
-        <p:spPr>
-          <a:xfrm>
-            <a:off x="4628697" y="1781895"/>
-            <a:ext cx="2859312" cy="1446550"/>
-          </a:xfrm>
-          <a:prstGeom prst="rect">
-            <a:avLst/>
-          </a:prstGeom>
-          <a:noFill/>
-        </p:spPr>
-        <p:txBody>
-          <a:bodyPr wrap="square" rtlCol="0">
-            <a:spAutoFit/>
-          </a:bodyPr>
-          <a:lstStyle/>
-          <a:p>
-            <a:r>
-              <a:rPr lang="cs-CZ" sz="800" dirty="0">
-                <a:latin typeface="Menlo" panose="020B0609030804020204" pitchFamily="49" charset="0"/>
-                <a:ea typeface="Menlo" panose="020B0609030804020204" pitchFamily="49" charset="0"/>
-                <a:cs typeface="Menlo" panose="020B0609030804020204" pitchFamily="49" charset="0"/>
-              </a:rPr>
-              <a:t>      </a:t>
-            </a:r>
-            <a:r>
-              <a:rPr lang="cs-CZ" sz="800" dirty="0" err="1">
-                <a:latin typeface="Menlo" panose="020B0609030804020204" pitchFamily="49" charset="0"/>
-                <a:ea typeface="Menlo" panose="020B0609030804020204" pitchFamily="49" charset="0"/>
-                <a:cs typeface="Menlo" panose="020B0609030804020204" pitchFamily="49" charset="0"/>
-              </a:rPr>
-              <a:t>Events</a:t>
-            </a:r>
-            <a:r>
-              <a:rPr lang="cs-CZ" sz="800" dirty="0">
-                <a:latin typeface="Menlo" panose="020B0609030804020204" pitchFamily="49" charset="0"/>
-                <a:ea typeface="Menlo" panose="020B0609030804020204" pitchFamily="49" charset="0"/>
-                <a:cs typeface="Menlo" panose="020B0609030804020204" pitchFamily="49" charset="0"/>
-              </a:rPr>
-              <a:t>:</a:t>
-            </a:r>
-          </a:p>
-          <a:p>
-            <a:r>
-              <a:rPr lang="cs-CZ" sz="800" dirty="0">
-                <a:latin typeface="Menlo" panose="020B0609030804020204" pitchFamily="49" charset="0"/>
-                <a:ea typeface="Menlo" panose="020B0609030804020204" pitchFamily="49" charset="0"/>
-                <a:cs typeface="Menlo" panose="020B0609030804020204" pitchFamily="49" charset="0"/>
-              </a:rPr>
-              <a:t>        </a:t>
-            </a:r>
-            <a:r>
-              <a:rPr lang="cs-CZ" sz="800" dirty="0" err="1">
-                <a:latin typeface="Menlo" panose="020B0609030804020204" pitchFamily="49" charset="0"/>
-                <a:ea typeface="Menlo" panose="020B0609030804020204" pitchFamily="49" charset="0"/>
-                <a:cs typeface="Menlo" panose="020B0609030804020204" pitchFamily="49" charset="0"/>
-              </a:rPr>
-              <a:t>HttpRoot</a:t>
-            </a:r>
-            <a:r>
-              <a:rPr lang="cs-CZ" sz="800" dirty="0">
-                <a:latin typeface="Menlo" panose="020B0609030804020204" pitchFamily="49" charset="0"/>
-                <a:ea typeface="Menlo" panose="020B0609030804020204" pitchFamily="49" charset="0"/>
-                <a:cs typeface="Menlo" panose="020B0609030804020204" pitchFamily="49" charset="0"/>
-              </a:rPr>
-              <a:t>:</a:t>
-            </a:r>
-          </a:p>
-          <a:p>
-            <a:r>
-              <a:rPr lang="cs-CZ" sz="800" dirty="0">
-                <a:latin typeface="Menlo" panose="020B0609030804020204" pitchFamily="49" charset="0"/>
-                <a:ea typeface="Menlo" panose="020B0609030804020204" pitchFamily="49" charset="0"/>
-                <a:cs typeface="Menlo" panose="020B0609030804020204" pitchFamily="49" charset="0"/>
-              </a:rPr>
-              <a:t>          Type: Api</a:t>
-            </a:r>
-          </a:p>
-          <a:p>
-            <a:r>
-              <a:rPr lang="cs-CZ" sz="800" dirty="0">
-                <a:latin typeface="Menlo" panose="020B0609030804020204" pitchFamily="49" charset="0"/>
-                <a:ea typeface="Menlo" panose="020B0609030804020204" pitchFamily="49" charset="0"/>
-                <a:cs typeface="Menlo" panose="020B0609030804020204" pitchFamily="49" charset="0"/>
-              </a:rPr>
-              <a:t>          </a:t>
-            </a:r>
-            <a:r>
-              <a:rPr lang="cs-CZ" sz="800" dirty="0" err="1">
-                <a:latin typeface="Menlo" panose="020B0609030804020204" pitchFamily="49" charset="0"/>
-                <a:ea typeface="Menlo" panose="020B0609030804020204" pitchFamily="49" charset="0"/>
-                <a:cs typeface="Menlo" panose="020B0609030804020204" pitchFamily="49" charset="0"/>
-              </a:rPr>
-              <a:t>Properties</a:t>
-            </a:r>
-            <a:r>
-              <a:rPr lang="cs-CZ" sz="800" dirty="0">
-                <a:latin typeface="Menlo" panose="020B0609030804020204" pitchFamily="49" charset="0"/>
-                <a:ea typeface="Menlo" panose="020B0609030804020204" pitchFamily="49" charset="0"/>
-                <a:cs typeface="Menlo" panose="020B0609030804020204" pitchFamily="49" charset="0"/>
-              </a:rPr>
-              <a:t>:</a:t>
-            </a:r>
-          </a:p>
-          <a:p>
-            <a:r>
-              <a:rPr lang="cs-CZ" sz="800" dirty="0">
-                <a:latin typeface="Menlo" panose="020B0609030804020204" pitchFamily="49" charset="0"/>
-                <a:ea typeface="Menlo" panose="020B0609030804020204" pitchFamily="49" charset="0"/>
-                <a:cs typeface="Menlo" panose="020B0609030804020204" pitchFamily="49" charset="0"/>
-              </a:rPr>
-              <a:t>            </a:t>
-            </a:r>
-            <a:r>
-              <a:rPr lang="cs-CZ" sz="800" dirty="0" err="1">
-                <a:latin typeface="Menlo" panose="020B0609030804020204" pitchFamily="49" charset="0"/>
-                <a:ea typeface="Menlo" panose="020B0609030804020204" pitchFamily="49" charset="0"/>
-                <a:cs typeface="Menlo" panose="020B0609030804020204" pitchFamily="49" charset="0"/>
-              </a:rPr>
-              <a:t>Path</a:t>
-            </a:r>
-            <a:r>
-              <a:rPr lang="cs-CZ" sz="800" dirty="0">
-                <a:latin typeface="Menlo" panose="020B0609030804020204" pitchFamily="49" charset="0"/>
-                <a:ea typeface="Menlo" panose="020B0609030804020204" pitchFamily="49" charset="0"/>
-                <a:cs typeface="Menlo" panose="020B0609030804020204" pitchFamily="49" charset="0"/>
-              </a:rPr>
-              <a:t>: '/'</a:t>
-            </a:r>
-          </a:p>
-          <a:p>
-            <a:r>
-              <a:rPr lang="cs-CZ" sz="800" dirty="0">
-                <a:latin typeface="Menlo" panose="020B0609030804020204" pitchFamily="49" charset="0"/>
-                <a:ea typeface="Menlo" panose="020B0609030804020204" pitchFamily="49" charset="0"/>
-                <a:cs typeface="Menlo" panose="020B0609030804020204" pitchFamily="49" charset="0"/>
-              </a:rPr>
-              <a:t>            </a:t>
-            </a:r>
-            <a:r>
-              <a:rPr lang="cs-CZ" sz="800" dirty="0" err="1">
-                <a:latin typeface="Menlo" panose="020B0609030804020204" pitchFamily="49" charset="0"/>
-                <a:ea typeface="Menlo" panose="020B0609030804020204" pitchFamily="49" charset="0"/>
-                <a:cs typeface="Menlo" panose="020B0609030804020204" pitchFamily="49" charset="0"/>
-              </a:rPr>
-              <a:t>Method</a:t>
-            </a:r>
-            <a:r>
-              <a:rPr lang="cs-CZ" sz="800" dirty="0">
-                <a:latin typeface="Menlo" panose="020B0609030804020204" pitchFamily="49" charset="0"/>
-                <a:ea typeface="Menlo" panose="020B0609030804020204" pitchFamily="49" charset="0"/>
-                <a:cs typeface="Menlo" panose="020B0609030804020204" pitchFamily="49" charset="0"/>
-              </a:rPr>
-              <a:t>: ANY</a:t>
-            </a:r>
-          </a:p>
-          <a:p>
-            <a:r>
-              <a:rPr lang="cs-CZ" sz="800" dirty="0">
-                <a:latin typeface="Menlo" panose="020B0609030804020204" pitchFamily="49" charset="0"/>
-                <a:ea typeface="Menlo" panose="020B0609030804020204" pitchFamily="49" charset="0"/>
-                <a:cs typeface="Menlo" panose="020B0609030804020204" pitchFamily="49" charset="0"/>
-              </a:rPr>
-              <a:t>        </a:t>
-            </a:r>
-            <a:r>
-              <a:rPr lang="cs-CZ" sz="800" dirty="0" err="1">
-                <a:latin typeface="Menlo" panose="020B0609030804020204" pitchFamily="49" charset="0"/>
-                <a:ea typeface="Menlo" panose="020B0609030804020204" pitchFamily="49" charset="0"/>
-                <a:cs typeface="Menlo" panose="020B0609030804020204" pitchFamily="49" charset="0"/>
-              </a:rPr>
-              <a:t>HttpAll</a:t>
-            </a:r>
-            <a:r>
-              <a:rPr lang="cs-CZ" sz="800" dirty="0">
-                <a:latin typeface="Menlo" panose="020B0609030804020204" pitchFamily="49" charset="0"/>
-                <a:ea typeface="Menlo" panose="020B0609030804020204" pitchFamily="49" charset="0"/>
-                <a:cs typeface="Menlo" panose="020B0609030804020204" pitchFamily="49" charset="0"/>
-              </a:rPr>
-              <a:t>:</a:t>
-            </a:r>
-          </a:p>
-          <a:p>
-            <a:r>
-              <a:rPr lang="cs-CZ" sz="800" dirty="0">
-                <a:latin typeface="Menlo" panose="020B0609030804020204" pitchFamily="49" charset="0"/>
-                <a:ea typeface="Menlo" panose="020B0609030804020204" pitchFamily="49" charset="0"/>
-                <a:cs typeface="Menlo" panose="020B0609030804020204" pitchFamily="49" charset="0"/>
-              </a:rPr>
-              <a:t>          Type: Api</a:t>
-            </a:r>
-          </a:p>
-          <a:p>
-            <a:r>
-              <a:rPr lang="cs-CZ" sz="800" dirty="0">
-                <a:latin typeface="Menlo" panose="020B0609030804020204" pitchFamily="49" charset="0"/>
-                <a:ea typeface="Menlo" panose="020B0609030804020204" pitchFamily="49" charset="0"/>
-                <a:cs typeface="Menlo" panose="020B0609030804020204" pitchFamily="49" charset="0"/>
-              </a:rPr>
-              <a:t>          </a:t>
-            </a:r>
-            <a:r>
-              <a:rPr lang="cs-CZ" sz="800" dirty="0" err="1">
-                <a:latin typeface="Menlo" panose="020B0609030804020204" pitchFamily="49" charset="0"/>
-                <a:ea typeface="Menlo" panose="020B0609030804020204" pitchFamily="49" charset="0"/>
-                <a:cs typeface="Menlo" panose="020B0609030804020204" pitchFamily="49" charset="0"/>
-              </a:rPr>
-              <a:t>Properties</a:t>
-            </a:r>
-            <a:r>
-              <a:rPr lang="cs-CZ" sz="800" dirty="0">
-                <a:latin typeface="Menlo" panose="020B0609030804020204" pitchFamily="49" charset="0"/>
-                <a:ea typeface="Menlo" panose="020B0609030804020204" pitchFamily="49" charset="0"/>
-                <a:cs typeface="Menlo" panose="020B0609030804020204" pitchFamily="49" charset="0"/>
-              </a:rPr>
-              <a:t>:</a:t>
-            </a:r>
-          </a:p>
-          <a:p>
-            <a:r>
-              <a:rPr lang="cs-CZ" sz="800" dirty="0">
-                <a:latin typeface="Menlo" panose="020B0609030804020204" pitchFamily="49" charset="0"/>
-                <a:ea typeface="Menlo" panose="020B0609030804020204" pitchFamily="49" charset="0"/>
-                <a:cs typeface="Menlo" panose="020B0609030804020204" pitchFamily="49" charset="0"/>
-              </a:rPr>
-              <a:t>            </a:t>
-            </a:r>
-            <a:r>
-              <a:rPr lang="cs-CZ" sz="800" dirty="0" err="1">
-                <a:latin typeface="Menlo" panose="020B0609030804020204" pitchFamily="49" charset="0"/>
-                <a:ea typeface="Menlo" panose="020B0609030804020204" pitchFamily="49" charset="0"/>
-                <a:cs typeface="Menlo" panose="020B0609030804020204" pitchFamily="49" charset="0"/>
-              </a:rPr>
-              <a:t>Path</a:t>
-            </a:r>
-            <a:r>
-              <a:rPr lang="cs-CZ" sz="800" dirty="0">
-                <a:latin typeface="Menlo" panose="020B0609030804020204" pitchFamily="49" charset="0"/>
-                <a:ea typeface="Menlo" panose="020B0609030804020204" pitchFamily="49" charset="0"/>
-                <a:cs typeface="Menlo" panose="020B0609030804020204" pitchFamily="49" charset="0"/>
-              </a:rPr>
-              <a:t>: '/{</a:t>
-            </a:r>
-            <a:r>
-              <a:rPr lang="cs-CZ" sz="800" dirty="0" err="1">
-                <a:latin typeface="Menlo" panose="020B0609030804020204" pitchFamily="49" charset="0"/>
-                <a:ea typeface="Menlo" panose="020B0609030804020204" pitchFamily="49" charset="0"/>
-                <a:cs typeface="Menlo" panose="020B0609030804020204" pitchFamily="49" charset="0"/>
-              </a:rPr>
-              <a:t>proxy</a:t>
-            </a:r>
-            <a:r>
-              <a:rPr lang="cs-CZ" sz="800" dirty="0">
-                <a:latin typeface="Menlo" panose="020B0609030804020204" pitchFamily="49" charset="0"/>
-                <a:ea typeface="Menlo" panose="020B0609030804020204" pitchFamily="49" charset="0"/>
-                <a:cs typeface="Menlo" panose="020B0609030804020204" pitchFamily="49" charset="0"/>
-              </a:rPr>
-              <a:t>+}'</a:t>
-            </a:r>
-          </a:p>
-          <a:p>
-            <a:r>
-              <a:rPr lang="cs-CZ" sz="800" dirty="0">
-                <a:latin typeface="Menlo" panose="020B0609030804020204" pitchFamily="49" charset="0"/>
-                <a:ea typeface="Menlo" panose="020B0609030804020204" pitchFamily="49" charset="0"/>
-                <a:cs typeface="Menlo" panose="020B0609030804020204" pitchFamily="49" charset="0"/>
-              </a:rPr>
-              <a:t>            </a:t>
-            </a:r>
-            <a:r>
-              <a:rPr lang="cs-CZ" sz="800" dirty="0" err="1">
-                <a:latin typeface="Menlo" panose="020B0609030804020204" pitchFamily="49" charset="0"/>
-                <a:ea typeface="Menlo" panose="020B0609030804020204" pitchFamily="49" charset="0"/>
-                <a:cs typeface="Menlo" panose="020B0609030804020204" pitchFamily="49" charset="0"/>
-              </a:rPr>
-              <a:t>Method</a:t>
-            </a:r>
-            <a:r>
-              <a:rPr lang="cs-CZ" sz="800" dirty="0">
-                <a:latin typeface="Menlo" panose="020B0609030804020204" pitchFamily="49" charset="0"/>
-                <a:ea typeface="Menlo" panose="020B0609030804020204" pitchFamily="49" charset="0"/>
-                <a:cs typeface="Menlo" panose="020B0609030804020204" pitchFamily="49" charset="0"/>
-              </a:rPr>
-              <a:t>: ANY</a:t>
-            </a:r>
-          </a:p>
-        </p:txBody>
-      </p:sp>
-      <p:sp>
-        <p:nvSpPr>
-          <p:cNvPr id="11" name="TextBox 10">
-            <a:extLst>
-              <a:ext uri="{FF2B5EF4-FFF2-40B4-BE49-F238E27FC236}">
-                <a16:creationId xmlns:a16="http://schemas.microsoft.com/office/drawing/2014/main" id="{962B8FC4-FD19-BE41-9679-D0B595DFDC23}"/>
-              </a:ext>
-            </a:extLst>
-          </p:cNvPr>
-          <p:cNvSpPr txBox="1"/>
-          <p:nvPr/>
-        </p:nvSpPr>
-        <p:spPr>
-          <a:xfrm>
-            <a:off x="3811634" y="2243956"/>
-            <a:ext cx="404854" cy="300082"/>
-          </a:xfrm>
-          <a:prstGeom prst="rect">
-            <a:avLst/>
-          </a:prstGeom>
-          <a:noFill/>
-        </p:spPr>
-        <p:txBody>
-          <a:bodyPr wrap="none" rtlCol="0">
-            <a:spAutoFit/>
-          </a:bodyPr>
-          <a:lstStyle/>
-          <a:p>
-            <a:r>
-              <a:rPr lang="cs-CZ" dirty="0"/>
-              <a:t>VS.</a:t>
-            </a:r>
           </a:p>
         </p:txBody>
       </p:sp>
     </p:spTree>
     <p:extLst>
       <p:ext uri="{BB962C8B-B14F-4D97-AF65-F5344CB8AC3E}">
-        <p14:creationId xmlns:p14="http://schemas.microsoft.com/office/powerpoint/2010/main" val="187834563"/>
+        <p14:creationId xmlns:p14="http://schemas.microsoft.com/office/powerpoint/2010/main" val="3450526380"/>
       </p:ext>
     </p:extLst>
   </p:cSld>
@@ -8410,8 +7942,21 @@
           <a:p>
             <a:r>
               <a:rPr lang="en-US" dirty="0"/>
-              <a:t>Environment preparation</a:t>
-            </a:r>
+              <a:t>Prepare </a:t>
+            </a:r>
+            <a:r>
+              <a:rPr lang="en-US" dirty="0" err="1"/>
+              <a:t>yaml</a:t>
+            </a:r>
+            <a:r>
+              <a:rPr lang="en-US" dirty="0"/>
+              <a:t> for </a:t>
+            </a:r>
+            <a:r>
+              <a:rPr lang="en-US" dirty="0" err="1"/>
+              <a:t>sam</a:t>
+            </a:r>
+            <a:endParaRPr lang="en-US" dirty="0"/>
           </a:p>
         </p:txBody>
       </p:sp>
@@ -8427,8 +7972,8 @@
         </p:nvSpPr>
         <p:spPr>
           <a:xfrm>
-            <a:off x="426720" y="1395663"/>
-            <a:ext cx="8290560" cy="3429000"/>
+            <a:off x="426720" y="1229915"/>
+            <a:ext cx="8290560" cy="3594748"/>
           </a:xfrm>
         </p:spPr>
         <p:txBody>
@@ -8436,242 +7981,540 @@
           <a:lstStyle/>
           <a:p>
             <a:r>
-              <a:rPr lang="cs-CZ" sz="1400" dirty="0" err="1">
+              <a:rPr lang="en-US" dirty="0">
+                <a:latin typeface="+mn-lt"/>
+              </a:rPr>
+              <a:t>Open </a:t>
+            </a:r>
+            <a:r>
+              <a:rPr lang="en-US" dirty="0" err="1">
+                <a:latin typeface="+mn-lt"/>
+                <a:ea typeface="Menlo" panose="020B0609030804020204" pitchFamily="49" charset="0"/>
+                <a:cs typeface="Menlo" panose="020B0609030804020204" pitchFamily="49" charset="0"/>
+              </a:rPr>
+              <a:t>template.yaml</a:t>
+            </a:r>
+            <a:r>
+              <a:rPr lang="en-US" dirty="0">
+                <a:latin typeface="+mn-lt"/>
+              </a:rPr>
+              <a:t> and make your own modifications</a:t>
+            </a:r>
+          </a:p>
+          <a:p>
+            <a:pPr lvl="1"/>
+            <a:r>
+              <a:rPr lang="en-US" b="1" dirty="0">
+                <a:latin typeface="+mn-lt"/>
+              </a:rPr>
+              <a:t>!!! Lambda code bucket vs. bucket for lambda runtime !!!</a:t>
+            </a:r>
+          </a:p>
+          <a:p>
+            <a:r>
+              <a:rPr lang="en-US" dirty="0">
+                <a:latin typeface="+mn-lt"/>
+              </a:rPr>
+              <a:t>Prepare </a:t>
+            </a:r>
+            <a:r>
+              <a:rPr lang="en-US" dirty="0" err="1">
+                <a:latin typeface="+mn-lt"/>
+              </a:rPr>
+              <a:t>lambda.zip</a:t>
+            </a:r>
+            <a:endParaRPr lang="en-US" dirty="0">
+              <a:latin typeface="+mn-lt"/>
+            </a:endParaRPr>
+          </a:p>
+          <a:p>
+            <a:pPr marL="0" indent="0">
+              <a:buNone/>
+            </a:pPr>
+            <a:r>
+              <a:rPr lang="cs-CZ" sz="1000" dirty="0">
                 <a:latin typeface="Menlo" panose="020B0609030804020204" pitchFamily="49" charset="0"/>
                 <a:ea typeface="Menlo" panose="020B0609030804020204" pitchFamily="49" charset="0"/>
                 <a:cs typeface="Menlo" panose="020B0609030804020204" pitchFamily="49" charset="0"/>
               </a:rPr>
-              <a:t>brew</a:t>
-            </a:r>
-            <a:r>
-              <a:rPr lang="cs-CZ" sz="1400" dirty="0">
+              <a:t>zip -</a:t>
+            </a:r>
+            <a:r>
+              <a:rPr lang="cs-CZ" sz="1000" dirty="0" err="1">
                 <a:latin typeface="Menlo" panose="020B0609030804020204" pitchFamily="49" charset="0"/>
                 <a:ea typeface="Menlo" panose="020B0609030804020204" pitchFamily="49" charset="0"/>
                 <a:cs typeface="Menlo" panose="020B0609030804020204" pitchFamily="49" charset="0"/>
               </a:rPr>
-              <a:t> </a:t>
-            </a:r>
-            <a:r>
-              <a:rPr lang="cs-CZ" sz="1400" dirty="0" err="1">
+              <a:t>r</a:t>
+            </a:r>
+            <a:r>
+              <a:rPr lang="cs-CZ" sz="1000" dirty="0">
                 <a:latin typeface="Menlo" panose="020B0609030804020204" pitchFamily="49" charset="0"/>
                 <a:ea typeface="Menlo" panose="020B0609030804020204" pitchFamily="49" charset="0"/>
                 <a:cs typeface="Menlo" panose="020B0609030804020204" pitchFamily="49" charset="0"/>
               </a:rPr>
-              <a:t>install</a:t>
-            </a:r>
-            <a:r>
-              <a:rPr lang="cs-CZ" sz="1400" dirty="0">
+              <a:t> /</a:t>
+            </a:r>
+            <a:r>
+              <a:rPr lang="cs-CZ" sz="1000" dirty="0" err="1">
                 <a:latin typeface="Menlo" panose="020B0609030804020204" pitchFamily="49" charset="0"/>
                 <a:ea typeface="Menlo" panose="020B0609030804020204" pitchFamily="49" charset="0"/>
                 <a:cs typeface="Menlo" panose="020B0609030804020204" pitchFamily="49" charset="0"/>
               </a:rPr>
-              <a:t> python3</a:t>
-            </a:r>
-          </a:p>
-          <a:p>
-            <a:r>
-              <a:rPr lang="cs-CZ" sz="1400" dirty="0">
+              <a:t>tmp</a:t>
+            </a:r>
+            <a:r>
+              <a:rPr lang="cs-CZ" sz="1000" dirty="0">
                 <a:latin typeface="Menlo" panose="020B0609030804020204" pitchFamily="49" charset="0"/>
                 <a:ea typeface="Menlo" panose="020B0609030804020204" pitchFamily="49" charset="0"/>
                 <a:cs typeface="Menlo" panose="020B0609030804020204" pitchFamily="49" charset="0"/>
               </a:rPr>
-              <a:t>pip3 </a:t>
-            </a:r>
-            <a:r>
-              <a:rPr lang="cs-CZ" sz="1400" dirty="0" err="1">
+              <a:t>/</a:t>
+            </a:r>
+            <a:r>
+              <a:rPr lang="cs-CZ" sz="1000" dirty="0" err="1">
                 <a:latin typeface="Menlo" panose="020B0609030804020204" pitchFamily="49" charset="0"/>
                 <a:ea typeface="Menlo" panose="020B0609030804020204" pitchFamily="49" charset="0"/>
                 <a:cs typeface="Menlo" panose="020B0609030804020204" pitchFamily="49" charset="0"/>
               </a:rPr>
-              <a:t>install</a:t>
-            </a:r>
-            <a:r>
-              <a:rPr lang="cs-CZ" sz="1400" dirty="0">
+              <a:t>lambda.zip</a:t>
+            </a:r>
+            <a:r>
+              <a:rPr lang="cs-CZ" sz="1000" dirty="0">
                 <a:latin typeface="Menlo" panose="020B0609030804020204" pitchFamily="49" charset="0"/>
                 <a:ea typeface="Menlo" panose="020B0609030804020204" pitchFamily="49" charset="0"/>
                 <a:cs typeface="Menlo" panose="020B0609030804020204" pitchFamily="49" charset="0"/>
               </a:rPr>
-              <a:t> --upgrade </a:t>
-            </a:r>
-            <a:r>
-              <a:rPr lang="cs-CZ" sz="1400" dirty="0" err="1">
+              <a:t> </a:t>
+            </a:r>
+            <a:r>
+              <a:rPr lang="cs-CZ" sz="1000" dirty="0" err="1">
                 <a:latin typeface="Menlo" panose="020B0609030804020204" pitchFamily="49" charset="0"/>
                 <a:ea typeface="Menlo" panose="020B0609030804020204" pitchFamily="49" charset="0"/>
                 <a:cs typeface="Menlo" panose="020B0609030804020204" pitchFamily="49" charset="0"/>
               </a:rPr>
-              <a:t>awscli</a:t>
-            </a:r>
-            <a:r>
-              <a:rPr lang="cs-CZ" sz="1400" dirty="0">
-                <a:latin typeface="Menlo" panose="020B0609030804020204" pitchFamily="49" charset="0"/>
-                <a:ea typeface="Menlo" panose="020B0609030804020204" pitchFamily="49" charset="0"/>
-                <a:cs typeface="Menlo" panose="020B0609030804020204" pitchFamily="49" charset="0"/>
-              </a:rPr>
-              <a:t> </a:t>
-            </a:r>
-            <a:r>
-              <a:rPr lang="cs-CZ" sz="1400" dirty="0" err="1">
-                <a:latin typeface="Menlo" panose="020B0609030804020204" pitchFamily="49" charset="0"/>
-                <a:ea typeface="Menlo" panose="020B0609030804020204" pitchFamily="49" charset="0"/>
-                <a:cs typeface="Menlo" panose="020B0609030804020204" pitchFamily="49" charset="0"/>
-              </a:rPr>
-              <a:t>aws</a:t>
-            </a:r>
-            <a:r>
-              <a:rPr lang="cs-CZ" sz="1400" dirty="0">
-                <a:latin typeface="Menlo" panose="020B0609030804020204" pitchFamily="49" charset="0"/>
-                <a:ea typeface="Menlo" panose="020B0609030804020204" pitchFamily="49" charset="0"/>
-                <a:cs typeface="Menlo" panose="020B0609030804020204" pitchFamily="49" charset="0"/>
-              </a:rPr>
-              <a:t>-</a:t>
-            </a:r>
-            <a:r>
-              <a:rPr lang="cs-CZ" sz="1400" dirty="0" err="1">
-                <a:latin typeface="Menlo" panose="020B0609030804020204" pitchFamily="49" charset="0"/>
-                <a:ea typeface="Menlo" panose="020B0609030804020204" pitchFamily="49" charset="0"/>
-                <a:cs typeface="Menlo" panose="020B0609030804020204" pitchFamily="49" charset="0"/>
-              </a:rPr>
-              <a:t>sam</a:t>
-            </a:r>
-            <a:r>
-              <a:rPr lang="cs-CZ" sz="1400" dirty="0">
-                <a:latin typeface="Menlo" panose="020B0609030804020204" pitchFamily="49" charset="0"/>
-                <a:ea typeface="Menlo" panose="020B0609030804020204" pitchFamily="49" charset="0"/>
-                <a:cs typeface="Menlo" panose="020B0609030804020204" pitchFamily="49" charset="0"/>
-              </a:rPr>
-              <a:t>-cli</a:t>
-            </a:r>
-          </a:p>
-          <a:p>
-            <a:r>
-              <a:rPr lang="cs-CZ" sz="1400" dirty="0" err="1">
-                <a:latin typeface="Menlo" panose="020B0609030804020204" pitchFamily="49" charset="0"/>
-                <a:ea typeface="Menlo" panose="020B0609030804020204" pitchFamily="49" charset="0"/>
-                <a:cs typeface="Menlo" panose="020B0609030804020204" pitchFamily="49" charset="0"/>
-              </a:rPr>
-              <a:t>git</a:t>
-            </a:r>
-            <a:r>
-              <a:rPr lang="cs-CZ" sz="1400" dirty="0">
-                <a:latin typeface="Menlo" panose="020B0609030804020204" pitchFamily="49" charset="0"/>
-                <a:ea typeface="Menlo" panose="020B0609030804020204" pitchFamily="49" charset="0"/>
-                <a:cs typeface="Menlo" panose="020B0609030804020204" pitchFamily="49" charset="0"/>
-              </a:rPr>
-              <a:t> </a:t>
-            </a:r>
-            <a:r>
-              <a:rPr lang="cs-CZ" sz="1400" dirty="0" err="1">
-                <a:latin typeface="Menlo" panose="020B0609030804020204" pitchFamily="49" charset="0"/>
-                <a:ea typeface="Menlo" panose="020B0609030804020204" pitchFamily="49" charset="0"/>
-                <a:cs typeface="Menlo" panose="020B0609030804020204" pitchFamily="49" charset="0"/>
-              </a:rPr>
-              <a:t>clone</a:t>
-            </a:r>
-            <a:r>
-              <a:rPr lang="cs-CZ" sz="1400" dirty="0">
-                <a:latin typeface="Menlo" panose="020B0609030804020204" pitchFamily="49" charset="0"/>
-                <a:ea typeface="Menlo" panose="020B0609030804020204" pitchFamily="49" charset="0"/>
-                <a:cs typeface="Menlo" panose="020B0609030804020204" pitchFamily="49" charset="0"/>
-              </a:rPr>
-              <a:t> </a:t>
-            </a:r>
-            <a:r>
-              <a:rPr lang="cs-CZ" sz="1400" dirty="0" err="1">
-                <a:latin typeface="Menlo" panose="020B0609030804020204" pitchFamily="49" charset="0"/>
-                <a:ea typeface="Menlo" panose="020B0609030804020204" pitchFamily="49" charset="0"/>
-                <a:cs typeface="Menlo" panose="020B0609030804020204" pitchFamily="49" charset="0"/>
-              </a:rPr>
-              <a:t>git@github.com:konciergeMD</a:t>
-            </a:r>
-            <a:r>
-              <a:rPr lang="cs-CZ" sz="1400" dirty="0">
-                <a:latin typeface="Menlo" panose="020B0609030804020204" pitchFamily="49" charset="0"/>
-                <a:ea typeface="Menlo" panose="020B0609030804020204" pitchFamily="49" charset="0"/>
-                <a:cs typeface="Menlo" panose="020B0609030804020204" pitchFamily="49" charset="0"/>
-              </a:rPr>
-              <a:t>/lambda-</a:t>
-            </a:r>
-            <a:r>
-              <a:rPr lang="cs-CZ" sz="1400" dirty="0" err="1">
-                <a:latin typeface="Menlo" panose="020B0609030804020204" pitchFamily="49" charset="0"/>
-                <a:ea typeface="Menlo" panose="020B0609030804020204" pitchFamily="49" charset="0"/>
-                <a:cs typeface="Menlo" panose="020B0609030804020204" pitchFamily="49" charset="0"/>
-              </a:rPr>
-              <a:t>sam</a:t>
-            </a:r>
-            <a:r>
-              <a:rPr lang="cs-CZ" sz="1400" dirty="0">
-                <a:latin typeface="Menlo" panose="020B0609030804020204" pitchFamily="49" charset="0"/>
-                <a:ea typeface="Menlo" panose="020B0609030804020204" pitchFamily="49" charset="0"/>
-                <a:cs typeface="Menlo" panose="020B0609030804020204" pitchFamily="49" charset="0"/>
-              </a:rPr>
-              <a:t>-python-</a:t>
-            </a:r>
-            <a:r>
-              <a:rPr lang="cs-CZ" sz="1400" dirty="0" err="1">
-                <a:latin typeface="Menlo" panose="020B0609030804020204" pitchFamily="49" charset="0"/>
-                <a:ea typeface="Menlo" panose="020B0609030804020204" pitchFamily="49" charset="0"/>
-                <a:cs typeface="Menlo" panose="020B0609030804020204" pitchFamily="49" charset="0"/>
-              </a:rPr>
-              <a:t>example.git</a:t>
-            </a:r>
-            <a:endParaRPr lang="cs-CZ" sz="1400" dirty="0">
+              <a:t>app.py</a:t>
+            </a:r>
+            <a:endParaRPr lang="cs-CZ" sz="1000" dirty="0">
               <a:latin typeface="Menlo" panose="020B0609030804020204" pitchFamily="49" charset="0"/>
               <a:ea typeface="Menlo" panose="020B0609030804020204" pitchFamily="49" charset="0"/>
               <a:cs typeface="Menlo" panose="020B0609030804020204" pitchFamily="49" charset="0"/>
             </a:endParaRPr>
           </a:p>
           <a:p>
-            <a:r>
-              <a:rPr lang="cs-CZ" sz="1400" dirty="0">
+            <a:pPr marL="0" indent="0">
+              <a:buNone/>
+            </a:pPr>
+            <a:r>
+              <a:rPr lang="cs-CZ" sz="1000" dirty="0">
                 <a:latin typeface="Menlo" panose="020B0609030804020204" pitchFamily="49" charset="0"/>
                 <a:ea typeface="Menlo" panose="020B0609030804020204" pitchFamily="49" charset="0"/>
                 <a:cs typeface="Menlo" panose="020B0609030804020204" pitchFamily="49" charset="0"/>
               </a:rPr>
-              <a:t>cd lambda-</a:t>
-            </a:r>
-            <a:r>
-              <a:rPr lang="cs-CZ" sz="1400" dirty="0" err="1">
+              <a:t>cd </a:t>
+            </a:r>
+            <a:r>
+              <a:rPr lang="cs-CZ" sz="1000" dirty="0" err="1">
                 <a:latin typeface="Menlo" panose="020B0609030804020204" pitchFamily="49" charset="0"/>
                 <a:ea typeface="Menlo" panose="020B0609030804020204" pitchFamily="49" charset="0"/>
                 <a:cs typeface="Menlo" panose="020B0609030804020204" pitchFamily="49" charset="0"/>
               </a:rPr>
-              <a:t>sam</a:t>
-            </a:r>
-            <a:r>
-              <a:rPr lang="cs-CZ" sz="1400" dirty="0">
+              <a:t>env</a:t>
+            </a:r>
+            <a:r>
+              <a:rPr lang="cs-CZ" sz="1000" dirty="0">
                 <a:latin typeface="Menlo" panose="020B0609030804020204" pitchFamily="49" charset="0"/>
                 <a:ea typeface="Menlo" panose="020B0609030804020204" pitchFamily="49" charset="0"/>
                 <a:cs typeface="Menlo" panose="020B0609030804020204" pitchFamily="49" charset="0"/>
               </a:rPr>
-              <a:t>-python-</a:t>
-            </a:r>
-            <a:r>
-              <a:rPr lang="cs-CZ" sz="1400" dirty="0" err="1">
+              <a:t>/lib/python3.6/</a:t>
+            </a:r>
+            <a:r>
+              <a:rPr lang="cs-CZ" sz="1000" dirty="0" err="1">
                 <a:latin typeface="Menlo" panose="020B0609030804020204" pitchFamily="49" charset="0"/>
                 <a:ea typeface="Menlo" panose="020B0609030804020204" pitchFamily="49" charset="0"/>
                 <a:cs typeface="Menlo" panose="020B0609030804020204" pitchFamily="49" charset="0"/>
               </a:rPr>
-              <a:t>example</a:t>
-            </a:r>
-            <a:endParaRPr lang="cs-CZ" sz="1400" dirty="0">
+              <a:t>site-packages</a:t>
+            </a:r>
+            <a:endParaRPr lang="cs-CZ" sz="1000" dirty="0">
               <a:latin typeface="Menlo" panose="020B0609030804020204" pitchFamily="49" charset="0"/>
               <a:ea typeface="Menlo" panose="020B0609030804020204" pitchFamily="49" charset="0"/>
               <a:cs typeface="Menlo" panose="020B0609030804020204" pitchFamily="49" charset="0"/>
             </a:endParaRPr>
           </a:p>
           <a:p>
-            <a:endParaRPr lang="cs-CZ" sz="1400" dirty="0">
+            <a:pPr marL="0" indent="0">
+              <a:buNone/>
+            </a:pPr>
+            <a:r>
+              <a:rPr lang="cs-CZ" sz="1000" dirty="0">
+                <a:latin typeface="Menlo" panose="020B0609030804020204" pitchFamily="49" charset="0"/>
+                <a:ea typeface="Menlo" panose="020B0609030804020204" pitchFamily="49" charset="0"/>
+                <a:cs typeface="Menlo" panose="020B0609030804020204" pitchFamily="49" charset="0"/>
+              </a:rPr>
+              <a:t>zip -</a:t>
+            </a:r>
+            <a:r>
+              <a:rPr lang="cs-CZ" sz="1000" dirty="0" err="1">
+                <a:latin typeface="Menlo" panose="020B0609030804020204" pitchFamily="49" charset="0"/>
+                <a:ea typeface="Menlo" panose="020B0609030804020204" pitchFamily="49" charset="0"/>
+                <a:cs typeface="Menlo" panose="020B0609030804020204" pitchFamily="49" charset="0"/>
+              </a:rPr>
+              <a:t>ur</a:t>
+            </a:r>
+            <a:r>
+              <a:rPr lang="cs-CZ" sz="1000" dirty="0">
+                <a:latin typeface="Menlo" panose="020B0609030804020204" pitchFamily="49" charset="0"/>
+                <a:ea typeface="Menlo" panose="020B0609030804020204" pitchFamily="49" charset="0"/>
+                <a:cs typeface="Menlo" panose="020B0609030804020204" pitchFamily="49" charset="0"/>
+              </a:rPr>
+              <a:t> /</a:t>
+            </a:r>
+            <a:r>
+              <a:rPr lang="cs-CZ" sz="1000" dirty="0" err="1">
+                <a:latin typeface="Menlo" panose="020B0609030804020204" pitchFamily="49" charset="0"/>
+                <a:ea typeface="Menlo" panose="020B0609030804020204" pitchFamily="49" charset="0"/>
+                <a:cs typeface="Menlo" panose="020B0609030804020204" pitchFamily="49" charset="0"/>
+              </a:rPr>
+              <a:t>tmp</a:t>
+            </a:r>
+            <a:r>
+              <a:rPr lang="cs-CZ" sz="1000" dirty="0">
+                <a:latin typeface="Menlo" panose="020B0609030804020204" pitchFamily="49" charset="0"/>
+                <a:ea typeface="Menlo" panose="020B0609030804020204" pitchFamily="49" charset="0"/>
+                <a:cs typeface="Menlo" panose="020B0609030804020204" pitchFamily="49" charset="0"/>
+              </a:rPr>
+              <a:t>/</a:t>
+            </a:r>
+            <a:r>
+              <a:rPr lang="cs-CZ" sz="1000" dirty="0" err="1">
+                <a:latin typeface="Menlo" panose="020B0609030804020204" pitchFamily="49" charset="0"/>
+                <a:ea typeface="Menlo" panose="020B0609030804020204" pitchFamily="49" charset="0"/>
+                <a:cs typeface="Menlo" panose="020B0609030804020204" pitchFamily="49" charset="0"/>
+              </a:rPr>
+              <a:t>lambda.zip</a:t>
+            </a:r>
+            <a:r>
+              <a:rPr lang="cs-CZ" sz="1000" dirty="0">
+                <a:latin typeface="Menlo" panose="020B0609030804020204" pitchFamily="49" charset="0"/>
+                <a:ea typeface="Menlo" panose="020B0609030804020204" pitchFamily="49" charset="0"/>
+                <a:cs typeface="Menlo" panose="020B0609030804020204" pitchFamily="49" charset="0"/>
+              </a:rPr>
+              <a:t> *</a:t>
+            </a:r>
+          </a:p>
+          <a:p>
+            <a:pPr marL="0" indent="0">
+              <a:buNone/>
+            </a:pPr>
+            <a:r>
+              <a:rPr lang="cs-CZ" sz="1000" dirty="0" err="1">
+                <a:latin typeface="Menlo" panose="020B0609030804020204" pitchFamily="49" charset="0"/>
+                <a:ea typeface="Menlo" panose="020B0609030804020204" pitchFamily="49" charset="0"/>
+                <a:cs typeface="Menlo" panose="020B0609030804020204" pitchFamily="49" charset="0"/>
+              </a:rPr>
+              <a:t>aws</a:t>
+            </a:r>
+            <a:r>
+              <a:rPr lang="cs-CZ" sz="1000" dirty="0">
+                <a:latin typeface="Menlo" panose="020B0609030804020204" pitchFamily="49" charset="0"/>
+                <a:ea typeface="Menlo" panose="020B0609030804020204" pitchFamily="49" charset="0"/>
+                <a:cs typeface="Menlo" panose="020B0609030804020204" pitchFamily="49" charset="0"/>
+              </a:rPr>
+              <a:t> --profile </a:t>
+            </a:r>
+            <a:r>
+              <a:rPr lang="cs-CZ" sz="1000" dirty="0" err="1">
+                <a:latin typeface="Menlo" panose="020B0609030804020204" pitchFamily="49" charset="0"/>
+                <a:ea typeface="Menlo" panose="020B0609030804020204" pitchFamily="49" charset="0"/>
+                <a:cs typeface="Menlo" panose="020B0609030804020204" pitchFamily="49" charset="0"/>
+              </a:rPr>
+              <a:t>sam</a:t>
+            </a:r>
+            <a:r>
+              <a:rPr lang="cs-CZ" sz="1000" dirty="0">
+                <a:latin typeface="Menlo" panose="020B0609030804020204" pitchFamily="49" charset="0"/>
+                <a:ea typeface="Menlo" panose="020B0609030804020204" pitchFamily="49" charset="0"/>
+                <a:cs typeface="Menlo" panose="020B0609030804020204" pitchFamily="49" charset="0"/>
+              </a:rPr>
+              <a:t> s3 </a:t>
+            </a:r>
+            <a:r>
+              <a:rPr lang="cs-CZ" sz="1000" dirty="0" err="1">
+                <a:latin typeface="Menlo" panose="020B0609030804020204" pitchFamily="49" charset="0"/>
+                <a:ea typeface="Menlo" panose="020B0609030804020204" pitchFamily="49" charset="0"/>
+                <a:cs typeface="Menlo" panose="020B0609030804020204" pitchFamily="49" charset="0"/>
+              </a:rPr>
+              <a:t>cp</a:t>
+            </a:r>
+            <a:r>
+              <a:rPr lang="cs-CZ" sz="1000" dirty="0">
+                <a:latin typeface="Menlo" panose="020B0609030804020204" pitchFamily="49" charset="0"/>
+                <a:ea typeface="Menlo" panose="020B0609030804020204" pitchFamily="49" charset="0"/>
+                <a:cs typeface="Menlo" panose="020B0609030804020204" pitchFamily="49" charset="0"/>
+              </a:rPr>
+              <a:t> /</a:t>
+            </a:r>
+            <a:r>
+              <a:rPr lang="cs-CZ" sz="1000" dirty="0" err="1">
+                <a:latin typeface="Menlo" panose="020B0609030804020204" pitchFamily="49" charset="0"/>
+                <a:ea typeface="Menlo" panose="020B0609030804020204" pitchFamily="49" charset="0"/>
+                <a:cs typeface="Menlo" panose="020B0609030804020204" pitchFamily="49" charset="0"/>
+              </a:rPr>
+              <a:t>tmp</a:t>
+            </a:r>
+            <a:r>
+              <a:rPr lang="cs-CZ" sz="1000" dirty="0">
+                <a:latin typeface="Menlo" panose="020B0609030804020204" pitchFamily="49" charset="0"/>
+                <a:ea typeface="Menlo" panose="020B0609030804020204" pitchFamily="49" charset="0"/>
+                <a:cs typeface="Menlo" panose="020B0609030804020204" pitchFamily="49" charset="0"/>
+              </a:rPr>
+              <a:t>/</a:t>
+            </a:r>
+            <a:r>
+              <a:rPr lang="cs-CZ" sz="1000" dirty="0" err="1">
+                <a:latin typeface="Menlo" panose="020B0609030804020204" pitchFamily="49" charset="0"/>
+                <a:ea typeface="Menlo" panose="020B0609030804020204" pitchFamily="49" charset="0"/>
+                <a:cs typeface="Menlo" panose="020B0609030804020204" pitchFamily="49" charset="0"/>
+              </a:rPr>
+              <a:t>lambda.zip</a:t>
+            </a:r>
+            <a:r>
+              <a:rPr lang="cs-CZ" sz="1000" dirty="0">
+                <a:latin typeface="Menlo" panose="020B0609030804020204" pitchFamily="49" charset="0"/>
+                <a:ea typeface="Menlo" panose="020B0609030804020204" pitchFamily="49" charset="0"/>
+                <a:cs typeface="Menlo" panose="020B0609030804020204" pitchFamily="49" charset="0"/>
+              </a:rPr>
+              <a:t> s3://</a:t>
+            </a:r>
+            <a:r>
+              <a:rPr lang="cs-CZ" sz="1000" dirty="0" err="1">
+                <a:latin typeface="Menlo" panose="020B0609030804020204" pitchFamily="49" charset="0"/>
+                <a:ea typeface="Menlo" panose="020B0609030804020204" pitchFamily="49" charset="0"/>
+                <a:cs typeface="Menlo" panose="020B0609030804020204" pitchFamily="49" charset="0"/>
+              </a:rPr>
+              <a:t>jakub</a:t>
+            </a:r>
+            <a:r>
+              <a:rPr lang="cs-CZ" sz="1000" dirty="0">
+                <a:latin typeface="Menlo" panose="020B0609030804020204" pitchFamily="49" charset="0"/>
+                <a:ea typeface="Menlo" panose="020B0609030804020204" pitchFamily="49" charset="0"/>
+                <a:cs typeface="Menlo" panose="020B0609030804020204" pitchFamily="49" charset="0"/>
+              </a:rPr>
+              <a:t>-</a:t>
+            </a:r>
+            <a:r>
+              <a:rPr lang="cs-CZ" sz="1000" dirty="0" err="1">
+                <a:latin typeface="Menlo" panose="020B0609030804020204" pitchFamily="49" charset="0"/>
+                <a:ea typeface="Menlo" panose="020B0609030804020204" pitchFamily="49" charset="0"/>
+                <a:cs typeface="Menlo" panose="020B0609030804020204" pitchFamily="49" charset="0"/>
+              </a:rPr>
+              <a:t>pyvo</a:t>
+            </a:r>
+            <a:r>
+              <a:rPr lang="cs-CZ" sz="1000" dirty="0">
+                <a:latin typeface="Menlo" panose="020B0609030804020204" pitchFamily="49" charset="0"/>
+                <a:ea typeface="Menlo" panose="020B0609030804020204" pitchFamily="49" charset="0"/>
+                <a:cs typeface="Menlo" panose="020B0609030804020204" pitchFamily="49" charset="0"/>
+              </a:rPr>
+              <a:t>-demo-</a:t>
+            </a:r>
+            <a:r>
+              <a:rPr lang="cs-CZ" sz="1000" dirty="0" err="1">
+                <a:latin typeface="Menlo" panose="020B0609030804020204" pitchFamily="49" charset="0"/>
+                <a:ea typeface="Menlo" panose="020B0609030804020204" pitchFamily="49" charset="0"/>
+                <a:cs typeface="Menlo" panose="020B0609030804020204" pitchFamily="49" charset="0"/>
+              </a:rPr>
+              <a:t>sam</a:t>
+            </a:r>
+            <a:r>
+              <a:rPr lang="cs-CZ" sz="1000" dirty="0">
+                <a:latin typeface="Menlo" panose="020B0609030804020204" pitchFamily="49" charset="0"/>
+                <a:ea typeface="Menlo" panose="020B0609030804020204" pitchFamily="49" charset="0"/>
+                <a:cs typeface="Menlo" panose="020B0609030804020204" pitchFamily="49" charset="0"/>
+              </a:rPr>
+              <a:t>-</a:t>
+            </a:r>
+            <a:r>
+              <a:rPr lang="cs-CZ" sz="1000" dirty="0" err="1">
+                <a:latin typeface="Menlo" panose="020B0609030804020204" pitchFamily="49" charset="0"/>
+                <a:ea typeface="Menlo" panose="020B0609030804020204" pitchFamily="49" charset="0"/>
+                <a:cs typeface="Menlo" panose="020B0609030804020204" pitchFamily="49" charset="0"/>
+              </a:rPr>
+              <a:t>lambdas</a:t>
+            </a:r>
+            <a:r>
+              <a:rPr lang="cs-CZ" sz="1000" dirty="0">
+                <a:latin typeface="Menlo" panose="020B0609030804020204" pitchFamily="49" charset="0"/>
+                <a:ea typeface="Menlo" panose="020B0609030804020204" pitchFamily="49" charset="0"/>
+                <a:cs typeface="Menlo" panose="020B0609030804020204" pitchFamily="49" charset="0"/>
+              </a:rPr>
+              <a:t>/</a:t>
+            </a:r>
+            <a:r>
+              <a:rPr lang="cs-CZ" sz="1000" dirty="0" err="1">
+                <a:latin typeface="Menlo" panose="020B0609030804020204" pitchFamily="49" charset="0"/>
+                <a:ea typeface="Menlo" panose="020B0609030804020204" pitchFamily="49" charset="0"/>
+                <a:cs typeface="Menlo" panose="020B0609030804020204" pitchFamily="49" charset="0"/>
+              </a:rPr>
+              <a:t>lambda.zip</a:t>
+            </a:r>
+            <a:endParaRPr lang="en-US" sz="1000" dirty="0">
               <a:latin typeface="Menlo" panose="020B0609030804020204" pitchFamily="49" charset="0"/>
               <a:ea typeface="Menlo" panose="020B0609030804020204" pitchFamily="49" charset="0"/>
               <a:cs typeface="Menlo" panose="020B0609030804020204" pitchFamily="49" charset="0"/>
             </a:endParaRPr>
           </a:p>
           <a:p>
+            <a:r>
+              <a:rPr lang="en-US" dirty="0">
+                <a:latin typeface="+mn-lt"/>
+              </a:rPr>
+              <a:t>Deploy:</a:t>
+            </a:r>
+          </a:p>
+          <a:p>
             <a:pPr marL="0" indent="0">
               <a:buNone/>
             </a:pPr>
-            <a:endParaRPr lang="cs-CZ" sz="1400" dirty="0">
+            <a:r>
+              <a:rPr lang="cs-CZ" sz="1000" i="1" dirty="0" err="1">
+                <a:latin typeface="Menlo" panose="020B0609030804020204" pitchFamily="49" charset="0"/>
+                <a:ea typeface="Menlo" panose="020B0609030804020204" pitchFamily="49" charset="0"/>
+                <a:cs typeface="Menlo" panose="020B0609030804020204" pitchFamily="49" charset="0"/>
+              </a:rPr>
+              <a:t>sam</a:t>
+            </a:r>
+            <a:r>
+              <a:rPr lang="cs-CZ" sz="1000" i="1" dirty="0">
+                <a:latin typeface="Menlo" panose="020B0609030804020204" pitchFamily="49" charset="0"/>
+                <a:ea typeface="Menlo" panose="020B0609030804020204" pitchFamily="49" charset="0"/>
+                <a:cs typeface="Menlo" panose="020B0609030804020204" pitchFamily="49" charset="0"/>
+              </a:rPr>
+              <a:t> </a:t>
+            </a:r>
+            <a:r>
+              <a:rPr lang="cs-CZ" sz="1000" i="1" dirty="0" err="1">
+                <a:latin typeface="Menlo" panose="020B0609030804020204" pitchFamily="49" charset="0"/>
+                <a:ea typeface="Menlo" panose="020B0609030804020204" pitchFamily="49" charset="0"/>
+                <a:cs typeface="Menlo" panose="020B0609030804020204" pitchFamily="49" charset="0"/>
+              </a:rPr>
+              <a:t>deploy</a:t>
+            </a:r>
+            <a:r>
+              <a:rPr lang="cs-CZ" sz="1000" i="1" dirty="0">
+                <a:latin typeface="Menlo" panose="020B0609030804020204" pitchFamily="49" charset="0"/>
+                <a:ea typeface="Menlo" panose="020B0609030804020204" pitchFamily="49" charset="0"/>
+                <a:cs typeface="Menlo" panose="020B0609030804020204" pitchFamily="49" charset="0"/>
+              </a:rPr>
+              <a:t> --</a:t>
+            </a:r>
+            <a:r>
+              <a:rPr lang="cs-CZ" sz="1000" i="1" dirty="0" err="1">
+                <a:latin typeface="Menlo" panose="020B0609030804020204" pitchFamily="49" charset="0"/>
+                <a:ea typeface="Menlo" panose="020B0609030804020204" pitchFamily="49" charset="0"/>
+                <a:cs typeface="Menlo" panose="020B0609030804020204" pitchFamily="49" charset="0"/>
+              </a:rPr>
+              <a:t>template-file</a:t>
+            </a:r>
+            <a:r>
+              <a:rPr lang="cs-CZ" sz="1000" i="1" dirty="0">
+                <a:latin typeface="Menlo" panose="020B0609030804020204" pitchFamily="49" charset="0"/>
+                <a:ea typeface="Menlo" panose="020B0609030804020204" pitchFamily="49" charset="0"/>
+                <a:cs typeface="Menlo" panose="020B0609030804020204" pitchFamily="49" charset="0"/>
+              </a:rPr>
+              <a:t> </a:t>
+            </a:r>
+            <a:r>
+              <a:rPr lang="cs-CZ" sz="1000" i="1" dirty="0" err="1">
+                <a:latin typeface="Menlo" panose="020B0609030804020204" pitchFamily="49" charset="0"/>
+                <a:ea typeface="Menlo" panose="020B0609030804020204" pitchFamily="49" charset="0"/>
+                <a:cs typeface="Menlo" panose="020B0609030804020204" pitchFamily="49" charset="0"/>
+              </a:rPr>
+              <a:t>template-demo.yaml</a:t>
+            </a:r>
+            <a:r>
+              <a:rPr lang="cs-CZ" sz="1000" i="1" dirty="0">
+                <a:latin typeface="Menlo" panose="020B0609030804020204" pitchFamily="49" charset="0"/>
+                <a:ea typeface="Menlo" panose="020B0609030804020204" pitchFamily="49" charset="0"/>
+                <a:cs typeface="Menlo" panose="020B0609030804020204" pitchFamily="49" charset="0"/>
+              </a:rPr>
+              <a:t> --</a:t>
+            </a:r>
+            <a:r>
+              <a:rPr lang="cs-CZ" sz="1000" i="1" dirty="0" err="1">
+                <a:latin typeface="Menlo" panose="020B0609030804020204" pitchFamily="49" charset="0"/>
+                <a:ea typeface="Menlo" panose="020B0609030804020204" pitchFamily="49" charset="0"/>
+                <a:cs typeface="Menlo" panose="020B0609030804020204" pitchFamily="49" charset="0"/>
+              </a:rPr>
+              <a:t>stack-name</a:t>
+            </a:r>
+            <a:r>
+              <a:rPr lang="cs-CZ" sz="1000" i="1" dirty="0">
+                <a:latin typeface="Menlo" panose="020B0609030804020204" pitchFamily="49" charset="0"/>
+                <a:ea typeface="Menlo" panose="020B0609030804020204" pitchFamily="49" charset="0"/>
+                <a:cs typeface="Menlo" panose="020B0609030804020204" pitchFamily="49" charset="0"/>
+              </a:rPr>
+              <a:t> </a:t>
+            </a:r>
+            <a:r>
+              <a:rPr lang="cs-CZ" sz="1000" i="1" dirty="0" err="1">
+                <a:latin typeface="Menlo" panose="020B0609030804020204" pitchFamily="49" charset="0"/>
+                <a:ea typeface="Menlo" panose="020B0609030804020204" pitchFamily="49" charset="0"/>
+                <a:cs typeface="Menlo" panose="020B0609030804020204" pitchFamily="49" charset="0"/>
+              </a:rPr>
+              <a:t>pyvo</a:t>
+            </a:r>
+            <a:r>
+              <a:rPr lang="cs-CZ" sz="1000" i="1" dirty="0">
+                <a:latin typeface="Menlo" panose="020B0609030804020204" pitchFamily="49" charset="0"/>
+                <a:ea typeface="Menlo" panose="020B0609030804020204" pitchFamily="49" charset="0"/>
+                <a:cs typeface="Menlo" panose="020B0609030804020204" pitchFamily="49" charset="0"/>
+              </a:rPr>
+              <a:t>-demo-test --region eu-central-1 --profile </a:t>
+            </a:r>
+            <a:r>
+              <a:rPr lang="cs-CZ" sz="1000" i="1" dirty="0" err="1">
+                <a:latin typeface="Menlo" panose="020B0609030804020204" pitchFamily="49" charset="0"/>
+                <a:ea typeface="Menlo" panose="020B0609030804020204" pitchFamily="49" charset="0"/>
+                <a:cs typeface="Menlo" panose="020B0609030804020204" pitchFamily="49" charset="0"/>
+              </a:rPr>
+              <a:t>sam</a:t>
+            </a:r>
+            <a:r>
+              <a:rPr lang="cs-CZ" sz="1000" i="1" dirty="0">
+                <a:latin typeface="Menlo" panose="020B0609030804020204" pitchFamily="49" charset="0"/>
+                <a:ea typeface="Menlo" panose="020B0609030804020204" pitchFamily="49" charset="0"/>
+                <a:cs typeface="Menlo" panose="020B0609030804020204" pitchFamily="49" charset="0"/>
+              </a:rPr>
+              <a:t> --</a:t>
+            </a:r>
+            <a:r>
+              <a:rPr lang="cs-CZ" sz="1000" i="1" dirty="0" err="1">
+                <a:latin typeface="Menlo" panose="020B0609030804020204" pitchFamily="49" charset="0"/>
+                <a:ea typeface="Menlo" panose="020B0609030804020204" pitchFamily="49" charset="0"/>
+                <a:cs typeface="Menlo" panose="020B0609030804020204" pitchFamily="49" charset="0"/>
+              </a:rPr>
+              <a:t>capabilities</a:t>
+            </a:r>
+            <a:r>
+              <a:rPr lang="cs-CZ" sz="1000" i="1" dirty="0">
+                <a:latin typeface="Menlo" panose="020B0609030804020204" pitchFamily="49" charset="0"/>
+                <a:ea typeface="Menlo" panose="020B0609030804020204" pitchFamily="49" charset="0"/>
+                <a:cs typeface="Menlo" panose="020B0609030804020204" pitchFamily="49" charset="0"/>
+              </a:rPr>
+              <a:t> CAPABILITY_IAM --</a:t>
+            </a:r>
+            <a:r>
+              <a:rPr lang="cs-CZ" sz="1000" i="1" dirty="0" err="1">
+                <a:latin typeface="Menlo" panose="020B0609030804020204" pitchFamily="49" charset="0"/>
+                <a:ea typeface="Menlo" panose="020B0609030804020204" pitchFamily="49" charset="0"/>
+                <a:cs typeface="Menlo" panose="020B0609030804020204" pitchFamily="49" charset="0"/>
+              </a:rPr>
+              <a:t>force-upload</a:t>
+            </a:r>
+            <a:endParaRPr lang="cs-CZ" sz="1000" dirty="0">
               <a:latin typeface="Menlo" panose="020B0609030804020204" pitchFamily="49" charset="0"/>
               <a:ea typeface="Menlo" panose="020B0609030804020204" pitchFamily="49" charset="0"/>
               <a:cs typeface="Menlo" panose="020B0609030804020204" pitchFamily="49" charset="0"/>
@@ -8741,687 +8584,7 @@
           <a:p>
             <a:fld id="{CF027E54-A86C-7F42-ACF2-1C4CECA97F46}" type="datetime4">
               <a:rPr lang="en-US" smtClean="0"/>
-              <a:t>June 7, 2018</a:t>
-            </a:fld>
-            <a:endParaRPr lang="en-US"/>
-          </a:p>
-        </p:txBody>
-      </p:sp>
-    </p:spTree>
-    <p:extLst>
-      <p:ext uri="{BB962C8B-B14F-4D97-AF65-F5344CB8AC3E}">
-        <p14:creationId xmlns:p14="http://schemas.microsoft.com/office/powerpoint/2010/main" val="3450526380"/>
-      </p:ext>
-    </p:extLst>
-  </p:cSld>
-  <p:clrMapOvr>
-    <a:masterClrMapping/>
-  </p:clrMapOvr>
-</p:sld>
-</file>
-
-<file path=ppt/slides/slide6.xml><?xml version="1.0" encoding="utf-8"?>
-<p:sld xmlns:a="http://schemas.openxmlformats.org/drawingml/2006/main" xmlns:r="http://schemas.openxmlformats.org/officeDocument/2006/relationships" xmlns:p="http://schemas.openxmlformats.org/presentationml/2006/main">
-  <p:cSld>
-    <p:spTree>
-      <p:nvGrpSpPr>
-        <p:cNvPr id="1" name=""/>
-        <p:cNvGrpSpPr/>
-        <p:nvPr/>
-      </p:nvGrpSpPr>
-      <p:grpSpPr>
-        <a:xfrm>
-          <a:off x="0" y="0"/>
-          <a:ext cx="0" cy="0"/>
-          <a:chOff x="0" y="0"/>
-          <a:chExt cx="0" cy="0"/>
-        </a:xfrm>
-      </p:grpSpPr>
-      <p:sp>
-        <p:nvSpPr>
-          <p:cNvPr id="2" name="Title 1"/>
-          <p:cNvSpPr>
-            <a:spLocks noGrp="1"/>
-          </p:cNvSpPr>
-          <p:nvPr>
-            <p:ph type="title"/>
-          </p:nvPr>
-        </p:nvSpPr>
-        <p:spPr>
-          <a:xfrm>
-            <a:off x="426720" y="409075"/>
-            <a:ext cx="8290560" cy="820840"/>
-          </a:xfrm>
-        </p:spPr>
-        <p:txBody>
-          <a:bodyPr/>
-          <a:lstStyle/>
-          <a:p>
-            <a:r>
-              <a:rPr lang="en-US" dirty="0"/>
-              <a:t>Prepare </a:t>
-            </a:r>
-            <a:r>
-              <a:rPr lang="en-US" dirty="0" err="1"/>
-              <a:t>yaml</a:t>
-            </a:r>
-            <a:r>
-              <a:rPr lang="en-US" dirty="0"/>
-              <a:t> for </a:t>
-            </a:r>
-            <a:r>
-              <a:rPr lang="en-US" dirty="0" err="1"/>
-              <a:t>sam</a:t>
-            </a:r>
-            <a:endParaRPr lang="en-US" dirty="0"/>
-          </a:p>
-        </p:txBody>
-      </p:sp>
-      <p:sp>
-        <p:nvSpPr>
-          <p:cNvPr id="3" name="Content Placeholder 2"/>
-          <p:cNvSpPr>
-            <a:spLocks noGrp="1"/>
-          </p:cNvSpPr>
-          <p:nvPr>
-            <p:ph idx="1"/>
-          </p:nvPr>
-        </p:nvSpPr>
-        <p:spPr>
-          <a:xfrm>
-            <a:off x="426720" y="1395663"/>
-            <a:ext cx="8290560" cy="3429000"/>
-          </a:xfrm>
-        </p:spPr>
-        <p:txBody>
-          <a:bodyPr/>
-          <a:lstStyle/>
-          <a:p>
-            <a:r>
-              <a:rPr lang="en-US" dirty="0">
-                <a:latin typeface="+mn-lt"/>
-              </a:rPr>
-              <a:t>Open </a:t>
-            </a:r>
-            <a:r>
-              <a:rPr lang="en-US" dirty="0" err="1">
-                <a:latin typeface="+mn-lt"/>
-                <a:ea typeface="Menlo" panose="020B0609030804020204" pitchFamily="49" charset="0"/>
-                <a:cs typeface="Menlo" panose="020B0609030804020204" pitchFamily="49" charset="0"/>
-              </a:rPr>
-              <a:t>template.yaml</a:t>
-            </a:r>
-            <a:r>
-              <a:rPr lang="en-US" dirty="0">
-                <a:latin typeface="+mn-lt"/>
-              </a:rPr>
-              <a:t> and make your own modifications</a:t>
-            </a:r>
-          </a:p>
-          <a:p>
-            <a:pPr lvl="1"/>
-            <a:r>
-              <a:rPr lang="en-US" b="1" dirty="0">
-                <a:latin typeface="+mn-lt"/>
-              </a:rPr>
-              <a:t>!!! Lambda code bucket vs. bucket for lambda runtime !!!</a:t>
-            </a:r>
-          </a:p>
-          <a:p>
-            <a:r>
-              <a:rPr lang="en-US" dirty="0">
-                <a:latin typeface="+mn-lt"/>
-              </a:rPr>
-              <a:t>Deploy:</a:t>
-            </a:r>
-          </a:p>
-          <a:p>
-            <a:pPr marL="0" indent="0">
-              <a:buNone/>
-            </a:pPr>
-            <a:r>
-              <a:rPr lang="cs-CZ" sz="1000" dirty="0" err="1">
-                <a:latin typeface="Menlo" panose="020B0609030804020204" pitchFamily="49" charset="0"/>
-                <a:ea typeface="Menlo" panose="020B0609030804020204" pitchFamily="49" charset="0"/>
-                <a:cs typeface="Menlo" panose="020B0609030804020204" pitchFamily="49" charset="0"/>
-              </a:rPr>
-              <a:t>aws</a:t>
-            </a:r>
-            <a:r>
-              <a:rPr lang="cs-CZ" sz="1000" dirty="0">
-                <a:latin typeface="Menlo" panose="020B0609030804020204" pitchFamily="49" charset="0"/>
-                <a:ea typeface="Menlo" panose="020B0609030804020204" pitchFamily="49" charset="0"/>
-                <a:cs typeface="Menlo" panose="020B0609030804020204" pitchFamily="49" charset="0"/>
-              </a:rPr>
-              <a:t> </a:t>
-            </a:r>
-            <a:r>
-              <a:rPr lang="cs-CZ" sz="1000" dirty="0" err="1">
-                <a:latin typeface="Menlo" panose="020B0609030804020204" pitchFamily="49" charset="0"/>
-                <a:ea typeface="Menlo" panose="020B0609030804020204" pitchFamily="49" charset="0"/>
-                <a:cs typeface="Menlo" panose="020B0609030804020204" pitchFamily="49" charset="0"/>
-              </a:rPr>
-              <a:t>cloudformation</a:t>
-            </a:r>
-            <a:r>
-              <a:rPr lang="cs-CZ" sz="1000" dirty="0">
-                <a:latin typeface="Menlo" panose="020B0609030804020204" pitchFamily="49" charset="0"/>
-                <a:ea typeface="Menlo" panose="020B0609030804020204" pitchFamily="49" charset="0"/>
-                <a:cs typeface="Menlo" panose="020B0609030804020204" pitchFamily="49" charset="0"/>
-              </a:rPr>
-              <a:t> </a:t>
-            </a:r>
-            <a:r>
-              <a:rPr lang="cs-CZ" sz="1000" dirty="0" err="1">
-                <a:latin typeface="Menlo" panose="020B0609030804020204" pitchFamily="49" charset="0"/>
-                <a:ea typeface="Menlo" panose="020B0609030804020204" pitchFamily="49" charset="0"/>
-                <a:cs typeface="Menlo" panose="020B0609030804020204" pitchFamily="49" charset="0"/>
-              </a:rPr>
-              <a:t>package</a:t>
-            </a:r>
-            <a:r>
-              <a:rPr lang="cs-CZ" sz="1000" dirty="0">
-                <a:latin typeface="Menlo" panose="020B0609030804020204" pitchFamily="49" charset="0"/>
-                <a:ea typeface="Menlo" panose="020B0609030804020204" pitchFamily="49" charset="0"/>
-                <a:cs typeface="Menlo" panose="020B0609030804020204" pitchFamily="49" charset="0"/>
-              </a:rPr>
-              <a:t> --</a:t>
-            </a:r>
-            <a:r>
-              <a:rPr lang="cs-CZ" sz="1000" dirty="0" err="1">
-                <a:latin typeface="Menlo" panose="020B0609030804020204" pitchFamily="49" charset="0"/>
-                <a:ea typeface="Menlo" panose="020B0609030804020204" pitchFamily="49" charset="0"/>
-                <a:cs typeface="Menlo" panose="020B0609030804020204" pitchFamily="49" charset="0"/>
-              </a:rPr>
-              <a:t>template-file</a:t>
-            </a:r>
-            <a:r>
-              <a:rPr lang="cs-CZ" sz="1000" dirty="0">
-                <a:latin typeface="Menlo" panose="020B0609030804020204" pitchFamily="49" charset="0"/>
-                <a:ea typeface="Menlo" panose="020B0609030804020204" pitchFamily="49" charset="0"/>
-                <a:cs typeface="Menlo" panose="020B0609030804020204" pitchFamily="49" charset="0"/>
-              </a:rPr>
-              <a:t> </a:t>
-            </a:r>
-            <a:r>
-              <a:rPr lang="cs-CZ" sz="1000" dirty="0" err="1">
-                <a:latin typeface="Menlo" panose="020B0609030804020204" pitchFamily="49" charset="0"/>
-                <a:ea typeface="Menlo" panose="020B0609030804020204" pitchFamily="49" charset="0"/>
-                <a:cs typeface="Menlo" panose="020B0609030804020204" pitchFamily="49" charset="0"/>
-              </a:rPr>
-              <a:t>template.yaml</a:t>
-            </a:r>
-            <a:r>
-              <a:rPr lang="cs-CZ" sz="1000" dirty="0">
-                <a:latin typeface="Menlo" panose="020B0609030804020204" pitchFamily="49" charset="0"/>
-                <a:ea typeface="Menlo" panose="020B0609030804020204" pitchFamily="49" charset="0"/>
-                <a:cs typeface="Menlo" panose="020B0609030804020204" pitchFamily="49" charset="0"/>
-              </a:rPr>
-              <a:t> --output-</a:t>
-            </a:r>
-            <a:r>
-              <a:rPr lang="cs-CZ" sz="1000" dirty="0" err="1">
-                <a:latin typeface="Menlo" panose="020B0609030804020204" pitchFamily="49" charset="0"/>
-                <a:ea typeface="Menlo" panose="020B0609030804020204" pitchFamily="49" charset="0"/>
-                <a:cs typeface="Menlo" panose="020B0609030804020204" pitchFamily="49" charset="0"/>
-              </a:rPr>
-              <a:t>template</a:t>
-            </a:r>
-            <a:r>
-              <a:rPr lang="cs-CZ" sz="1000" dirty="0">
-                <a:latin typeface="Menlo" panose="020B0609030804020204" pitchFamily="49" charset="0"/>
-                <a:ea typeface="Menlo" panose="020B0609030804020204" pitchFamily="49" charset="0"/>
-                <a:cs typeface="Menlo" panose="020B0609030804020204" pitchFamily="49" charset="0"/>
-              </a:rPr>
-              <a:t>-</a:t>
-            </a:r>
-            <a:r>
-              <a:rPr lang="cs-CZ" sz="1000" dirty="0" err="1">
-                <a:latin typeface="Menlo" panose="020B0609030804020204" pitchFamily="49" charset="0"/>
-                <a:ea typeface="Menlo" panose="020B0609030804020204" pitchFamily="49" charset="0"/>
-                <a:cs typeface="Menlo" panose="020B0609030804020204" pitchFamily="49" charset="0"/>
-              </a:rPr>
-              <a:t>file</a:t>
-            </a:r>
-            <a:r>
-              <a:rPr lang="cs-CZ" sz="1000" dirty="0">
-                <a:latin typeface="Menlo" panose="020B0609030804020204" pitchFamily="49" charset="0"/>
-                <a:ea typeface="Menlo" panose="020B0609030804020204" pitchFamily="49" charset="0"/>
-                <a:cs typeface="Menlo" panose="020B0609030804020204" pitchFamily="49" charset="0"/>
-              </a:rPr>
-              <a:t> </a:t>
-            </a:r>
-            <a:r>
-              <a:rPr lang="cs-CZ" sz="1000" dirty="0" err="1">
-                <a:latin typeface="Menlo" panose="020B0609030804020204" pitchFamily="49" charset="0"/>
-                <a:ea typeface="Menlo" panose="020B0609030804020204" pitchFamily="49" charset="0"/>
-                <a:cs typeface="Menlo" panose="020B0609030804020204" pitchFamily="49" charset="0"/>
-              </a:rPr>
-              <a:t>packaged-template.yaml</a:t>
-            </a:r>
-            <a:r>
-              <a:rPr lang="cs-CZ" sz="1000" dirty="0">
-                <a:latin typeface="Menlo" panose="020B0609030804020204" pitchFamily="49" charset="0"/>
-                <a:ea typeface="Menlo" panose="020B0609030804020204" pitchFamily="49" charset="0"/>
-                <a:cs typeface="Menlo" panose="020B0609030804020204" pitchFamily="49" charset="0"/>
-              </a:rPr>
-              <a:t> -s3-bucket &lt;</a:t>
-            </a:r>
-            <a:r>
-              <a:rPr lang="cs-CZ" sz="1000" dirty="0" err="1">
-                <a:latin typeface="Menlo" panose="020B0609030804020204" pitchFamily="49" charset="0"/>
-                <a:ea typeface="Menlo" panose="020B0609030804020204" pitchFamily="49" charset="0"/>
-                <a:cs typeface="Menlo" panose="020B0609030804020204" pitchFamily="49" charset="0"/>
-              </a:rPr>
-              <a:t>your</a:t>
-            </a:r>
-            <a:r>
-              <a:rPr lang="cs-CZ" sz="1000" dirty="0">
-                <a:latin typeface="Menlo" panose="020B0609030804020204" pitchFamily="49" charset="0"/>
-                <a:ea typeface="Menlo" panose="020B0609030804020204" pitchFamily="49" charset="0"/>
-                <a:cs typeface="Menlo" panose="020B0609030804020204" pitchFamily="49" charset="0"/>
-              </a:rPr>
-              <a:t> S3 </a:t>
-            </a:r>
-            <a:r>
-              <a:rPr lang="cs-CZ" sz="1000" dirty="0" err="1">
-                <a:latin typeface="Menlo" panose="020B0609030804020204" pitchFamily="49" charset="0"/>
-                <a:ea typeface="Menlo" panose="020B0609030804020204" pitchFamily="49" charset="0"/>
-                <a:cs typeface="Menlo" panose="020B0609030804020204" pitchFamily="49" charset="0"/>
-              </a:rPr>
-              <a:t>bucket</a:t>
-            </a:r>
-            <a:r>
-              <a:rPr lang="cs-CZ" sz="1000" dirty="0">
-                <a:latin typeface="Menlo" panose="020B0609030804020204" pitchFamily="49" charset="0"/>
-                <a:ea typeface="Menlo" panose="020B0609030804020204" pitchFamily="49" charset="0"/>
-                <a:cs typeface="Menlo" panose="020B0609030804020204" pitchFamily="49" charset="0"/>
-              </a:rPr>
-              <a:t>&gt; --profile &lt;</a:t>
-            </a:r>
-            <a:r>
-              <a:rPr lang="cs-CZ" sz="1000" dirty="0" err="1">
-                <a:latin typeface="Menlo" panose="020B0609030804020204" pitchFamily="49" charset="0"/>
-                <a:ea typeface="Menlo" panose="020B0609030804020204" pitchFamily="49" charset="0"/>
-                <a:cs typeface="Menlo" panose="020B0609030804020204" pitchFamily="49" charset="0"/>
-              </a:rPr>
-              <a:t>aws</a:t>
-            </a:r>
-            <a:r>
-              <a:rPr lang="cs-CZ" sz="1000" dirty="0">
-                <a:latin typeface="Menlo" panose="020B0609030804020204" pitchFamily="49" charset="0"/>
-                <a:ea typeface="Menlo" panose="020B0609030804020204" pitchFamily="49" charset="0"/>
-                <a:cs typeface="Menlo" panose="020B0609030804020204" pitchFamily="49" charset="0"/>
-              </a:rPr>
-              <a:t> profile&gt;</a:t>
-            </a:r>
-          </a:p>
-          <a:p>
-            <a:pPr marL="0" indent="0">
-              <a:buNone/>
-            </a:pPr>
-            <a:r>
-              <a:rPr lang="cs-CZ" sz="1000" dirty="0" err="1">
-                <a:latin typeface="Menlo" panose="020B0609030804020204" pitchFamily="49" charset="0"/>
-                <a:ea typeface="Menlo" panose="020B0609030804020204" pitchFamily="49" charset="0"/>
-                <a:cs typeface="Menlo" panose="020B0609030804020204" pitchFamily="49" charset="0"/>
-              </a:rPr>
-              <a:t>aws</a:t>
-            </a:r>
-            <a:r>
-              <a:rPr lang="cs-CZ" sz="1000" dirty="0">
-                <a:latin typeface="Menlo" panose="020B0609030804020204" pitchFamily="49" charset="0"/>
-                <a:ea typeface="Menlo" panose="020B0609030804020204" pitchFamily="49" charset="0"/>
-                <a:cs typeface="Menlo" panose="020B0609030804020204" pitchFamily="49" charset="0"/>
-              </a:rPr>
-              <a:t> </a:t>
-            </a:r>
-            <a:r>
-              <a:rPr lang="cs-CZ" sz="1000" dirty="0" err="1">
-                <a:latin typeface="Menlo" panose="020B0609030804020204" pitchFamily="49" charset="0"/>
-                <a:ea typeface="Menlo" panose="020B0609030804020204" pitchFamily="49" charset="0"/>
-                <a:cs typeface="Menlo" panose="020B0609030804020204" pitchFamily="49" charset="0"/>
-              </a:rPr>
-              <a:t>cloudformation</a:t>
-            </a:r>
-            <a:r>
-              <a:rPr lang="cs-CZ" sz="1000" dirty="0">
-                <a:latin typeface="Menlo" panose="020B0609030804020204" pitchFamily="49" charset="0"/>
-                <a:ea typeface="Menlo" panose="020B0609030804020204" pitchFamily="49" charset="0"/>
-                <a:cs typeface="Menlo" panose="020B0609030804020204" pitchFamily="49" charset="0"/>
-              </a:rPr>
-              <a:t> </a:t>
-            </a:r>
-            <a:r>
-              <a:rPr lang="cs-CZ" sz="1000" dirty="0" err="1">
-                <a:latin typeface="Menlo" panose="020B0609030804020204" pitchFamily="49" charset="0"/>
-                <a:ea typeface="Menlo" panose="020B0609030804020204" pitchFamily="49" charset="0"/>
-                <a:cs typeface="Menlo" panose="020B0609030804020204" pitchFamily="49" charset="0"/>
-              </a:rPr>
-              <a:t>deploy</a:t>
-            </a:r>
-            <a:r>
-              <a:rPr lang="cs-CZ" sz="1000" dirty="0">
-                <a:latin typeface="Menlo" panose="020B0609030804020204" pitchFamily="49" charset="0"/>
-                <a:ea typeface="Menlo" panose="020B0609030804020204" pitchFamily="49" charset="0"/>
-                <a:cs typeface="Menlo" panose="020B0609030804020204" pitchFamily="49" charset="0"/>
-              </a:rPr>
-              <a:t> --</a:t>
-            </a:r>
-            <a:r>
-              <a:rPr lang="cs-CZ" sz="1000" dirty="0" err="1">
-                <a:latin typeface="Menlo" panose="020B0609030804020204" pitchFamily="49" charset="0"/>
-                <a:ea typeface="Menlo" panose="020B0609030804020204" pitchFamily="49" charset="0"/>
-                <a:cs typeface="Menlo" panose="020B0609030804020204" pitchFamily="49" charset="0"/>
-              </a:rPr>
-              <a:t>template-file</a:t>
-            </a:r>
-            <a:r>
-              <a:rPr lang="cs-CZ" sz="1000" dirty="0">
-                <a:latin typeface="Menlo" panose="020B0609030804020204" pitchFamily="49" charset="0"/>
-                <a:ea typeface="Menlo" panose="020B0609030804020204" pitchFamily="49" charset="0"/>
-                <a:cs typeface="Menlo" panose="020B0609030804020204" pitchFamily="49" charset="0"/>
-              </a:rPr>
-              <a:t> </a:t>
-            </a:r>
-            <a:r>
-              <a:rPr lang="cs-CZ" sz="1000" dirty="0" err="1">
-                <a:latin typeface="Menlo" panose="020B0609030804020204" pitchFamily="49" charset="0"/>
-                <a:ea typeface="Menlo" panose="020B0609030804020204" pitchFamily="49" charset="0"/>
-                <a:cs typeface="Menlo" panose="020B0609030804020204" pitchFamily="49" charset="0"/>
-              </a:rPr>
-              <a:t>packaged-template.yaml</a:t>
-            </a:r>
-            <a:r>
-              <a:rPr lang="cs-CZ" sz="1000" dirty="0">
-                <a:latin typeface="Menlo" panose="020B0609030804020204" pitchFamily="49" charset="0"/>
-                <a:ea typeface="Menlo" panose="020B0609030804020204" pitchFamily="49" charset="0"/>
-                <a:cs typeface="Menlo" panose="020B0609030804020204" pitchFamily="49" charset="0"/>
-              </a:rPr>
-              <a:t> --</a:t>
-            </a:r>
-            <a:r>
-              <a:rPr lang="cs-CZ" sz="1000" dirty="0" err="1">
-                <a:latin typeface="Menlo" panose="020B0609030804020204" pitchFamily="49" charset="0"/>
-                <a:ea typeface="Menlo" panose="020B0609030804020204" pitchFamily="49" charset="0"/>
-                <a:cs typeface="Menlo" panose="020B0609030804020204" pitchFamily="49" charset="0"/>
-              </a:rPr>
-              <a:t>stack-name</a:t>
-            </a:r>
-            <a:r>
-              <a:rPr lang="cs-CZ" sz="1000" dirty="0">
-                <a:latin typeface="Menlo" panose="020B0609030804020204" pitchFamily="49" charset="0"/>
-                <a:ea typeface="Menlo" panose="020B0609030804020204" pitchFamily="49" charset="0"/>
-                <a:cs typeface="Menlo" panose="020B0609030804020204" pitchFamily="49" charset="0"/>
-              </a:rPr>
-              <a:t> &lt;</a:t>
-            </a:r>
-            <a:r>
-              <a:rPr lang="cs-CZ" sz="1000" dirty="0" err="1">
-                <a:latin typeface="Menlo" panose="020B0609030804020204" pitchFamily="49" charset="0"/>
-                <a:ea typeface="Menlo" panose="020B0609030804020204" pitchFamily="49" charset="0"/>
-                <a:cs typeface="Menlo" panose="020B0609030804020204" pitchFamily="49" charset="0"/>
-              </a:rPr>
-              <a:t>whatever</a:t>
-            </a:r>
-            <a:r>
-              <a:rPr lang="cs-CZ" sz="1000" dirty="0">
-                <a:latin typeface="Menlo" panose="020B0609030804020204" pitchFamily="49" charset="0"/>
-                <a:ea typeface="Menlo" panose="020B0609030804020204" pitchFamily="49" charset="0"/>
-                <a:cs typeface="Menlo" panose="020B0609030804020204" pitchFamily="49" charset="0"/>
-              </a:rPr>
-              <a:t> </a:t>
-            </a:r>
-            <a:r>
-              <a:rPr lang="cs-CZ" sz="1000" dirty="0" err="1">
-                <a:latin typeface="Menlo" panose="020B0609030804020204" pitchFamily="49" charset="0"/>
-                <a:ea typeface="Menlo" panose="020B0609030804020204" pitchFamily="49" charset="0"/>
-                <a:cs typeface="Menlo" panose="020B0609030804020204" pitchFamily="49" charset="0"/>
-              </a:rPr>
-              <a:t>name</a:t>
-            </a:r>
-            <a:r>
-              <a:rPr lang="cs-CZ" sz="1000" dirty="0">
-                <a:latin typeface="Menlo" panose="020B0609030804020204" pitchFamily="49" charset="0"/>
-                <a:ea typeface="Menlo" panose="020B0609030804020204" pitchFamily="49" charset="0"/>
-                <a:cs typeface="Menlo" panose="020B0609030804020204" pitchFamily="49" charset="0"/>
-              </a:rPr>
-              <a:t>&gt; --</a:t>
-            </a:r>
-            <a:r>
-              <a:rPr lang="cs-CZ" sz="1000" dirty="0" err="1">
-                <a:latin typeface="Menlo" panose="020B0609030804020204" pitchFamily="49" charset="0"/>
-                <a:ea typeface="Menlo" panose="020B0609030804020204" pitchFamily="49" charset="0"/>
-                <a:cs typeface="Menlo" panose="020B0609030804020204" pitchFamily="49" charset="0"/>
-              </a:rPr>
-              <a:t>capabilities</a:t>
-            </a:r>
-            <a:r>
-              <a:rPr lang="cs-CZ" sz="1000" dirty="0">
-                <a:latin typeface="Menlo" panose="020B0609030804020204" pitchFamily="49" charset="0"/>
-                <a:ea typeface="Menlo" panose="020B0609030804020204" pitchFamily="49" charset="0"/>
-                <a:cs typeface="Menlo" panose="020B0609030804020204" pitchFamily="49" charset="0"/>
-              </a:rPr>
-              <a:t> CAPABILITY_IAM --profile $(AWS_PROFILE) --</a:t>
-            </a:r>
-            <a:r>
-              <a:rPr lang="cs-CZ" sz="1000" dirty="0" err="1">
-                <a:latin typeface="Menlo" panose="020B0609030804020204" pitchFamily="49" charset="0"/>
-                <a:ea typeface="Menlo" panose="020B0609030804020204" pitchFamily="49" charset="0"/>
-                <a:cs typeface="Menlo" panose="020B0609030804020204" pitchFamily="49" charset="0"/>
-              </a:rPr>
-              <a:t>parameter-overrides</a:t>
-            </a:r>
-            <a:r>
-              <a:rPr lang="cs-CZ" sz="1000" dirty="0">
-                <a:latin typeface="Menlo" panose="020B0609030804020204" pitchFamily="49" charset="0"/>
-                <a:ea typeface="Menlo" panose="020B0609030804020204" pitchFamily="49" charset="0"/>
-                <a:cs typeface="Menlo" panose="020B0609030804020204" pitchFamily="49" charset="0"/>
-              </a:rPr>
-              <a:t> </a:t>
-            </a:r>
-            <a:r>
-              <a:rPr lang="cs-CZ" sz="1000" dirty="0" err="1">
-                <a:latin typeface="Menlo" panose="020B0609030804020204" pitchFamily="49" charset="0"/>
-                <a:ea typeface="Menlo" panose="020B0609030804020204" pitchFamily="49" charset="0"/>
-                <a:cs typeface="Menlo" panose="020B0609030804020204" pitchFamily="49" charset="0"/>
-              </a:rPr>
-              <a:t>Environment</a:t>
-            </a:r>
-            <a:r>
-              <a:rPr lang="cs-CZ" sz="1000" dirty="0">
-                <a:latin typeface="Menlo" panose="020B0609030804020204" pitchFamily="49" charset="0"/>
-                <a:ea typeface="Menlo" panose="020B0609030804020204" pitchFamily="49" charset="0"/>
-                <a:cs typeface="Menlo" panose="020B0609030804020204" pitchFamily="49" charset="0"/>
-              </a:rPr>
-              <a:t>=&lt;</a:t>
-            </a:r>
-            <a:r>
-              <a:rPr lang="cs-CZ" sz="1000" dirty="0" err="1">
-                <a:latin typeface="Menlo" panose="020B0609030804020204" pitchFamily="49" charset="0"/>
-                <a:ea typeface="Menlo" panose="020B0609030804020204" pitchFamily="49" charset="0"/>
-                <a:cs typeface="Menlo" panose="020B0609030804020204" pitchFamily="49" charset="0"/>
-              </a:rPr>
-              <a:t>aws</a:t>
-            </a:r>
-            <a:r>
-              <a:rPr lang="cs-CZ" sz="1000" dirty="0">
-                <a:latin typeface="Menlo" panose="020B0609030804020204" pitchFamily="49" charset="0"/>
-                <a:ea typeface="Menlo" panose="020B0609030804020204" pitchFamily="49" charset="0"/>
-                <a:cs typeface="Menlo" panose="020B0609030804020204" pitchFamily="49" charset="0"/>
-              </a:rPr>
-              <a:t> profile&gt;</a:t>
-            </a:r>
-          </a:p>
-          <a:p>
-            <a:pPr lvl="1" indent="-171450"/>
-            <a:r>
-              <a:rPr lang="cs-CZ" dirty="0">
-                <a:latin typeface="+mn-lt"/>
-                <a:ea typeface="Menlo" panose="020B0609030804020204" pitchFamily="49" charset="0"/>
-                <a:cs typeface="Menlo" panose="020B0609030804020204" pitchFamily="49" charset="0"/>
-              </a:rPr>
-              <a:t>STACK_NAME </a:t>
-            </a:r>
-            <a:r>
-              <a:rPr lang="cs-CZ" dirty="0" err="1">
-                <a:latin typeface="+mn-lt"/>
-                <a:ea typeface="Menlo" panose="020B0609030804020204" pitchFamily="49" charset="0"/>
-                <a:cs typeface="Menlo" panose="020B0609030804020204" pitchFamily="49" charset="0"/>
-              </a:rPr>
-              <a:t>is</a:t>
-            </a:r>
-            <a:r>
-              <a:rPr lang="cs-CZ" dirty="0">
-                <a:latin typeface="+mn-lt"/>
-                <a:ea typeface="Menlo" panose="020B0609030804020204" pitchFamily="49" charset="0"/>
-                <a:cs typeface="Menlo" panose="020B0609030804020204" pitchFamily="49" charset="0"/>
-              </a:rPr>
-              <a:t> </a:t>
-            </a:r>
-            <a:r>
-              <a:rPr lang="cs-CZ" dirty="0" err="1">
-                <a:latin typeface="+mn-lt"/>
-                <a:ea typeface="Menlo" panose="020B0609030804020204" pitchFamily="49" charset="0"/>
-                <a:cs typeface="Menlo" panose="020B0609030804020204" pitchFamily="49" charset="0"/>
-              </a:rPr>
-              <a:t>the</a:t>
-            </a:r>
-            <a:r>
-              <a:rPr lang="cs-CZ" dirty="0">
-                <a:latin typeface="+mn-lt"/>
-                <a:ea typeface="Menlo" panose="020B0609030804020204" pitchFamily="49" charset="0"/>
-                <a:cs typeface="Menlo" panose="020B0609030804020204" pitchFamily="49" charset="0"/>
-              </a:rPr>
-              <a:t> prefix </a:t>
-            </a:r>
-            <a:r>
-              <a:rPr lang="cs-CZ" dirty="0" err="1">
-                <a:latin typeface="+mn-lt"/>
-                <a:ea typeface="Menlo" panose="020B0609030804020204" pitchFamily="49" charset="0"/>
-                <a:cs typeface="Menlo" panose="020B0609030804020204" pitchFamily="49" charset="0"/>
-              </a:rPr>
-              <a:t>for</a:t>
-            </a:r>
-            <a:r>
-              <a:rPr lang="cs-CZ" dirty="0">
-                <a:latin typeface="+mn-lt"/>
-                <a:ea typeface="Menlo" panose="020B0609030804020204" pitchFamily="49" charset="0"/>
-                <a:cs typeface="Menlo" panose="020B0609030804020204" pitchFamily="49" charset="0"/>
-              </a:rPr>
-              <a:t> </a:t>
-            </a:r>
-            <a:r>
-              <a:rPr lang="cs-CZ" dirty="0" err="1">
-                <a:latin typeface="+mn-lt"/>
-                <a:ea typeface="Menlo" panose="020B0609030804020204" pitchFamily="49" charset="0"/>
-                <a:cs typeface="Menlo" panose="020B0609030804020204" pitchFamily="49" charset="0"/>
-              </a:rPr>
-              <a:t>all</a:t>
-            </a:r>
-            <a:r>
-              <a:rPr lang="cs-CZ" dirty="0">
-                <a:latin typeface="+mn-lt"/>
-                <a:ea typeface="Menlo" panose="020B0609030804020204" pitchFamily="49" charset="0"/>
-                <a:cs typeface="Menlo" panose="020B0609030804020204" pitchFamily="49" charset="0"/>
-              </a:rPr>
-              <a:t> </a:t>
-            </a:r>
-            <a:r>
-              <a:rPr lang="cs-CZ" dirty="0" err="1">
-                <a:latin typeface="+mn-lt"/>
-                <a:ea typeface="Menlo" panose="020B0609030804020204" pitchFamily="49" charset="0"/>
-                <a:cs typeface="Menlo" panose="020B0609030804020204" pitchFamily="49" charset="0"/>
-              </a:rPr>
-              <a:t>created</a:t>
-            </a:r>
-            <a:r>
-              <a:rPr lang="cs-CZ" dirty="0">
-                <a:latin typeface="+mn-lt"/>
-                <a:ea typeface="Menlo" panose="020B0609030804020204" pitchFamily="49" charset="0"/>
-                <a:cs typeface="Menlo" panose="020B0609030804020204" pitchFamily="49" charset="0"/>
-              </a:rPr>
-              <a:t> </a:t>
-            </a:r>
-            <a:r>
-              <a:rPr lang="cs-CZ" dirty="0" err="1">
-                <a:latin typeface="+mn-lt"/>
-                <a:ea typeface="Menlo" panose="020B0609030804020204" pitchFamily="49" charset="0"/>
-                <a:cs typeface="Menlo" panose="020B0609030804020204" pitchFamily="49" charset="0"/>
-              </a:rPr>
-              <a:t>resources</a:t>
-            </a:r>
-            <a:endParaRPr lang="en-US" dirty="0">
-              <a:latin typeface="+mn-lt"/>
-              <a:ea typeface="Menlo" panose="020B0609030804020204" pitchFamily="49" charset="0"/>
-              <a:cs typeface="Menlo" panose="020B0609030804020204" pitchFamily="49" charset="0"/>
-            </a:endParaRPr>
-          </a:p>
-        </p:txBody>
-      </p:sp>
-      <p:sp>
-        <p:nvSpPr>
-          <p:cNvPr id="5" name="Footer Placeholder 4"/>
-          <p:cNvSpPr>
-            <a:spLocks noGrp="1"/>
-          </p:cNvSpPr>
-          <p:nvPr>
-            <p:ph type="ftr" sz="quarter" idx="11"/>
-          </p:nvPr>
-        </p:nvSpPr>
-        <p:spPr/>
-        <p:txBody>
-          <a:bodyPr/>
-          <a:lstStyle/>
-          <a:p>
-            <a:r>
-              <a:rPr lang="en-US"/>
-              <a:t>Confidential</a:t>
-            </a:r>
-          </a:p>
-        </p:txBody>
-      </p:sp>
-      <p:sp>
-        <p:nvSpPr>
-          <p:cNvPr id="6" name="Slide Number Placeholder 5"/>
-          <p:cNvSpPr>
-            <a:spLocks noGrp="1"/>
-          </p:cNvSpPr>
-          <p:nvPr>
-            <p:ph type="sldNum" sz="quarter" idx="12"/>
-          </p:nvPr>
-        </p:nvSpPr>
-        <p:spPr/>
-        <p:txBody>
-          <a:bodyPr/>
-          <a:lstStyle/>
-          <a:p>
-            <a:fld id="{C954CD8F-8127-4940-9BBC-DD50066780F9}" type="slidenum">
-              <a:rPr lang="en-US" smtClean="0"/>
-              <a:t>6</a:t>
-            </a:fld>
-            <a:endParaRPr lang="en-US"/>
-          </a:p>
-        </p:txBody>
-      </p:sp>
-      <p:sp>
-        <p:nvSpPr>
-          <p:cNvPr id="7" name="Date Placeholder 6"/>
-          <p:cNvSpPr>
-            <a:spLocks noGrp="1"/>
-          </p:cNvSpPr>
-          <p:nvPr>
-            <p:ph type="dt" sz="half" idx="10"/>
-          </p:nvPr>
-        </p:nvSpPr>
-        <p:spPr/>
-        <p:txBody>
-          <a:bodyPr/>
-          <a:lstStyle/>
-          <a:p>
-            <a:fld id="{CF027E54-A86C-7F42-ACF2-1C4CECA97F46}" type="datetime4">
-              <a:rPr lang="en-US" smtClean="0"/>
-              <a:t>June 7, 2018</a:t>
+              <a:t>June 20, 2018</a:t>
             </a:fld>
             <a:endParaRPr lang="en-US"/>
           </a:p>
@@ -9431,324 +8594,6 @@
     <p:extLst>
       <p:ext uri="{BB962C8B-B14F-4D97-AF65-F5344CB8AC3E}">
         <p14:creationId xmlns:p14="http://schemas.microsoft.com/office/powerpoint/2010/main" val="1009944002"/>
-      </p:ext>
-    </p:extLst>
-  </p:cSld>
-  <p:clrMapOvr>
-    <a:masterClrMapping/>
-  </p:clrMapOvr>
-</p:sld>
-</file>
-
-<file path=ppt/slides/slide7.xml><?xml version="1.0" encoding="utf-8"?>
-<p:sld xmlns:a="http://schemas.openxmlformats.org/drawingml/2006/main" xmlns:r="http://schemas.openxmlformats.org/officeDocument/2006/relationships" xmlns:p="http://schemas.openxmlformats.org/presentationml/2006/main">
-  <p:cSld>
-    <p:spTree>
-      <p:nvGrpSpPr>
-        <p:cNvPr id="1" name=""/>
-        <p:cNvGrpSpPr/>
-        <p:nvPr/>
-      </p:nvGrpSpPr>
-      <p:grpSpPr>
-        <a:xfrm>
-          <a:off x="0" y="0"/>
-          <a:ext cx="0" cy="0"/>
-          <a:chOff x="0" y="0"/>
-          <a:chExt cx="0" cy="0"/>
-        </a:xfrm>
-      </p:grpSpPr>
-      <p:sp>
-        <p:nvSpPr>
-          <p:cNvPr id="2" name="Title 1"/>
-          <p:cNvSpPr>
-            <a:spLocks noGrp="1"/>
-          </p:cNvSpPr>
-          <p:nvPr>
-            <p:ph type="title"/>
-          </p:nvPr>
-        </p:nvSpPr>
-        <p:spPr>
-          <a:xfrm>
-            <a:off x="426720" y="409075"/>
-            <a:ext cx="8290560" cy="820840"/>
-          </a:xfrm>
-        </p:spPr>
-        <p:txBody>
-          <a:bodyPr/>
-          <a:lstStyle/>
-          <a:p>
-            <a:r>
-              <a:rPr lang="en-US" dirty="0"/>
-              <a:t>Useful URLs</a:t>
-            </a:r>
-          </a:p>
-        </p:txBody>
-      </p:sp>
-      <p:sp>
-        <p:nvSpPr>
-          <p:cNvPr id="3" name="Content Placeholder 2"/>
-          <p:cNvSpPr>
-            <a:spLocks noGrp="1"/>
-          </p:cNvSpPr>
-          <p:nvPr>
-            <p:ph idx="1"/>
-          </p:nvPr>
-        </p:nvSpPr>
-        <p:spPr>
-          <a:xfrm>
-            <a:off x="426720" y="1395663"/>
-            <a:ext cx="8290560" cy="3429000"/>
-          </a:xfrm>
-        </p:spPr>
-        <p:txBody>
-          <a:bodyPr/>
-          <a:lstStyle/>
-          <a:p>
-            <a:r>
-              <a:rPr lang="en-US" dirty="0">
-                <a:latin typeface="+mn-lt"/>
-              </a:rPr>
-              <a:t>SAM Doc:</a:t>
-            </a:r>
-          </a:p>
-          <a:p>
-            <a:pPr lvl="1"/>
-            <a:r>
-              <a:rPr lang="en-US" dirty="0">
-                <a:latin typeface="+mn-lt"/>
-              </a:rPr>
-              <a:t>https://</a:t>
-            </a:r>
-            <a:r>
-              <a:rPr lang="en-US" dirty="0" err="1">
-                <a:latin typeface="+mn-lt"/>
-              </a:rPr>
-              <a:t>github.com</a:t>
-            </a:r>
-            <a:r>
-              <a:rPr lang="en-US" dirty="0">
-                <a:latin typeface="+mn-lt"/>
-              </a:rPr>
-              <a:t>/</a:t>
-            </a:r>
-            <a:r>
-              <a:rPr lang="en-US" dirty="0" err="1">
-                <a:latin typeface="+mn-lt"/>
-              </a:rPr>
-              <a:t>awslabs</a:t>
-            </a:r>
-            <a:r>
-              <a:rPr lang="en-US" dirty="0">
-                <a:latin typeface="+mn-lt"/>
-              </a:rPr>
-              <a:t>/serverless-application-model/blob/develop/versions/2016-10-31.md</a:t>
-            </a:r>
-          </a:p>
-          <a:p>
-            <a:r>
-              <a:rPr lang="en-US" dirty="0">
-                <a:latin typeface="+mn-lt"/>
-              </a:rPr>
-              <a:t>Internal </a:t>
-            </a:r>
-            <a:r>
-              <a:rPr lang="en-US" dirty="0" err="1">
-                <a:latin typeface="+mn-lt"/>
-              </a:rPr>
-              <a:t>yaml</a:t>
-            </a:r>
-            <a:r>
-              <a:rPr lang="en-US" dirty="0">
-                <a:latin typeface="+mn-lt"/>
-              </a:rPr>
-              <a:t> functions:</a:t>
-            </a:r>
-          </a:p>
-          <a:p>
-            <a:pPr lvl="1"/>
-            <a:r>
-              <a:rPr lang="en-US" dirty="0">
-                <a:latin typeface="+mn-lt"/>
-              </a:rPr>
-              <a:t> </a:t>
-            </a:r>
-            <a:r>
-              <a:rPr lang="en-US" dirty="0">
-                <a:latin typeface="+mn-lt"/>
-                <a:hlinkClick r:id="rId3"/>
-              </a:rPr>
-              <a:t>https://docs.aws.amazon.com/AWSCloudFormation/latest/UserGuide/intrinsic-function-reference.html</a:t>
-            </a:r>
-            <a:endParaRPr lang="en-US" dirty="0">
-              <a:latin typeface="+mn-lt"/>
-            </a:endParaRPr>
-          </a:p>
-          <a:p>
-            <a:r>
-              <a:rPr lang="en-US" dirty="0" err="1">
-                <a:latin typeface="+mn-lt"/>
-              </a:rPr>
-              <a:t>Cloudformation</a:t>
-            </a:r>
-            <a:r>
-              <a:rPr lang="en-US" dirty="0">
-                <a:latin typeface="+mn-lt"/>
-              </a:rPr>
-              <a:t> API types usable within </a:t>
-            </a:r>
-            <a:r>
-              <a:rPr lang="en-US" dirty="0" err="1">
-                <a:latin typeface="+mn-lt"/>
-              </a:rPr>
-              <a:t>sam</a:t>
-            </a:r>
-            <a:r>
-              <a:rPr lang="en-US" dirty="0">
-                <a:latin typeface="+mn-lt"/>
-              </a:rPr>
-              <a:t> template:</a:t>
-            </a:r>
-          </a:p>
-          <a:p>
-            <a:pPr lvl="1"/>
-            <a:r>
-              <a:rPr lang="en-US" dirty="0">
-                <a:latin typeface="+mn-lt"/>
-              </a:rPr>
-              <a:t>https://</a:t>
-            </a:r>
-            <a:r>
-              <a:rPr lang="en-US" dirty="0" err="1">
-                <a:latin typeface="+mn-lt"/>
-              </a:rPr>
-              <a:t>docs.aws.amazon.com</a:t>
-            </a:r>
-            <a:r>
-              <a:rPr lang="en-US" dirty="0">
-                <a:latin typeface="+mn-lt"/>
-              </a:rPr>
-              <a:t>/</a:t>
-            </a:r>
-            <a:r>
-              <a:rPr lang="en-US" dirty="0" err="1">
-                <a:latin typeface="+mn-lt"/>
-              </a:rPr>
-              <a:t>AWSCloudFormation</a:t>
-            </a:r>
-            <a:r>
-              <a:rPr lang="en-US" dirty="0">
-                <a:latin typeface="+mn-lt"/>
-              </a:rPr>
-              <a:t>/latest/</a:t>
-            </a:r>
-            <a:r>
-              <a:rPr lang="en-US" dirty="0" err="1">
-                <a:latin typeface="+mn-lt"/>
-              </a:rPr>
-              <a:t>UserGuide</a:t>
-            </a:r>
-            <a:r>
-              <a:rPr lang="en-US" dirty="0">
-                <a:latin typeface="+mn-lt"/>
-              </a:rPr>
-              <a:t>/</a:t>
-            </a:r>
-            <a:r>
-              <a:rPr lang="en-US" dirty="0" err="1">
-                <a:latin typeface="+mn-lt"/>
-              </a:rPr>
-              <a:t>aws</a:t>
-            </a:r>
-            <a:r>
-              <a:rPr lang="en-US" dirty="0">
-                <a:latin typeface="+mn-lt"/>
-              </a:rPr>
-              <a:t>-template-resource-type-</a:t>
-            </a:r>
-            <a:r>
-              <a:rPr lang="en-US" dirty="0" err="1">
-                <a:latin typeface="+mn-lt"/>
-              </a:rPr>
-              <a:t>ref.html</a:t>
-            </a:r>
-            <a:endParaRPr lang="en-US" dirty="0">
-              <a:latin typeface="+mn-lt"/>
-            </a:endParaRPr>
-          </a:p>
-        </p:txBody>
-      </p:sp>
-      <p:sp>
-        <p:nvSpPr>
-          <p:cNvPr id="5" name="Footer Placeholder 4"/>
-          <p:cNvSpPr>
-            <a:spLocks noGrp="1"/>
-          </p:cNvSpPr>
-          <p:nvPr>
-            <p:ph type="ftr" sz="quarter" idx="11"/>
-          </p:nvPr>
-        </p:nvSpPr>
-        <p:spPr/>
-        <p:txBody>
-          <a:bodyPr/>
-          <a:lstStyle/>
-          <a:p>
-            <a:r>
-              <a:rPr lang="en-US"/>
-              <a:t>Confidential</a:t>
-            </a:r>
-          </a:p>
-        </p:txBody>
-      </p:sp>
-      <p:sp>
-        <p:nvSpPr>
-          <p:cNvPr id="6" name="Slide Number Placeholder 5"/>
-          <p:cNvSpPr>
-            <a:spLocks noGrp="1"/>
-          </p:cNvSpPr>
-          <p:nvPr>
-            <p:ph type="sldNum" sz="quarter" idx="12"/>
-          </p:nvPr>
-        </p:nvSpPr>
-        <p:spPr/>
-        <p:txBody>
-          <a:bodyPr/>
-          <a:lstStyle/>
-          <a:p>
-            <a:fld id="{C954CD8F-8127-4940-9BBC-DD50066780F9}" type="slidenum">
-              <a:rPr lang="en-US" smtClean="0"/>
-              <a:t>7</a:t>
-            </a:fld>
-            <a:endParaRPr lang="en-US"/>
-          </a:p>
-        </p:txBody>
-      </p:sp>
-      <p:sp>
-        <p:nvSpPr>
-          <p:cNvPr id="7" name="Date Placeholder 6"/>
-          <p:cNvSpPr>
-            <a:spLocks noGrp="1"/>
-          </p:cNvSpPr>
-          <p:nvPr>
-            <p:ph type="dt" sz="half" idx="10"/>
-          </p:nvPr>
-        </p:nvSpPr>
-        <p:spPr/>
-        <p:txBody>
-          <a:bodyPr/>
-          <a:lstStyle/>
-          <a:p>
-            <a:fld id="{CF027E54-A86C-7F42-ACF2-1C4CECA97F46}" type="datetime4">
-              <a:rPr lang="en-US" smtClean="0"/>
-              <a:t>June 7, 2018</a:t>
-            </a:fld>
-            <a:endParaRPr lang="en-US"/>
-          </a:p>
-        </p:txBody>
-      </p:sp>
-    </p:spTree>
-    <p:extLst>
-      <p:ext uri="{BB962C8B-B14F-4D97-AF65-F5344CB8AC3E}">
-        <p14:creationId xmlns:p14="http://schemas.microsoft.com/office/powerpoint/2010/main" val="4206447002"/>
       </p:ext>
     </p:extLst>
   </p:cSld>
@@ -10656,18 +9501,18 @@
 </file>
 
 <file path=customXml/item2.xml><?xml version="1.0" encoding="utf-8"?>
+<p:properties xmlns:p="http://schemas.microsoft.com/office/2006/metadata/properties" xmlns:xsi="http://www.w3.org/2001/XMLSchema-instance" xmlns:pc="http://schemas.microsoft.com/office/infopath/2007/PartnerControls">
+  <documentManagement/>
+</p:properties>
+</file>
+
+<file path=customXml/item3.xml><?xml version="1.0" encoding="utf-8"?>
 <?mso-contentType ?>
 <FormTemplates xmlns="http://schemas.microsoft.com/sharepoint/v3/contenttype/forms">
   <Display>DocumentLibraryForm</Display>
   <Edit>DocumentLibraryForm</Edit>
   <New>DocumentLibraryForm</New>
 </FormTemplates>
-</file>
-
-<file path=customXml/item3.xml><?xml version="1.0" encoding="utf-8"?>
-<p:properties xmlns:p="http://schemas.microsoft.com/office/2006/metadata/properties" xmlns:xsi="http://www.w3.org/2001/XMLSchema-instance" xmlns:pc="http://schemas.microsoft.com/office/infopath/2007/PartnerControls">
-  <documentManagement/>
-</p:properties>
 </file>
 
 <file path=customXml/itemProps1.xml><?xml version="1.0" encoding="utf-8"?>
@@ -10687,18 +9532,18 @@
 </file>
 
 <file path=customXml/itemProps2.xml><?xml version="1.0" encoding="utf-8"?>
-<ds:datastoreItem xmlns:ds="http://schemas.openxmlformats.org/officeDocument/2006/customXml" ds:itemID="{4E990513-C383-4417-977F-8653F0102B1A}">
-  <ds:schemaRefs>
-    <ds:schemaRef ds:uri="http://schemas.microsoft.com/sharepoint/v3/contenttype/forms"/>
-  </ds:schemaRefs>
-</ds:datastoreItem>
-</file>
-
-<file path=customXml/itemProps3.xml><?xml version="1.0" encoding="utf-8"?>
 <ds:datastoreItem xmlns:ds="http://schemas.openxmlformats.org/officeDocument/2006/customXml" ds:itemID="{E40DCAF4-6759-45CB-9FF7-9FCF33AF572F}">
   <ds:schemaRefs>
     <ds:schemaRef ds:uri="http://schemas.microsoft.com/office/2006/metadata/properties"/>
     <ds:schemaRef ds:uri="http://schemas.microsoft.com/office/infopath/2007/PartnerControls"/>
   </ds:schemaRefs>
 </ds:datastoreItem>
+</file>
+
+<file path=customXml/itemProps3.xml><?xml version="1.0" encoding="utf-8"?>
+<ds:datastoreItem xmlns:ds="http://schemas.openxmlformats.org/officeDocument/2006/customXml" ds:itemID="{4E990513-C383-4417-977F-8653F0102B1A}">
+  <ds:schemaRefs>
+    <ds:schemaRef ds:uri="http://schemas.microsoft.com/sharepoint/v3/contenttype/forms"/>
+  </ds:schemaRefs>
+</ds:datastoreItem>
 </file>
</xml_diff>